<commit_message>
beginning work on ppt presentation and initiating cleaned up readme text.
</commit_message>
<xml_diff>
--- a/ppt/Companies in Russia After Ukrainian Invasion.pptx
+++ b/ppt/Companies in Russia After Ukrainian Invasion.pptx
@@ -5,15 +5,23 @@
     <p:sldMasterId id="2147483648" r:id="rId1"/>
   </p:sldMasterIdLst>
   <p:notesMasterIdLst>
-    <p:notesMasterId r:id="rId5"/>
+    <p:notesMasterId r:id="rId13"/>
   </p:notesMasterIdLst>
   <p:handoutMasterIdLst>
-    <p:handoutMasterId r:id="rId6"/>
+    <p:handoutMasterId r:id="rId14"/>
   </p:handoutMasterIdLst>
   <p:sldIdLst>
     <p:sldId id="256" r:id="rId2"/>
-    <p:sldId id="257" r:id="rId3"/>
-    <p:sldId id="261" r:id="rId4"/>
+    <p:sldId id="267" r:id="rId3"/>
+    <p:sldId id="268" r:id="rId4"/>
+    <p:sldId id="263" r:id="rId5"/>
+    <p:sldId id="264" r:id="rId6"/>
+    <p:sldId id="257" r:id="rId7"/>
+    <p:sldId id="261" r:id="rId8"/>
+    <p:sldId id="265" r:id="rId9"/>
+    <p:sldId id="262" r:id="rId10"/>
+    <p:sldId id="269" r:id="rId11"/>
+    <p:sldId id="266" r:id="rId12"/>
   </p:sldIdLst>
   <p:sldSz cx="12192000" cy="6858000"/>
   <p:notesSz cx="6858000" cy="9144000"/>
@@ -3998,6 +4006,341 @@
 </p:sld>
 </file>
 
+<file path=ppt/slides/slide10.xml><?xml version="1.0" encoding="utf-8"?>
+<p:sld xmlns:a="http://schemas.openxmlformats.org/drawingml/2006/main" xmlns:r="http://schemas.openxmlformats.org/officeDocument/2006/relationships" xmlns:p="http://schemas.openxmlformats.org/presentationml/2006/main">
+  <p:cSld>
+    <p:spTree>
+      <p:nvGrpSpPr>
+        <p:cNvPr id="1" name=""/>
+        <p:cNvGrpSpPr/>
+        <p:nvPr/>
+      </p:nvGrpSpPr>
+      <p:grpSpPr>
+        <a:xfrm>
+          <a:off x="0" y="0"/>
+          <a:ext cx="0" cy="0"/>
+          <a:chOff x="0" y="0"/>
+          <a:chExt cx="0" cy="0"/>
+        </a:xfrm>
+      </p:grpSpPr>
+      <p:sp>
+        <p:nvSpPr>
+          <p:cNvPr id="2" name="Title 1">
+            <a:extLst>
+              <a:ext uri="{FF2B5EF4-FFF2-40B4-BE49-F238E27FC236}">
+                <a16:creationId xmlns:a16="http://schemas.microsoft.com/office/drawing/2014/main" id="{68BDA5B9-F67F-38E2-88E2-74F2FB831908}"/>
+              </a:ext>
+            </a:extLst>
+          </p:cNvPr>
+          <p:cNvSpPr>
+            <a:spLocks noGrp="1"/>
+          </p:cNvSpPr>
+          <p:nvPr>
+            <p:ph type="title"/>
+          </p:nvPr>
+        </p:nvSpPr>
+        <p:spPr/>
+        <p:txBody>
+          <a:bodyPr/>
+          <a:lstStyle/>
+          <a:p>
+            <a:r>
+              <a:rPr lang="en-US" dirty="0"/>
+              <a:t>Future Project Plans</a:t>
+            </a:r>
+          </a:p>
+        </p:txBody>
+      </p:sp>
+      <p:sp>
+        <p:nvSpPr>
+          <p:cNvPr id="3" name="Content Placeholder 2">
+            <a:extLst>
+              <a:ext uri="{FF2B5EF4-FFF2-40B4-BE49-F238E27FC236}">
+                <a16:creationId xmlns:a16="http://schemas.microsoft.com/office/drawing/2014/main" id="{D2AD61E8-F4CF-3990-D3F2-C9529D155318}"/>
+              </a:ext>
+            </a:extLst>
+          </p:cNvPr>
+          <p:cNvSpPr>
+            <a:spLocks noGrp="1"/>
+          </p:cNvSpPr>
+          <p:nvPr>
+            <p:ph idx="1"/>
+          </p:nvPr>
+        </p:nvSpPr>
+        <p:spPr/>
+        <p:txBody>
+          <a:bodyPr/>
+          <a:lstStyle/>
+          <a:p>
+            <a:r>
+              <a:rPr lang="en-US" dirty="0"/>
+              <a:t>Trending tags, identifying what makes a video trend</a:t>
+            </a:r>
+          </a:p>
+          <a:p>
+            <a:r>
+              <a:rPr lang="en-US" dirty="0"/>
+              <a:t>Duration of trending content</a:t>
+            </a:r>
+          </a:p>
+          <a:p>
+            <a:r>
+              <a:rPr lang="en-US" dirty="0"/>
+              <a:t>Identifying social media platforms in descriptions</a:t>
+            </a:r>
+          </a:p>
+          <a:p>
+            <a:endParaRPr lang="en-US" dirty="0"/>
+          </a:p>
+        </p:txBody>
+      </p:sp>
+      <p:sp>
+        <p:nvSpPr>
+          <p:cNvPr id="4" name="TextBox 3">
+            <a:extLst>
+              <a:ext uri="{FF2B5EF4-FFF2-40B4-BE49-F238E27FC236}">
+                <a16:creationId xmlns:a16="http://schemas.microsoft.com/office/drawing/2014/main" id="{10DA82BD-3DE2-9957-B778-2EA66EC2E296}"/>
+              </a:ext>
+            </a:extLst>
+          </p:cNvPr>
+          <p:cNvSpPr txBox="1"/>
+          <p:nvPr/>
+        </p:nvSpPr>
+        <p:spPr>
+          <a:xfrm>
+            <a:off x="1513609" y="4049372"/>
+            <a:ext cx="8229600" cy="1200329"/>
+          </a:xfrm>
+          <a:prstGeom prst="rect">
+            <a:avLst/>
+          </a:prstGeom>
+          <a:noFill/>
+        </p:spPr>
+        <p:txBody>
+          <a:bodyPr wrap="square" rtlCol="0">
+            <a:spAutoFit/>
+          </a:bodyPr>
+          <a:lstStyle/>
+          <a:p>
+            <a:r>
+              <a:rPr lang="en-US" sz="7200" dirty="0"/>
+              <a:t>UPDATE</a:t>
+            </a:r>
+          </a:p>
+        </p:txBody>
+      </p:sp>
+    </p:spTree>
+    <p:extLst>
+      <p:ext uri="{BB962C8B-B14F-4D97-AF65-F5344CB8AC3E}">
+        <p14:creationId xmlns:p14="http://schemas.microsoft.com/office/powerpoint/2010/main" val="3326759480"/>
+      </p:ext>
+    </p:extLst>
+  </p:cSld>
+  <p:clrMapOvr>
+    <a:masterClrMapping/>
+  </p:clrMapOvr>
+  <mc:AlternateContent xmlns:mc="http://schemas.openxmlformats.org/markup-compatibility/2006" xmlns:p14="http://schemas.microsoft.com/office/powerpoint/2010/main">
+    <mc:Choice Requires="p14">
+      <p:transition spd="med" p14:dur="700">
+        <p:fade/>
+      </p:transition>
+    </mc:Choice>
+    <mc:Fallback xmlns="">
+      <p:transition spd="med">
+        <p:fade/>
+      </p:transition>
+    </mc:Fallback>
+  </mc:AlternateContent>
+</p:sld>
+</file>
+
+<file path=ppt/slides/slide11.xml><?xml version="1.0" encoding="utf-8"?>
+<p:sld xmlns:a="http://schemas.openxmlformats.org/drawingml/2006/main" xmlns:r="http://schemas.openxmlformats.org/officeDocument/2006/relationships" xmlns:p="http://schemas.openxmlformats.org/presentationml/2006/main">
+  <p:cSld>
+    <p:spTree>
+      <p:nvGrpSpPr>
+        <p:cNvPr id="1" name=""/>
+        <p:cNvGrpSpPr/>
+        <p:nvPr/>
+      </p:nvGrpSpPr>
+      <p:grpSpPr>
+        <a:xfrm>
+          <a:off x="0" y="0"/>
+          <a:ext cx="0" cy="0"/>
+          <a:chOff x="0" y="0"/>
+          <a:chExt cx="0" cy="0"/>
+        </a:xfrm>
+      </p:grpSpPr>
+      <p:sp>
+        <p:nvSpPr>
+          <p:cNvPr id="2" name="Title 1">
+            <a:extLst>
+              <a:ext uri="{FF2B5EF4-FFF2-40B4-BE49-F238E27FC236}">
+                <a16:creationId xmlns:a16="http://schemas.microsoft.com/office/drawing/2014/main" id="{4C44AF5E-4726-3FCA-3646-6CC8BA08E269}"/>
+              </a:ext>
+            </a:extLst>
+          </p:cNvPr>
+          <p:cNvSpPr>
+            <a:spLocks noGrp="1"/>
+          </p:cNvSpPr>
+          <p:nvPr>
+            <p:ph type="title"/>
+          </p:nvPr>
+        </p:nvSpPr>
+        <p:spPr>
+          <a:xfrm>
+            <a:off x="838200" y="152400"/>
+            <a:ext cx="10515600" cy="1145224"/>
+          </a:xfrm>
+        </p:spPr>
+        <p:txBody>
+          <a:bodyPr/>
+          <a:lstStyle/>
+          <a:p>
+            <a:r>
+              <a:rPr lang="en-US" dirty="0"/>
+              <a:t>Contact Info, Repository &amp; Dataset</a:t>
+            </a:r>
+          </a:p>
+        </p:txBody>
+      </p:sp>
+      <p:sp>
+        <p:nvSpPr>
+          <p:cNvPr id="3" name="Content Placeholder 2">
+            <a:extLst>
+              <a:ext uri="{FF2B5EF4-FFF2-40B4-BE49-F238E27FC236}">
+                <a16:creationId xmlns:a16="http://schemas.microsoft.com/office/drawing/2014/main" id="{4710CCA1-8679-6A6E-6A9E-F91CC74A80E2}"/>
+              </a:ext>
+            </a:extLst>
+          </p:cNvPr>
+          <p:cNvSpPr>
+            <a:spLocks noGrp="1"/>
+          </p:cNvSpPr>
+          <p:nvPr>
+            <p:ph idx="1"/>
+          </p:nvPr>
+        </p:nvSpPr>
+        <p:spPr>
+          <a:xfrm>
+            <a:off x="838200" y="1607416"/>
+            <a:ext cx="10515600" cy="4351338"/>
+          </a:xfrm>
+        </p:spPr>
+        <p:txBody>
+          <a:bodyPr>
+            <a:normAutofit fontScale="92500" lnSpcReduction="10000"/>
+          </a:bodyPr>
+          <a:lstStyle/>
+          <a:p>
+            <a:r>
+              <a:rPr lang="en-US" sz="3000" dirty="0"/>
+              <a:t>Contact Info</a:t>
+            </a:r>
+          </a:p>
+          <a:p>
+            <a:pPr lvl="1"/>
+            <a:r>
+              <a:rPr lang="en-US" sz="2600" dirty="0"/>
+              <a:t>Travis Lindeman </a:t>
+            </a:r>
+          </a:p>
+          <a:p>
+            <a:pPr lvl="2"/>
+            <a:r>
+              <a:rPr lang="en-US" sz="2400" dirty="0">
+                <a:hlinkClick r:id="rId2"/>
+              </a:rPr>
+              <a:t>travis.lindeman@socom.mil</a:t>
+            </a:r>
+            <a:endParaRPr lang="en-US" sz="2400" dirty="0"/>
+          </a:p>
+          <a:p>
+            <a:pPr lvl="2"/>
+            <a:r>
+              <a:rPr lang="en-US" sz="2400" dirty="0">
+                <a:hlinkClick r:id="rId3"/>
+              </a:rPr>
+              <a:t>tralinde@gmail.com</a:t>
+            </a:r>
+            <a:endParaRPr lang="en-US" sz="2400" dirty="0"/>
+          </a:p>
+          <a:p>
+            <a:r>
+              <a:rPr lang="en-US" sz="3300" dirty="0"/>
+              <a:t>Repository link:</a:t>
+            </a:r>
+          </a:p>
+          <a:p>
+            <a:pPr marL="0" indent="0">
+              <a:buNone/>
+            </a:pPr>
+            <a:r>
+              <a:rPr lang="en-US" sz="2400" dirty="0"/>
+              <a:t>  </a:t>
+            </a:r>
+            <a:r>
+              <a:rPr lang="en-US" sz="2600" dirty="0">
+                <a:hlinkClick r:id="rId4"/>
+              </a:rPr>
+              <a:t>https://github.com/tralinde/companies_in_russia</a:t>
+            </a:r>
+            <a:endParaRPr lang="en-US" sz="2600" dirty="0"/>
+          </a:p>
+          <a:p>
+            <a:r>
+              <a:rPr lang="en-US" sz="3300" dirty="0"/>
+              <a:t>Dataset link: </a:t>
+            </a:r>
+          </a:p>
+          <a:p>
+            <a:pPr marL="0" indent="0">
+              <a:buNone/>
+            </a:pPr>
+            <a:r>
+              <a:rPr lang="en-US" sz="2400" dirty="0"/>
+              <a:t>  </a:t>
+            </a:r>
+            <a:r>
+              <a:rPr lang="en-US" sz="2600" dirty="0">
+                <a:hlinkClick r:id="rId5"/>
+              </a:rPr>
+              <a:t>https://www.kaggle.com/datasets/vadimtynchenko/list-of-companies-leaving-or-staying-in-russia</a:t>
+            </a:r>
+            <a:endParaRPr lang="en-US" sz="2600" dirty="0"/>
+          </a:p>
+          <a:p>
+            <a:pPr marL="0" indent="0">
+              <a:buNone/>
+            </a:pPr>
+            <a:endParaRPr lang="en-US" sz="2400" dirty="0"/>
+          </a:p>
+        </p:txBody>
+      </p:sp>
+    </p:spTree>
+    <p:extLst>
+      <p:ext uri="{BB962C8B-B14F-4D97-AF65-F5344CB8AC3E}">
+        <p14:creationId xmlns:p14="http://schemas.microsoft.com/office/powerpoint/2010/main" val="2164851717"/>
+      </p:ext>
+    </p:extLst>
+  </p:cSld>
+  <p:clrMapOvr>
+    <a:masterClrMapping/>
+  </p:clrMapOvr>
+  <mc:AlternateContent xmlns:mc="http://schemas.openxmlformats.org/markup-compatibility/2006" xmlns:p14="http://schemas.microsoft.com/office/powerpoint/2010/main">
+    <mc:Choice Requires="p14">
+      <p:transition spd="med" p14:dur="700">
+        <p:fade/>
+      </p:transition>
+    </mc:Choice>
+    <mc:Fallback xmlns="">
+      <p:transition spd="med">
+        <p:fade/>
+      </p:transition>
+    </mc:Fallback>
+  </mc:AlternateContent>
+</p:sld>
+</file>
+
 <file path=ppt/slides/slide2.xml><?xml version="1.0" encoding="utf-8"?>
 <p:sld xmlns:a="http://schemas.openxmlformats.org/drawingml/2006/main" xmlns:r="http://schemas.openxmlformats.org/officeDocument/2006/relationships" xmlns:p="http://schemas.openxmlformats.org/presentationml/2006/main">
   <p:cSld>
@@ -4017,132 +4360,96 @@
       </p:grpSpPr>
       <p:sp>
         <p:nvSpPr>
-          <p:cNvPr id="2" name="Title 1"/>
-          <p:cNvSpPr>
-            <a:spLocks noGrp="1"/>
-          </p:cNvSpPr>
-          <p:nvPr>
-            <p:ph type="title"/>
-          </p:nvPr>
-        </p:nvSpPr>
-        <p:spPr/>
-        <p:txBody>
-          <a:bodyPr/>
-          <a:lstStyle/>
-          <a:p>
-            <a:r>
-              <a:rPr lang="en-US" dirty="0"/>
-              <a:t>Comparison by Industry and Letter Grade:</a:t>
-            </a:r>
-            <a:br>
-              <a:rPr lang="en-US" dirty="0"/>
-            </a:br>
-            <a:r>
-              <a:rPr lang="en-US" dirty="0"/>
-              <a:t>	</a:t>
-            </a:r>
-            <a:r>
-              <a:rPr lang="en-US" sz="2800" dirty="0"/>
-              <a:t>Biggest Six Industries</a:t>
-            </a:r>
-            <a:endParaRPr lang="en-US" dirty="0"/>
-          </a:p>
-        </p:txBody>
-      </p:sp>
-      <p:pic>
-        <p:nvPicPr>
-          <p:cNvPr id="11" name="Picture 10">
+          <p:cNvPr id="2" name="Title 1">
             <a:extLst>
               <a:ext uri="{FF2B5EF4-FFF2-40B4-BE49-F238E27FC236}">
-                <a16:creationId xmlns:a16="http://schemas.microsoft.com/office/drawing/2014/main" id="{8249EE3E-6619-6F86-32CF-A5C7189B3BD9}"/>
+                <a16:creationId xmlns:a16="http://schemas.microsoft.com/office/drawing/2014/main" id="{C60C9FC5-B5D5-E232-2B47-446FDCCFD8C8}"/>
               </a:ext>
             </a:extLst>
           </p:cNvPr>
-          <p:cNvPicPr preferRelativeResize="0">
-            <a:picLocks/>
-          </p:cNvPicPr>
+          <p:cNvSpPr>
+            <a:spLocks noGrp="1"/>
+          </p:cNvSpPr>
+          <p:nvPr>
+            <p:ph type="title"/>
+          </p:nvPr>
+        </p:nvSpPr>
+        <p:spPr/>
+        <p:txBody>
+          <a:bodyPr/>
+          <a:lstStyle/>
+          <a:p>
+            <a:r>
+              <a:rPr lang="en-US" dirty="0"/>
+              <a:t>Stakeholder Interest</a:t>
+            </a:r>
+          </a:p>
+        </p:txBody>
+      </p:sp>
+      <p:sp>
+        <p:nvSpPr>
+          <p:cNvPr id="3" name="Content Placeholder 2">
+            <a:extLst>
+              <a:ext uri="{FF2B5EF4-FFF2-40B4-BE49-F238E27FC236}">
+                <a16:creationId xmlns:a16="http://schemas.microsoft.com/office/drawing/2014/main" id="{12EDB104-3CF2-E9BA-0CBF-F497C3B5C063}"/>
+              </a:ext>
+            </a:extLst>
+          </p:cNvPr>
+          <p:cNvSpPr>
+            <a:spLocks noGrp="1"/>
+          </p:cNvSpPr>
+          <p:nvPr>
+            <p:ph idx="1"/>
+          </p:nvPr>
+        </p:nvSpPr>
+        <p:spPr/>
+        <p:txBody>
+          <a:bodyPr/>
+          <a:lstStyle/>
+          <a:p>
+            <a:endParaRPr lang="en-US" dirty="0"/>
+          </a:p>
+        </p:txBody>
+      </p:sp>
+      <p:sp>
+        <p:nvSpPr>
+          <p:cNvPr id="5" name="TextBox 4">
+            <a:extLst>
+              <a:ext uri="{FF2B5EF4-FFF2-40B4-BE49-F238E27FC236}">
+                <a16:creationId xmlns:a16="http://schemas.microsoft.com/office/drawing/2014/main" id="{EDD52C49-D541-5504-B2E6-969D47994B2E}"/>
+              </a:ext>
+            </a:extLst>
+          </p:cNvPr>
+          <p:cNvSpPr txBox="1"/>
           <p:nvPr/>
-        </p:nvPicPr>
-        <p:blipFill>
-          <a:blip r:embed="rId2"/>
-          <a:stretch>
-            <a:fillRect/>
-          </a:stretch>
-        </p:blipFill>
+        </p:nvSpPr>
         <p:spPr>
           <a:xfrm>
-            <a:off x="229839" y="1752581"/>
-            <a:ext cx="3657600" cy="3657600"/>
+            <a:off x="2514600" y="1676400"/>
+            <a:ext cx="8229600" cy="1200329"/>
           </a:xfrm>
           <a:prstGeom prst="rect">
             <a:avLst/>
           </a:prstGeom>
+          <a:noFill/>
         </p:spPr>
-      </p:pic>
-      <p:pic>
-        <p:nvPicPr>
-          <p:cNvPr id="13" name="Picture 12">
-            <a:extLst>
-              <a:ext uri="{FF2B5EF4-FFF2-40B4-BE49-F238E27FC236}">
-                <a16:creationId xmlns:a16="http://schemas.microsoft.com/office/drawing/2014/main" id="{958D49A2-DA94-7CC0-A50F-A909B44C2046}"/>
-              </a:ext>
-            </a:extLst>
-          </p:cNvPr>
-          <p:cNvPicPr preferRelativeResize="0">
-            <a:picLocks/>
-          </p:cNvPicPr>
-          <p:nvPr/>
-        </p:nvPicPr>
-        <p:blipFill>
-          <a:blip r:embed="rId3"/>
-          <a:stretch>
-            <a:fillRect/>
-          </a:stretch>
-        </p:blipFill>
-        <p:spPr>
-          <a:xfrm>
-            <a:off x="8000980" y="1771650"/>
-            <a:ext cx="3657600" cy="3657600"/>
-          </a:xfrm>
-          <a:prstGeom prst="rect">
-            <a:avLst/>
-          </a:prstGeom>
-        </p:spPr>
-      </p:pic>
-      <p:pic>
-        <p:nvPicPr>
-          <p:cNvPr id="15" name="Picture 14">
-            <a:extLst>
-              <a:ext uri="{FF2B5EF4-FFF2-40B4-BE49-F238E27FC236}">
-                <a16:creationId xmlns:a16="http://schemas.microsoft.com/office/drawing/2014/main" id="{7BDE0CDA-4F06-271B-3174-FF74A97F09D9}"/>
-              </a:ext>
-            </a:extLst>
-          </p:cNvPr>
-          <p:cNvPicPr preferRelativeResize="0">
-            <a:picLocks/>
-          </p:cNvPicPr>
-          <p:nvPr/>
-        </p:nvPicPr>
-        <p:blipFill>
-          <a:blip r:embed="rId4"/>
-          <a:stretch>
-            <a:fillRect/>
-          </a:stretch>
-        </p:blipFill>
-        <p:spPr>
-          <a:xfrm>
-            <a:off x="4119596" y="1782057"/>
-            <a:ext cx="3657600" cy="3657600"/>
-          </a:xfrm>
-          <a:prstGeom prst="rect">
-            <a:avLst/>
-          </a:prstGeom>
-        </p:spPr>
-      </p:pic>
+        <p:txBody>
+          <a:bodyPr wrap="square" rtlCol="0">
+            <a:spAutoFit/>
+          </a:bodyPr>
+          <a:lstStyle/>
+          <a:p>
+            <a:r>
+              <a:rPr lang="en-US" sz="7200" dirty="0"/>
+              <a:t>UPDATE</a:t>
+            </a:r>
+          </a:p>
+        </p:txBody>
+      </p:sp>
     </p:spTree>
     <p:extLst>
       <p:ext uri="{BB962C8B-B14F-4D97-AF65-F5344CB8AC3E}">
-        <p14:creationId xmlns:p14="http://schemas.microsoft.com/office/powerpoint/2010/main" val="682195269"/>
+        <p14:creationId xmlns:p14="http://schemas.microsoft.com/office/powerpoint/2010/main" val="3181378257"/>
       </p:ext>
     </p:extLst>
   </p:cSld>
@@ -4183,6 +4490,1246 @@
       </p:grpSpPr>
       <p:sp>
         <p:nvSpPr>
+          <p:cNvPr id="2" name="Title 1">
+            <a:extLst>
+              <a:ext uri="{FF2B5EF4-FFF2-40B4-BE49-F238E27FC236}">
+                <a16:creationId xmlns:a16="http://schemas.microsoft.com/office/drawing/2014/main" id="{C60C9FC5-B5D5-E232-2B47-446FDCCFD8C8}"/>
+              </a:ext>
+            </a:extLst>
+          </p:cNvPr>
+          <p:cNvSpPr>
+            <a:spLocks noGrp="1"/>
+          </p:cNvSpPr>
+          <p:nvPr>
+            <p:ph type="title"/>
+          </p:nvPr>
+        </p:nvSpPr>
+        <p:spPr/>
+        <p:txBody>
+          <a:bodyPr/>
+          <a:lstStyle/>
+          <a:p>
+            <a:r>
+              <a:rPr lang="en-US" dirty="0"/>
+              <a:t>Agenda</a:t>
+            </a:r>
+          </a:p>
+        </p:txBody>
+      </p:sp>
+      <p:sp>
+        <p:nvSpPr>
+          <p:cNvPr id="4" name="Content Placeholder 2">
+            <a:extLst>
+              <a:ext uri="{FF2B5EF4-FFF2-40B4-BE49-F238E27FC236}">
+                <a16:creationId xmlns:a16="http://schemas.microsoft.com/office/drawing/2014/main" id="{EF03AFA4-BF98-E6E1-5B0F-4CF950AAA823}"/>
+              </a:ext>
+            </a:extLst>
+          </p:cNvPr>
+          <p:cNvSpPr txBox="1">
+            <a:spLocks/>
+          </p:cNvSpPr>
+          <p:nvPr/>
+        </p:nvSpPr>
+        <p:spPr>
+          <a:xfrm>
+            <a:off x="990600" y="1978025"/>
+            <a:ext cx="10515600" cy="4351338"/>
+          </a:xfrm>
+          <a:prstGeom prst="rect">
+            <a:avLst/>
+          </a:prstGeom>
+        </p:spPr>
+        <p:txBody>
+          <a:bodyPr vert="horz" lIns="91440" tIns="45720" rIns="91440" bIns="45720" rtlCol="0">
+            <a:normAutofit/>
+          </a:bodyPr>
+          <a:lstStyle>
+            <a:lvl1pPr marL="228600" indent="-228600" algn="l" defTabSz="914400" rtl="0" eaLnBrk="1" latinLnBrk="0" hangingPunct="1">
+              <a:lnSpc>
+                <a:spcPct val="90000"/>
+              </a:lnSpc>
+              <a:spcBef>
+                <a:spcPts val="1800"/>
+              </a:spcBef>
+              <a:buClr>
+                <a:schemeClr val="accent1"/>
+              </a:buClr>
+              <a:buFont typeface="Arial" panose="020B0604020202020204" pitchFamily="34" charset="0"/>
+              <a:buChar char="•"/>
+              <a:defRPr sz="2000" kern="1200">
+                <a:solidFill>
+                  <a:schemeClr val="tx1"/>
+                </a:solidFill>
+                <a:latin typeface="+mn-lt"/>
+                <a:ea typeface="+mn-ea"/>
+                <a:cs typeface="+mn-cs"/>
+              </a:defRPr>
+            </a:lvl1pPr>
+            <a:lvl2pPr marL="457200" indent="-228600" algn="l" defTabSz="914400" rtl="0" eaLnBrk="1" latinLnBrk="0" hangingPunct="1">
+              <a:lnSpc>
+                <a:spcPct val="90000"/>
+              </a:lnSpc>
+              <a:spcBef>
+                <a:spcPts val="1000"/>
+              </a:spcBef>
+              <a:buClr>
+                <a:schemeClr val="accent1"/>
+              </a:buClr>
+              <a:buFont typeface="Arial" panose="020B0604020202020204" pitchFamily="34" charset="0"/>
+              <a:buChar char="•"/>
+              <a:defRPr sz="1800" kern="1200">
+                <a:solidFill>
+                  <a:schemeClr val="tx1"/>
+                </a:solidFill>
+                <a:latin typeface="+mn-lt"/>
+                <a:ea typeface="+mn-ea"/>
+                <a:cs typeface="+mn-cs"/>
+              </a:defRPr>
+            </a:lvl2pPr>
+            <a:lvl3pPr marL="685800" indent="-182880" algn="l" defTabSz="914400" rtl="0" eaLnBrk="1" latinLnBrk="0" hangingPunct="1">
+              <a:lnSpc>
+                <a:spcPct val="90000"/>
+              </a:lnSpc>
+              <a:spcBef>
+                <a:spcPts val="800"/>
+              </a:spcBef>
+              <a:buClr>
+                <a:schemeClr val="accent1"/>
+              </a:buClr>
+              <a:buFont typeface="Arial" panose="020B0604020202020204" pitchFamily="34" charset="0"/>
+              <a:buChar char="•"/>
+              <a:defRPr sz="1600" kern="1200">
+                <a:solidFill>
+                  <a:schemeClr val="tx1"/>
+                </a:solidFill>
+                <a:latin typeface="+mn-lt"/>
+                <a:ea typeface="+mn-ea"/>
+                <a:cs typeface="+mn-cs"/>
+              </a:defRPr>
+            </a:lvl3pPr>
+            <a:lvl4pPr marL="914400" indent="-182880" algn="l" defTabSz="914400" rtl="0" eaLnBrk="1" latinLnBrk="0" hangingPunct="1">
+              <a:lnSpc>
+                <a:spcPct val="90000"/>
+              </a:lnSpc>
+              <a:spcBef>
+                <a:spcPts val="800"/>
+              </a:spcBef>
+              <a:buClr>
+                <a:schemeClr val="accent1"/>
+              </a:buClr>
+              <a:buFont typeface="Arial" panose="020B0604020202020204" pitchFamily="34" charset="0"/>
+              <a:buChar char="•"/>
+              <a:defRPr sz="1400" kern="1200">
+                <a:solidFill>
+                  <a:schemeClr val="tx1"/>
+                </a:solidFill>
+                <a:latin typeface="+mn-lt"/>
+                <a:ea typeface="+mn-ea"/>
+                <a:cs typeface="+mn-cs"/>
+              </a:defRPr>
+            </a:lvl4pPr>
+            <a:lvl5pPr marL="1143000" indent="-182880" algn="l" defTabSz="914400" rtl="0" eaLnBrk="1" latinLnBrk="0" hangingPunct="1">
+              <a:lnSpc>
+                <a:spcPct val="90000"/>
+              </a:lnSpc>
+              <a:spcBef>
+                <a:spcPts val="800"/>
+              </a:spcBef>
+              <a:buClr>
+                <a:schemeClr val="accent1"/>
+              </a:buClr>
+              <a:buFont typeface="Arial" panose="020B0604020202020204" pitchFamily="34" charset="0"/>
+              <a:buChar char="•"/>
+              <a:defRPr sz="1400" kern="1200">
+                <a:solidFill>
+                  <a:schemeClr val="tx1"/>
+                </a:solidFill>
+                <a:latin typeface="+mn-lt"/>
+                <a:ea typeface="+mn-ea"/>
+                <a:cs typeface="+mn-cs"/>
+              </a:defRPr>
+            </a:lvl5pPr>
+            <a:lvl6pPr marL="1371600" indent="-182880" algn="l" defTabSz="914400" rtl="0" eaLnBrk="1" latinLnBrk="0" hangingPunct="1">
+              <a:lnSpc>
+                <a:spcPct val="90000"/>
+              </a:lnSpc>
+              <a:spcBef>
+                <a:spcPts val="800"/>
+              </a:spcBef>
+              <a:buClr>
+                <a:schemeClr val="accent1"/>
+              </a:buClr>
+              <a:buFont typeface="Arial" panose="020B0604020202020204" pitchFamily="34" charset="0"/>
+              <a:buChar char="•"/>
+              <a:defRPr sz="1400" kern="1200">
+                <a:solidFill>
+                  <a:schemeClr val="tx1"/>
+                </a:solidFill>
+                <a:latin typeface="+mn-lt"/>
+                <a:ea typeface="+mn-ea"/>
+                <a:cs typeface="+mn-cs"/>
+              </a:defRPr>
+            </a:lvl6pPr>
+            <a:lvl7pPr marL="1600200" indent="-182880" algn="l" defTabSz="914400" rtl="0" eaLnBrk="1" latinLnBrk="0" hangingPunct="1">
+              <a:lnSpc>
+                <a:spcPct val="90000"/>
+              </a:lnSpc>
+              <a:spcBef>
+                <a:spcPts val="800"/>
+              </a:spcBef>
+              <a:buClr>
+                <a:schemeClr val="accent1"/>
+              </a:buClr>
+              <a:buFont typeface="Arial" panose="020B0604020202020204" pitchFamily="34" charset="0"/>
+              <a:buChar char="•"/>
+              <a:defRPr sz="1400" kern="1200">
+                <a:solidFill>
+                  <a:schemeClr val="tx1"/>
+                </a:solidFill>
+                <a:latin typeface="+mn-lt"/>
+                <a:ea typeface="+mn-ea"/>
+                <a:cs typeface="+mn-cs"/>
+              </a:defRPr>
+            </a:lvl7pPr>
+            <a:lvl8pPr marL="1828800" indent="-182880" algn="l" defTabSz="914400" rtl="0" eaLnBrk="1" latinLnBrk="0" hangingPunct="1">
+              <a:lnSpc>
+                <a:spcPct val="90000"/>
+              </a:lnSpc>
+              <a:spcBef>
+                <a:spcPts val="800"/>
+              </a:spcBef>
+              <a:buClr>
+                <a:schemeClr val="accent1"/>
+              </a:buClr>
+              <a:buFont typeface="Arial" panose="020B0604020202020204" pitchFamily="34" charset="0"/>
+              <a:buChar char="•"/>
+              <a:defRPr sz="1400" kern="1200">
+                <a:solidFill>
+                  <a:schemeClr val="tx1"/>
+                </a:solidFill>
+                <a:latin typeface="+mn-lt"/>
+                <a:ea typeface="+mn-ea"/>
+                <a:cs typeface="+mn-cs"/>
+              </a:defRPr>
+            </a:lvl8pPr>
+            <a:lvl9pPr marL="2057400" indent="-182880" algn="l" defTabSz="914400" rtl="0" eaLnBrk="1" latinLnBrk="0" hangingPunct="1">
+              <a:lnSpc>
+                <a:spcPct val="90000"/>
+              </a:lnSpc>
+              <a:spcBef>
+                <a:spcPts val="800"/>
+              </a:spcBef>
+              <a:buClr>
+                <a:schemeClr val="accent1"/>
+              </a:buClr>
+              <a:buFont typeface="Arial" panose="020B0604020202020204" pitchFamily="34" charset="0"/>
+              <a:buChar char="•"/>
+              <a:defRPr sz="1400" kern="1200">
+                <a:solidFill>
+                  <a:schemeClr val="tx1"/>
+                </a:solidFill>
+                <a:latin typeface="+mn-lt"/>
+                <a:ea typeface="+mn-ea"/>
+                <a:cs typeface="+mn-cs"/>
+              </a:defRPr>
+            </a:lvl9pPr>
+          </a:lstStyle>
+          <a:p>
+            <a:r>
+              <a:rPr lang="en-US"/>
+              <a:t>Most popular content creators</a:t>
+            </a:r>
+          </a:p>
+          <a:p>
+            <a:r>
+              <a:rPr lang="en-US"/>
+              <a:t>Analysis by video category</a:t>
+            </a:r>
+          </a:p>
+          <a:p>
+            <a:pPr lvl="1"/>
+            <a:r>
+              <a:rPr lang="en-US"/>
+              <a:t>Most viewed</a:t>
+            </a:r>
+          </a:p>
+          <a:p>
+            <a:pPr lvl="1"/>
+            <a:r>
+              <a:rPr lang="en-US"/>
+              <a:t>Most commented</a:t>
+            </a:r>
+          </a:p>
+          <a:p>
+            <a:r>
+              <a:rPr lang="en-US"/>
+              <a:t>Timeline between publication and trending status</a:t>
+            </a:r>
+          </a:p>
+          <a:p>
+            <a:pPr marL="0" indent="0">
+              <a:buFont typeface="Arial" panose="020B0604020202020204" pitchFamily="34" charset="0"/>
+              <a:buNone/>
+            </a:pPr>
+            <a:endParaRPr lang="en-US"/>
+          </a:p>
+          <a:p>
+            <a:endParaRPr lang="en-US"/>
+          </a:p>
+          <a:p>
+            <a:pPr marL="0" indent="0">
+              <a:buFont typeface="Arial" panose="020B0604020202020204" pitchFamily="34" charset="0"/>
+              <a:buNone/>
+            </a:pPr>
+            <a:endParaRPr lang="en-US" dirty="0"/>
+          </a:p>
+        </p:txBody>
+      </p:sp>
+      <p:sp>
+        <p:nvSpPr>
+          <p:cNvPr id="5" name="TextBox 4">
+            <a:extLst>
+              <a:ext uri="{FF2B5EF4-FFF2-40B4-BE49-F238E27FC236}">
+                <a16:creationId xmlns:a16="http://schemas.microsoft.com/office/drawing/2014/main" id="{A8B4C3B4-D262-4FF2-3AE0-F5365A212DA8}"/>
+              </a:ext>
+            </a:extLst>
+          </p:cNvPr>
+          <p:cNvSpPr txBox="1"/>
+          <p:nvPr/>
+        </p:nvSpPr>
+        <p:spPr>
+          <a:xfrm>
+            <a:off x="2514600" y="1676400"/>
+            <a:ext cx="8229600" cy="1200329"/>
+          </a:xfrm>
+          <a:prstGeom prst="rect">
+            <a:avLst/>
+          </a:prstGeom>
+          <a:noFill/>
+        </p:spPr>
+        <p:txBody>
+          <a:bodyPr wrap="square" rtlCol="0">
+            <a:spAutoFit/>
+          </a:bodyPr>
+          <a:lstStyle/>
+          <a:p>
+            <a:r>
+              <a:rPr lang="en-US" sz="7200" dirty="0"/>
+              <a:t>UPDATE</a:t>
+            </a:r>
+          </a:p>
+        </p:txBody>
+      </p:sp>
+    </p:spTree>
+    <p:extLst>
+      <p:ext uri="{BB962C8B-B14F-4D97-AF65-F5344CB8AC3E}">
+        <p14:creationId xmlns:p14="http://schemas.microsoft.com/office/powerpoint/2010/main" val="3987091705"/>
+      </p:ext>
+    </p:extLst>
+  </p:cSld>
+  <p:clrMapOvr>
+    <a:masterClrMapping/>
+  </p:clrMapOvr>
+  <mc:AlternateContent xmlns:mc="http://schemas.openxmlformats.org/markup-compatibility/2006" xmlns:p14="http://schemas.microsoft.com/office/powerpoint/2010/main">
+    <mc:Choice Requires="p14">
+      <p:transition spd="med" p14:dur="700">
+        <p:fade/>
+      </p:transition>
+    </mc:Choice>
+    <mc:Fallback xmlns="">
+      <p:transition spd="med">
+        <p:fade/>
+      </p:transition>
+    </mc:Fallback>
+  </mc:AlternateContent>
+</p:sld>
+</file>
+
+<file path=ppt/slides/slide4.xml><?xml version="1.0" encoding="utf-8"?>
+<p:sld xmlns:a="http://schemas.openxmlformats.org/drawingml/2006/main" xmlns:r="http://schemas.openxmlformats.org/officeDocument/2006/relationships" xmlns:p="http://schemas.openxmlformats.org/presentationml/2006/main">
+  <p:cSld>
+    <p:spTree>
+      <p:nvGrpSpPr>
+        <p:cNvPr id="1" name=""/>
+        <p:cNvGrpSpPr/>
+        <p:nvPr/>
+      </p:nvGrpSpPr>
+      <p:grpSpPr>
+        <a:xfrm>
+          <a:off x="0" y="0"/>
+          <a:ext cx="0" cy="0"/>
+          <a:chOff x="0" y="0"/>
+          <a:chExt cx="0" cy="0"/>
+        </a:xfrm>
+      </p:grpSpPr>
+      <p:sp>
+        <p:nvSpPr>
+          <p:cNvPr id="2" name="Title 1">
+            <a:extLst>
+              <a:ext uri="{FF2B5EF4-FFF2-40B4-BE49-F238E27FC236}">
+                <a16:creationId xmlns:a16="http://schemas.microsoft.com/office/drawing/2014/main" id="{C6E4FF33-7759-EC24-FA86-F5440707CA79}"/>
+              </a:ext>
+            </a:extLst>
+          </p:cNvPr>
+          <p:cNvSpPr>
+            <a:spLocks noGrp="1"/>
+          </p:cNvSpPr>
+          <p:nvPr>
+            <p:ph type="title"/>
+          </p:nvPr>
+        </p:nvSpPr>
+        <p:spPr>
+          <a:xfrm>
+            <a:off x="640773" y="195986"/>
+            <a:ext cx="10515600" cy="1325563"/>
+          </a:xfrm>
+        </p:spPr>
+        <p:txBody>
+          <a:bodyPr/>
+          <a:lstStyle/>
+          <a:p>
+            <a:r>
+              <a:rPr lang="en-US" dirty="0"/>
+              <a:t>Data of Interest</a:t>
+            </a:r>
+          </a:p>
+        </p:txBody>
+      </p:sp>
+      <p:sp>
+        <p:nvSpPr>
+          <p:cNvPr id="3" name="Content Placeholder 2">
+            <a:extLst>
+              <a:ext uri="{FF2B5EF4-FFF2-40B4-BE49-F238E27FC236}">
+                <a16:creationId xmlns:a16="http://schemas.microsoft.com/office/drawing/2014/main" id="{4C2BCA67-33F1-BECB-6FF6-F8CB2996A427}"/>
+              </a:ext>
+            </a:extLst>
+          </p:cNvPr>
+          <p:cNvSpPr>
+            <a:spLocks noGrp="1"/>
+          </p:cNvSpPr>
+          <p:nvPr>
+            <p:ph idx="1"/>
+          </p:nvPr>
+        </p:nvSpPr>
+        <p:spPr>
+          <a:xfrm>
+            <a:off x="370609" y="1358034"/>
+            <a:ext cx="10515600" cy="4351338"/>
+          </a:xfrm>
+        </p:spPr>
+        <p:txBody>
+          <a:bodyPr/>
+          <a:lstStyle/>
+          <a:p>
+            <a:r>
+              <a:rPr lang="en-US" dirty="0"/>
+              <a:t>Channel name</a:t>
+            </a:r>
+          </a:p>
+          <a:p>
+            <a:r>
+              <a:rPr lang="en-US" dirty="0"/>
+              <a:t>Trending date</a:t>
+            </a:r>
+          </a:p>
+          <a:p>
+            <a:r>
+              <a:rPr lang="en-US" dirty="0"/>
+              <a:t>Publish time</a:t>
+            </a:r>
+          </a:p>
+          <a:p>
+            <a:r>
+              <a:rPr lang="en-US" dirty="0"/>
+              <a:t>Views</a:t>
+            </a:r>
+          </a:p>
+          <a:p>
+            <a:r>
+              <a:rPr lang="en-US" dirty="0"/>
+              <a:t>Comment count</a:t>
+            </a:r>
+          </a:p>
+          <a:p>
+            <a:r>
+              <a:rPr lang="en-US" dirty="0"/>
+              <a:t>Video Id</a:t>
+            </a:r>
+          </a:p>
+          <a:p>
+            <a:r>
+              <a:rPr lang="en-US" dirty="0"/>
+              <a:t>Category </a:t>
+            </a:r>
+          </a:p>
+        </p:txBody>
+      </p:sp>
+      <p:grpSp>
+        <p:nvGrpSpPr>
+          <p:cNvPr id="4" name="Group 3">
+            <a:extLst>
+              <a:ext uri="{FF2B5EF4-FFF2-40B4-BE49-F238E27FC236}">
+                <a16:creationId xmlns:a16="http://schemas.microsoft.com/office/drawing/2014/main" id="{4A63A429-1917-3EEF-F56E-16779D7CAB1F}"/>
+              </a:ext>
+            </a:extLst>
+          </p:cNvPr>
+          <p:cNvGrpSpPr/>
+          <p:nvPr/>
+        </p:nvGrpSpPr>
+        <p:grpSpPr>
+          <a:xfrm>
+            <a:off x="3886200" y="762000"/>
+            <a:ext cx="8132620" cy="5228359"/>
+            <a:chOff x="5104255" y="1825625"/>
+            <a:chExt cx="6249545" cy="3689125"/>
+          </a:xfrm>
+        </p:grpSpPr>
+        <p:pic>
+          <p:nvPicPr>
+            <p:cNvPr id="7" name="Picture 6">
+              <a:extLst>
+                <a:ext uri="{FF2B5EF4-FFF2-40B4-BE49-F238E27FC236}">
+                  <a16:creationId xmlns:a16="http://schemas.microsoft.com/office/drawing/2014/main" id="{872CBD46-C24B-8F44-F617-BC86E411AE5B}"/>
+                </a:ext>
+              </a:extLst>
+            </p:cNvPr>
+            <p:cNvPicPr>
+              <a:picLocks noChangeAspect="1"/>
+            </p:cNvPicPr>
+            <p:nvPr/>
+          </p:nvPicPr>
+          <p:blipFill>
+            <a:blip r:embed="rId2">
+              <a:extLst>
+                <a:ext uri="{28A0092B-C50C-407E-A947-70E740481C1C}">
+                  <a14:useLocalDpi xmlns:a14="http://schemas.microsoft.com/office/drawing/2010/main" val="0"/>
+                </a:ext>
+              </a:extLst>
+            </a:blip>
+            <a:stretch>
+              <a:fillRect/>
+            </a:stretch>
+          </p:blipFill>
+          <p:spPr>
+            <a:xfrm>
+              <a:off x="5104255" y="1825625"/>
+              <a:ext cx="6249545" cy="3689125"/>
+            </a:xfrm>
+            <a:prstGeom prst="rect">
+              <a:avLst/>
+            </a:prstGeom>
+          </p:spPr>
+        </p:pic>
+        <p:sp>
+          <p:nvSpPr>
+            <p:cNvPr id="8" name="Rectangle 7">
+              <a:extLst>
+                <a:ext uri="{FF2B5EF4-FFF2-40B4-BE49-F238E27FC236}">
+                  <a16:creationId xmlns:a16="http://schemas.microsoft.com/office/drawing/2014/main" id="{53B37133-9BA9-E94A-8ADC-3F696ED7CE97}"/>
+                </a:ext>
+              </a:extLst>
+            </p:cNvPr>
+            <p:cNvSpPr/>
+            <p:nvPr/>
+          </p:nvSpPr>
+          <p:spPr>
+            <a:xfrm>
+              <a:off x="5264209" y="1825625"/>
+              <a:ext cx="1602583" cy="3689125"/>
+            </a:xfrm>
+            <a:prstGeom prst="rect">
+              <a:avLst/>
+            </a:prstGeom>
+            <a:solidFill>
+              <a:schemeClr val="accent1">
+                <a:alpha val="30000"/>
+              </a:schemeClr>
+            </a:solidFill>
+          </p:spPr>
+          <p:style>
+            <a:lnRef idx="2">
+              <a:schemeClr val="accent1">
+                <a:shade val="15000"/>
+              </a:schemeClr>
+            </a:lnRef>
+            <a:fillRef idx="1">
+              <a:schemeClr val="accent1"/>
+            </a:fillRef>
+            <a:effectRef idx="0">
+              <a:schemeClr val="accent1"/>
+            </a:effectRef>
+            <a:fontRef idx="minor">
+              <a:schemeClr val="lt1"/>
+            </a:fontRef>
+          </p:style>
+          <p:txBody>
+            <a:bodyPr rtlCol="0" anchor="ctr"/>
+            <a:lstStyle/>
+            <a:p>
+              <a:pPr algn="ctr"/>
+              <a:endParaRPr lang="en-US"/>
+            </a:p>
+          </p:txBody>
+        </p:sp>
+        <p:sp>
+          <p:nvSpPr>
+            <p:cNvPr id="9" name="Rectangle 8">
+              <a:extLst>
+                <a:ext uri="{FF2B5EF4-FFF2-40B4-BE49-F238E27FC236}">
+                  <a16:creationId xmlns:a16="http://schemas.microsoft.com/office/drawing/2014/main" id="{4FDA7B98-96E1-6683-BEB7-73C8BCAE1E0F}"/>
+                </a:ext>
+              </a:extLst>
+            </p:cNvPr>
+            <p:cNvSpPr/>
+            <p:nvPr/>
+          </p:nvSpPr>
+          <p:spPr>
+            <a:xfrm>
+              <a:off x="7940002" y="1825625"/>
+              <a:ext cx="263222" cy="3689125"/>
+            </a:xfrm>
+            <a:prstGeom prst="rect">
+              <a:avLst/>
+            </a:prstGeom>
+            <a:solidFill>
+              <a:schemeClr val="accent1">
+                <a:alpha val="30000"/>
+              </a:schemeClr>
+            </a:solidFill>
+          </p:spPr>
+          <p:style>
+            <a:lnRef idx="2">
+              <a:schemeClr val="accent1">
+                <a:shade val="15000"/>
+              </a:schemeClr>
+            </a:lnRef>
+            <a:fillRef idx="1">
+              <a:schemeClr val="accent1"/>
+            </a:fillRef>
+            <a:effectRef idx="0">
+              <a:schemeClr val="accent1"/>
+            </a:effectRef>
+            <a:fontRef idx="minor">
+              <a:schemeClr val="lt1"/>
+            </a:fontRef>
+          </p:style>
+          <p:txBody>
+            <a:bodyPr rtlCol="0" anchor="ctr"/>
+            <a:lstStyle/>
+            <a:p>
+              <a:pPr algn="ctr"/>
+              <a:endParaRPr lang="en-US"/>
+            </a:p>
+          </p:txBody>
+        </p:sp>
+      </p:grpSp>
+      <p:sp>
+        <p:nvSpPr>
+          <p:cNvPr id="5" name="TextBox 4">
+            <a:extLst>
+              <a:ext uri="{FF2B5EF4-FFF2-40B4-BE49-F238E27FC236}">
+                <a16:creationId xmlns:a16="http://schemas.microsoft.com/office/drawing/2014/main" id="{75B490BA-2504-277B-6923-05C81DEED74E}"/>
+              </a:ext>
+            </a:extLst>
+          </p:cNvPr>
+          <p:cNvSpPr txBox="1"/>
+          <p:nvPr/>
+        </p:nvSpPr>
+        <p:spPr>
+          <a:xfrm>
+            <a:off x="1513609" y="4049372"/>
+            <a:ext cx="8229600" cy="1200329"/>
+          </a:xfrm>
+          <a:prstGeom prst="rect">
+            <a:avLst/>
+          </a:prstGeom>
+          <a:noFill/>
+        </p:spPr>
+        <p:txBody>
+          <a:bodyPr wrap="square" rtlCol="0">
+            <a:spAutoFit/>
+          </a:bodyPr>
+          <a:lstStyle/>
+          <a:p>
+            <a:r>
+              <a:rPr lang="en-US" sz="7200" dirty="0"/>
+              <a:t>UPDATE</a:t>
+            </a:r>
+          </a:p>
+        </p:txBody>
+      </p:sp>
+    </p:spTree>
+    <p:extLst>
+      <p:ext uri="{BB962C8B-B14F-4D97-AF65-F5344CB8AC3E}">
+        <p14:creationId xmlns:p14="http://schemas.microsoft.com/office/powerpoint/2010/main" val="1373104945"/>
+      </p:ext>
+    </p:extLst>
+  </p:cSld>
+  <p:clrMapOvr>
+    <a:masterClrMapping/>
+  </p:clrMapOvr>
+  <mc:AlternateContent xmlns:mc="http://schemas.openxmlformats.org/markup-compatibility/2006" xmlns:p14="http://schemas.microsoft.com/office/powerpoint/2010/main">
+    <mc:Choice Requires="p14">
+      <p:transition spd="med" p14:dur="700">
+        <p:fade/>
+      </p:transition>
+    </mc:Choice>
+    <mc:Fallback xmlns="">
+      <p:transition spd="med">
+        <p:fade/>
+      </p:transition>
+    </mc:Fallback>
+  </mc:AlternateContent>
+</p:sld>
+</file>
+
+<file path=ppt/slides/slide5.xml><?xml version="1.0" encoding="utf-8"?>
+<p:sld xmlns:a="http://schemas.openxmlformats.org/drawingml/2006/main" xmlns:r="http://schemas.openxmlformats.org/officeDocument/2006/relationships" xmlns:p="http://schemas.openxmlformats.org/presentationml/2006/main">
+  <p:cSld>
+    <p:spTree>
+      <p:nvGrpSpPr>
+        <p:cNvPr id="1" name=""/>
+        <p:cNvGrpSpPr/>
+        <p:nvPr/>
+      </p:nvGrpSpPr>
+      <p:grpSpPr>
+        <a:xfrm>
+          <a:off x="0" y="0"/>
+          <a:ext cx="0" cy="0"/>
+          <a:chOff x="0" y="0"/>
+          <a:chExt cx="0" cy="0"/>
+        </a:xfrm>
+      </p:grpSpPr>
+      <p:sp>
+        <p:nvSpPr>
+          <p:cNvPr id="2" name="Title 1">
+            <a:extLst>
+              <a:ext uri="{FF2B5EF4-FFF2-40B4-BE49-F238E27FC236}">
+                <a16:creationId xmlns:a16="http://schemas.microsoft.com/office/drawing/2014/main" id="{9139F471-CE0F-E83D-9D1E-3F11E509C543}"/>
+              </a:ext>
+            </a:extLst>
+          </p:cNvPr>
+          <p:cNvSpPr>
+            <a:spLocks noGrp="1"/>
+          </p:cNvSpPr>
+          <p:nvPr>
+            <p:ph type="title"/>
+          </p:nvPr>
+        </p:nvSpPr>
+        <p:spPr/>
+        <p:txBody>
+          <a:bodyPr/>
+          <a:lstStyle/>
+          <a:p>
+            <a:r>
+              <a:rPr lang="en-US" dirty="0"/>
+              <a:t>Data Cleaning</a:t>
+            </a:r>
+          </a:p>
+        </p:txBody>
+      </p:sp>
+      <p:sp>
+        <p:nvSpPr>
+          <p:cNvPr id="3" name="Content Placeholder 2">
+            <a:extLst>
+              <a:ext uri="{FF2B5EF4-FFF2-40B4-BE49-F238E27FC236}">
+                <a16:creationId xmlns:a16="http://schemas.microsoft.com/office/drawing/2014/main" id="{FC94F795-2A2D-F82F-AC6F-4612AB182093}"/>
+              </a:ext>
+            </a:extLst>
+          </p:cNvPr>
+          <p:cNvSpPr>
+            <a:spLocks noGrp="1"/>
+          </p:cNvSpPr>
+          <p:nvPr>
+            <p:ph idx="1"/>
+          </p:nvPr>
+        </p:nvSpPr>
+        <p:spPr/>
+        <p:txBody>
+          <a:bodyPr/>
+          <a:lstStyle/>
+          <a:p>
+            <a:r>
+              <a:rPr lang="en-US" dirty="0"/>
+              <a:t>Duplicate data</a:t>
+            </a:r>
+          </a:p>
+          <a:p>
+            <a:r>
+              <a:rPr lang="en-US" dirty="0"/>
+              <a:t>Time formatting consistency</a:t>
+            </a:r>
+          </a:p>
+          <a:p>
+            <a:pPr lvl="1"/>
+            <a:r>
+              <a:rPr lang="en-US" dirty="0"/>
+              <a:t>Converting time to integers</a:t>
+            </a:r>
+          </a:p>
+          <a:p>
+            <a:pPr lvl="1"/>
+            <a:r>
+              <a:rPr lang="en-US" dirty="0"/>
+              <a:t>Date/time formatting</a:t>
+            </a:r>
+          </a:p>
+          <a:p>
+            <a:r>
+              <a:rPr lang="en-US" dirty="0"/>
+              <a:t>Removing outliers</a:t>
+            </a:r>
+          </a:p>
+          <a:p>
+            <a:r>
+              <a:rPr lang="en-US" dirty="0"/>
+              <a:t>Visual clarity on category ids</a:t>
+            </a:r>
+          </a:p>
+        </p:txBody>
+      </p:sp>
+      <p:sp>
+        <p:nvSpPr>
+          <p:cNvPr id="4" name="TextBox 3">
+            <a:extLst>
+              <a:ext uri="{FF2B5EF4-FFF2-40B4-BE49-F238E27FC236}">
+                <a16:creationId xmlns:a16="http://schemas.microsoft.com/office/drawing/2014/main" id="{83419B16-88B0-C31E-1B69-1569A89DF86B}"/>
+              </a:ext>
+            </a:extLst>
+          </p:cNvPr>
+          <p:cNvSpPr txBox="1"/>
+          <p:nvPr/>
+        </p:nvSpPr>
+        <p:spPr>
+          <a:xfrm>
+            <a:off x="1513609" y="4049372"/>
+            <a:ext cx="8229600" cy="1200329"/>
+          </a:xfrm>
+          <a:prstGeom prst="rect">
+            <a:avLst/>
+          </a:prstGeom>
+          <a:noFill/>
+        </p:spPr>
+        <p:txBody>
+          <a:bodyPr wrap="square" rtlCol="0">
+            <a:spAutoFit/>
+          </a:bodyPr>
+          <a:lstStyle/>
+          <a:p>
+            <a:r>
+              <a:rPr lang="en-US" sz="7200" dirty="0"/>
+              <a:t>UPDATE</a:t>
+            </a:r>
+          </a:p>
+        </p:txBody>
+      </p:sp>
+    </p:spTree>
+    <p:extLst>
+      <p:ext uri="{BB962C8B-B14F-4D97-AF65-F5344CB8AC3E}">
+        <p14:creationId xmlns:p14="http://schemas.microsoft.com/office/powerpoint/2010/main" val="1644278326"/>
+      </p:ext>
+    </p:extLst>
+  </p:cSld>
+  <p:clrMapOvr>
+    <a:masterClrMapping/>
+  </p:clrMapOvr>
+  <mc:AlternateContent xmlns:mc="http://schemas.openxmlformats.org/markup-compatibility/2006" xmlns:p14="http://schemas.microsoft.com/office/powerpoint/2010/main">
+    <mc:Choice Requires="p14">
+      <p:transition spd="med" p14:dur="700">
+        <p:fade/>
+      </p:transition>
+    </mc:Choice>
+    <mc:Fallback xmlns="">
+      <p:transition spd="med">
+        <p:fade/>
+      </p:transition>
+    </mc:Fallback>
+  </mc:AlternateContent>
+</p:sld>
+</file>
+
+<file path=ppt/slides/slide6.xml><?xml version="1.0" encoding="utf-8"?>
+<p:sld xmlns:a="http://schemas.openxmlformats.org/drawingml/2006/main" xmlns:r="http://schemas.openxmlformats.org/officeDocument/2006/relationships" xmlns:p="http://schemas.openxmlformats.org/presentationml/2006/main">
+  <p:cSld>
+    <p:spTree>
+      <p:nvGrpSpPr>
+        <p:cNvPr id="1" name=""/>
+        <p:cNvGrpSpPr/>
+        <p:nvPr/>
+      </p:nvGrpSpPr>
+      <p:grpSpPr>
+        <a:xfrm>
+          <a:off x="0" y="0"/>
+          <a:ext cx="0" cy="0"/>
+          <a:chOff x="0" y="0"/>
+          <a:chExt cx="0" cy="0"/>
+        </a:xfrm>
+      </p:grpSpPr>
+      <p:sp>
+        <p:nvSpPr>
+          <p:cNvPr id="2" name="Title 1"/>
+          <p:cNvSpPr>
+            <a:spLocks noGrp="1"/>
+          </p:cNvSpPr>
+          <p:nvPr>
+            <p:ph type="title"/>
+          </p:nvPr>
+        </p:nvSpPr>
+        <p:spPr/>
+        <p:txBody>
+          <a:bodyPr/>
+          <a:lstStyle/>
+          <a:p>
+            <a:r>
+              <a:rPr lang="en-US" dirty="0"/>
+              <a:t>Comparison by Industry:</a:t>
+            </a:r>
+            <a:br>
+              <a:rPr lang="en-US" dirty="0"/>
+            </a:br>
+            <a:r>
+              <a:rPr lang="en-US" dirty="0"/>
+              <a:t>	</a:t>
+            </a:r>
+            <a:r>
+              <a:rPr lang="en-US" sz="2800" dirty="0"/>
+              <a:t>Biggest Six Industries</a:t>
+            </a:r>
+            <a:endParaRPr lang="en-US" dirty="0"/>
+          </a:p>
+        </p:txBody>
+      </p:sp>
+      <p:pic>
+        <p:nvPicPr>
+          <p:cNvPr id="11" name="Picture 10">
+            <a:extLst>
+              <a:ext uri="{FF2B5EF4-FFF2-40B4-BE49-F238E27FC236}">
+                <a16:creationId xmlns:a16="http://schemas.microsoft.com/office/drawing/2014/main" id="{8249EE3E-6619-6F86-32CF-A5C7189B3BD9}"/>
+              </a:ext>
+            </a:extLst>
+          </p:cNvPr>
+          <p:cNvPicPr preferRelativeResize="0">
+            <a:picLocks/>
+          </p:cNvPicPr>
+          <p:nvPr/>
+        </p:nvPicPr>
+        <p:blipFill>
+          <a:blip r:embed="rId2"/>
+          <a:stretch>
+            <a:fillRect/>
+          </a:stretch>
+        </p:blipFill>
+        <p:spPr>
+          <a:xfrm>
+            <a:off x="1447800" y="1771650"/>
+            <a:ext cx="3657600" cy="3657600"/>
+          </a:xfrm>
+          <a:prstGeom prst="rect">
+            <a:avLst/>
+          </a:prstGeom>
+        </p:spPr>
+      </p:pic>
+      <p:pic>
+        <p:nvPicPr>
+          <p:cNvPr id="13" name="Picture 12">
+            <a:extLst>
+              <a:ext uri="{FF2B5EF4-FFF2-40B4-BE49-F238E27FC236}">
+                <a16:creationId xmlns:a16="http://schemas.microsoft.com/office/drawing/2014/main" id="{958D49A2-DA94-7CC0-A50F-A909B44C2046}"/>
+              </a:ext>
+            </a:extLst>
+          </p:cNvPr>
+          <p:cNvPicPr preferRelativeResize="0">
+            <a:picLocks/>
+          </p:cNvPicPr>
+          <p:nvPr/>
+        </p:nvPicPr>
+        <p:blipFill>
+          <a:blip r:embed="rId3"/>
+          <a:stretch>
+            <a:fillRect/>
+          </a:stretch>
+        </p:blipFill>
+        <p:spPr>
+          <a:xfrm>
+            <a:off x="6705600" y="1771650"/>
+            <a:ext cx="3657600" cy="3657600"/>
+          </a:xfrm>
+          <a:prstGeom prst="rect">
+            <a:avLst/>
+          </a:prstGeom>
+        </p:spPr>
+      </p:pic>
+      <p:sp>
+        <p:nvSpPr>
+          <p:cNvPr id="3" name="Text Placeholder 3">
+            <a:extLst>
+              <a:ext uri="{FF2B5EF4-FFF2-40B4-BE49-F238E27FC236}">
+                <a16:creationId xmlns:a16="http://schemas.microsoft.com/office/drawing/2014/main" id="{CE8AC5BF-36CB-34A3-9CD7-3C8C22B73B72}"/>
+              </a:ext>
+            </a:extLst>
+          </p:cNvPr>
+          <p:cNvSpPr txBox="1">
+            <a:spLocks/>
+          </p:cNvSpPr>
+          <p:nvPr/>
+        </p:nvSpPr>
+        <p:spPr>
+          <a:xfrm>
+            <a:off x="458440" y="5652412"/>
+            <a:ext cx="11276360" cy="748388"/>
+          </a:xfrm>
+          <a:prstGeom prst="rect">
+            <a:avLst/>
+          </a:prstGeom>
+        </p:spPr>
+        <p:txBody>
+          <a:bodyPr/>
+          <a:lstStyle>
+            <a:lvl1pPr marL="228600" indent="-228600" algn="l" defTabSz="914400" rtl="0" eaLnBrk="1" latinLnBrk="0" hangingPunct="1">
+              <a:lnSpc>
+                <a:spcPct val="90000"/>
+              </a:lnSpc>
+              <a:spcBef>
+                <a:spcPts val="1800"/>
+              </a:spcBef>
+              <a:buClr>
+                <a:schemeClr val="accent1"/>
+              </a:buClr>
+              <a:buFont typeface="Arial" panose="020B0604020202020204" pitchFamily="34" charset="0"/>
+              <a:buChar char="•"/>
+              <a:defRPr sz="2000" kern="1200">
+                <a:solidFill>
+                  <a:schemeClr val="tx1"/>
+                </a:solidFill>
+                <a:latin typeface="+mn-lt"/>
+                <a:ea typeface="+mn-ea"/>
+                <a:cs typeface="+mn-cs"/>
+              </a:defRPr>
+            </a:lvl1pPr>
+            <a:lvl2pPr marL="457200" indent="-228600" algn="l" defTabSz="914400" rtl="0" eaLnBrk="1" latinLnBrk="0" hangingPunct="1">
+              <a:lnSpc>
+                <a:spcPct val="90000"/>
+              </a:lnSpc>
+              <a:spcBef>
+                <a:spcPts val="1000"/>
+              </a:spcBef>
+              <a:buClr>
+                <a:schemeClr val="accent1"/>
+              </a:buClr>
+              <a:buFont typeface="Arial" panose="020B0604020202020204" pitchFamily="34" charset="0"/>
+              <a:buChar char="•"/>
+              <a:defRPr sz="1800" kern="1200">
+                <a:solidFill>
+                  <a:schemeClr val="tx1"/>
+                </a:solidFill>
+                <a:latin typeface="+mn-lt"/>
+                <a:ea typeface="+mn-ea"/>
+                <a:cs typeface="+mn-cs"/>
+              </a:defRPr>
+            </a:lvl2pPr>
+            <a:lvl3pPr marL="685800" indent="-182880" algn="l" defTabSz="914400" rtl="0" eaLnBrk="1" latinLnBrk="0" hangingPunct="1">
+              <a:lnSpc>
+                <a:spcPct val="90000"/>
+              </a:lnSpc>
+              <a:spcBef>
+                <a:spcPts val="800"/>
+              </a:spcBef>
+              <a:buClr>
+                <a:schemeClr val="accent1"/>
+              </a:buClr>
+              <a:buFont typeface="Arial" panose="020B0604020202020204" pitchFamily="34" charset="0"/>
+              <a:buChar char="•"/>
+              <a:defRPr sz="1600" kern="1200">
+                <a:solidFill>
+                  <a:schemeClr val="tx1"/>
+                </a:solidFill>
+                <a:latin typeface="+mn-lt"/>
+                <a:ea typeface="+mn-ea"/>
+                <a:cs typeface="+mn-cs"/>
+              </a:defRPr>
+            </a:lvl3pPr>
+            <a:lvl4pPr marL="914400" indent="-182880" algn="l" defTabSz="914400" rtl="0" eaLnBrk="1" latinLnBrk="0" hangingPunct="1">
+              <a:lnSpc>
+                <a:spcPct val="90000"/>
+              </a:lnSpc>
+              <a:spcBef>
+                <a:spcPts val="800"/>
+              </a:spcBef>
+              <a:buClr>
+                <a:schemeClr val="accent1"/>
+              </a:buClr>
+              <a:buFont typeface="Arial" panose="020B0604020202020204" pitchFamily="34" charset="0"/>
+              <a:buChar char="•"/>
+              <a:defRPr sz="1400" kern="1200">
+                <a:solidFill>
+                  <a:schemeClr val="tx1"/>
+                </a:solidFill>
+                <a:latin typeface="+mn-lt"/>
+                <a:ea typeface="+mn-ea"/>
+                <a:cs typeface="+mn-cs"/>
+              </a:defRPr>
+            </a:lvl4pPr>
+            <a:lvl5pPr marL="1143000" indent="-182880" algn="l" defTabSz="914400" rtl="0" eaLnBrk="1" latinLnBrk="0" hangingPunct="1">
+              <a:lnSpc>
+                <a:spcPct val="90000"/>
+              </a:lnSpc>
+              <a:spcBef>
+                <a:spcPts val="800"/>
+              </a:spcBef>
+              <a:buClr>
+                <a:schemeClr val="accent1"/>
+              </a:buClr>
+              <a:buFont typeface="Arial" panose="020B0604020202020204" pitchFamily="34" charset="0"/>
+              <a:buChar char="•"/>
+              <a:defRPr sz="1400" kern="1200">
+                <a:solidFill>
+                  <a:schemeClr val="tx1"/>
+                </a:solidFill>
+                <a:latin typeface="+mn-lt"/>
+                <a:ea typeface="+mn-ea"/>
+                <a:cs typeface="+mn-cs"/>
+              </a:defRPr>
+            </a:lvl5pPr>
+            <a:lvl6pPr marL="1371600" indent="-182880" algn="l" defTabSz="914400" rtl="0" eaLnBrk="1" latinLnBrk="0" hangingPunct="1">
+              <a:lnSpc>
+                <a:spcPct val="90000"/>
+              </a:lnSpc>
+              <a:spcBef>
+                <a:spcPts val="800"/>
+              </a:spcBef>
+              <a:buClr>
+                <a:schemeClr val="accent1"/>
+              </a:buClr>
+              <a:buFont typeface="Arial" panose="020B0604020202020204" pitchFamily="34" charset="0"/>
+              <a:buChar char="•"/>
+              <a:defRPr sz="1400" kern="1200">
+                <a:solidFill>
+                  <a:schemeClr val="tx1"/>
+                </a:solidFill>
+                <a:latin typeface="+mn-lt"/>
+                <a:ea typeface="+mn-ea"/>
+                <a:cs typeface="+mn-cs"/>
+              </a:defRPr>
+            </a:lvl6pPr>
+            <a:lvl7pPr marL="1600200" indent="-182880" algn="l" defTabSz="914400" rtl="0" eaLnBrk="1" latinLnBrk="0" hangingPunct="1">
+              <a:lnSpc>
+                <a:spcPct val="90000"/>
+              </a:lnSpc>
+              <a:spcBef>
+                <a:spcPts val="800"/>
+              </a:spcBef>
+              <a:buClr>
+                <a:schemeClr val="accent1"/>
+              </a:buClr>
+              <a:buFont typeface="Arial" panose="020B0604020202020204" pitchFamily="34" charset="0"/>
+              <a:buChar char="•"/>
+              <a:defRPr sz="1400" kern="1200">
+                <a:solidFill>
+                  <a:schemeClr val="tx1"/>
+                </a:solidFill>
+                <a:latin typeface="+mn-lt"/>
+                <a:ea typeface="+mn-ea"/>
+                <a:cs typeface="+mn-cs"/>
+              </a:defRPr>
+            </a:lvl7pPr>
+            <a:lvl8pPr marL="1828800" indent="-182880" algn="l" defTabSz="914400" rtl="0" eaLnBrk="1" latinLnBrk="0" hangingPunct="1">
+              <a:lnSpc>
+                <a:spcPct val="90000"/>
+              </a:lnSpc>
+              <a:spcBef>
+                <a:spcPts val="800"/>
+              </a:spcBef>
+              <a:buClr>
+                <a:schemeClr val="accent1"/>
+              </a:buClr>
+              <a:buFont typeface="Arial" panose="020B0604020202020204" pitchFamily="34" charset="0"/>
+              <a:buChar char="•"/>
+              <a:defRPr sz="1400" kern="1200">
+                <a:solidFill>
+                  <a:schemeClr val="tx1"/>
+                </a:solidFill>
+                <a:latin typeface="+mn-lt"/>
+                <a:ea typeface="+mn-ea"/>
+                <a:cs typeface="+mn-cs"/>
+              </a:defRPr>
+            </a:lvl8pPr>
+            <a:lvl9pPr marL="2057400" indent="-182880" algn="l" defTabSz="914400" rtl="0" eaLnBrk="1" latinLnBrk="0" hangingPunct="1">
+              <a:lnSpc>
+                <a:spcPct val="90000"/>
+              </a:lnSpc>
+              <a:spcBef>
+                <a:spcPts val="800"/>
+              </a:spcBef>
+              <a:buClr>
+                <a:schemeClr val="accent1"/>
+              </a:buClr>
+              <a:buFont typeface="Arial" panose="020B0604020202020204" pitchFamily="34" charset="0"/>
+              <a:buChar char="•"/>
+              <a:defRPr sz="1400" kern="1200">
+                <a:solidFill>
+                  <a:schemeClr val="tx1"/>
+                </a:solidFill>
+                <a:latin typeface="+mn-lt"/>
+                <a:ea typeface="+mn-ea"/>
+                <a:cs typeface="+mn-cs"/>
+              </a:defRPr>
+            </a:lvl9pPr>
+          </a:lstStyle>
+          <a:p>
+            <a:r>
+              <a:rPr lang="en-US" dirty="0"/>
+              <a:t>Industry comparison does not show significant differences</a:t>
+            </a:r>
+          </a:p>
+          <a:p>
+            <a:endParaRPr lang="en-US" dirty="0"/>
+          </a:p>
+        </p:txBody>
+      </p:sp>
+    </p:spTree>
+    <p:extLst>
+      <p:ext uri="{BB962C8B-B14F-4D97-AF65-F5344CB8AC3E}">
+        <p14:creationId xmlns:p14="http://schemas.microsoft.com/office/powerpoint/2010/main" val="682195269"/>
+      </p:ext>
+    </p:extLst>
+  </p:cSld>
+  <p:clrMapOvr>
+    <a:masterClrMapping/>
+  </p:clrMapOvr>
+  <mc:AlternateContent xmlns:mc="http://schemas.openxmlformats.org/markup-compatibility/2006" xmlns:p14="http://schemas.microsoft.com/office/powerpoint/2010/main">
+    <mc:Choice Requires="p14">
+      <p:transition spd="med" p14:dur="700">
+        <p:fade/>
+      </p:transition>
+    </mc:Choice>
+    <mc:Fallback xmlns="">
+      <p:transition spd="med">
+        <p:fade/>
+      </p:transition>
+    </mc:Fallback>
+  </mc:AlternateContent>
+</p:sld>
+</file>
+
+<file path=ppt/slides/slide7.xml><?xml version="1.0" encoding="utf-8"?>
+<p:sld xmlns:a="http://schemas.openxmlformats.org/drawingml/2006/main" xmlns:r="http://schemas.openxmlformats.org/officeDocument/2006/relationships" xmlns:p="http://schemas.openxmlformats.org/presentationml/2006/main">
+  <p:cSld>
+    <p:spTree>
+      <p:nvGrpSpPr>
+        <p:cNvPr id="1" name=""/>
+        <p:cNvGrpSpPr/>
+        <p:nvPr/>
+      </p:nvGrpSpPr>
+      <p:grpSpPr>
+        <a:xfrm>
+          <a:off x="0" y="0"/>
+          <a:ext cx="0" cy="0"/>
+          <a:chOff x="0" y="0"/>
+          <a:chExt cx="0" cy="0"/>
+        </a:xfrm>
+      </p:grpSpPr>
+      <p:sp>
+        <p:nvSpPr>
           <p:cNvPr id="2" name="Title 1"/>
           <p:cNvSpPr>
             <a:spLocks noGrp="1"/>
@@ -4226,6 +5773,460 @@
     <p:extLst>
       <p:ext uri="{BB962C8B-B14F-4D97-AF65-F5344CB8AC3E}">
         <p14:creationId xmlns:p14="http://schemas.microsoft.com/office/powerpoint/2010/main" val="1783796071"/>
+      </p:ext>
+    </p:extLst>
+  </p:cSld>
+  <p:clrMapOvr>
+    <a:masterClrMapping/>
+  </p:clrMapOvr>
+  <mc:AlternateContent xmlns:mc="http://schemas.openxmlformats.org/markup-compatibility/2006" xmlns:p14="http://schemas.microsoft.com/office/powerpoint/2010/main">
+    <mc:Choice Requires="p14">
+      <p:transition spd="med" p14:dur="700">
+        <p:fade/>
+      </p:transition>
+    </mc:Choice>
+    <mc:Fallback xmlns="">
+      <p:transition spd="med">
+        <p:fade/>
+      </p:transition>
+    </mc:Fallback>
+  </mc:AlternateContent>
+</p:sld>
+</file>
+
+<file path=ppt/slides/slide8.xml><?xml version="1.0" encoding="utf-8"?>
+<p:sld xmlns:a="http://schemas.openxmlformats.org/drawingml/2006/main" xmlns:r="http://schemas.openxmlformats.org/officeDocument/2006/relationships" xmlns:p="http://schemas.openxmlformats.org/presentationml/2006/main">
+  <p:cSld>
+    <p:spTree>
+      <p:nvGrpSpPr>
+        <p:cNvPr id="1" name=""/>
+        <p:cNvGrpSpPr/>
+        <p:nvPr/>
+      </p:nvGrpSpPr>
+      <p:grpSpPr>
+        <a:xfrm>
+          <a:off x="0" y="0"/>
+          <a:ext cx="0" cy="0"/>
+          <a:chOff x="0" y="0"/>
+          <a:chExt cx="0" cy="0"/>
+        </a:xfrm>
+      </p:grpSpPr>
+      <p:sp>
+        <p:nvSpPr>
+          <p:cNvPr id="2" name="Title 1"/>
+          <p:cNvSpPr>
+            <a:spLocks noGrp="1"/>
+          </p:cNvSpPr>
+          <p:nvPr>
+            <p:ph type="title"/>
+          </p:nvPr>
+        </p:nvSpPr>
+        <p:spPr/>
+        <p:txBody>
+          <a:bodyPr>
+            <a:normAutofit/>
+          </a:bodyPr>
+          <a:lstStyle/>
+          <a:p>
+            <a:r>
+              <a:rPr lang="en-US" dirty="0"/>
+              <a:t>Comparison by Country of Origin:</a:t>
+            </a:r>
+            <a:br>
+              <a:rPr lang="en-US" dirty="0"/>
+            </a:br>
+            <a:r>
+              <a:rPr lang="en-US" dirty="0"/>
+              <a:t>	</a:t>
+            </a:r>
+            <a:r>
+              <a:rPr lang="en-US" sz="2800" dirty="0"/>
+              <a:t>10 Countries with the Most Companies in Russia</a:t>
+            </a:r>
+            <a:endParaRPr lang="en-US" dirty="0"/>
+          </a:p>
+        </p:txBody>
+      </p:sp>
+      <p:sp>
+        <p:nvSpPr>
+          <p:cNvPr id="3" name="Text Placeholder 3">
+            <a:extLst>
+              <a:ext uri="{FF2B5EF4-FFF2-40B4-BE49-F238E27FC236}">
+                <a16:creationId xmlns:a16="http://schemas.microsoft.com/office/drawing/2014/main" id="{CE8AC5BF-36CB-34A3-9CD7-3C8C22B73B72}"/>
+              </a:ext>
+            </a:extLst>
+          </p:cNvPr>
+          <p:cNvSpPr txBox="1">
+            <a:spLocks/>
+          </p:cNvSpPr>
+          <p:nvPr/>
+        </p:nvSpPr>
+        <p:spPr>
+          <a:xfrm>
+            <a:off x="458440" y="5652412"/>
+            <a:ext cx="11276360" cy="748388"/>
+          </a:xfrm>
+          <a:prstGeom prst="rect">
+            <a:avLst/>
+          </a:prstGeom>
+        </p:spPr>
+        <p:txBody>
+          <a:bodyPr/>
+          <a:lstStyle>
+            <a:lvl1pPr marL="228600" indent="-228600" algn="l" defTabSz="914400" rtl="0" eaLnBrk="1" latinLnBrk="0" hangingPunct="1">
+              <a:lnSpc>
+                <a:spcPct val="90000"/>
+              </a:lnSpc>
+              <a:spcBef>
+                <a:spcPts val="1800"/>
+              </a:spcBef>
+              <a:buClr>
+                <a:schemeClr val="accent1"/>
+              </a:buClr>
+              <a:buFont typeface="Arial" panose="020B0604020202020204" pitchFamily="34" charset="0"/>
+              <a:buChar char="•"/>
+              <a:defRPr sz="2000" kern="1200">
+                <a:solidFill>
+                  <a:schemeClr val="tx1"/>
+                </a:solidFill>
+                <a:latin typeface="+mn-lt"/>
+                <a:ea typeface="+mn-ea"/>
+                <a:cs typeface="+mn-cs"/>
+              </a:defRPr>
+            </a:lvl1pPr>
+            <a:lvl2pPr marL="457200" indent="-228600" algn="l" defTabSz="914400" rtl="0" eaLnBrk="1" latinLnBrk="0" hangingPunct="1">
+              <a:lnSpc>
+                <a:spcPct val="90000"/>
+              </a:lnSpc>
+              <a:spcBef>
+                <a:spcPts val="1000"/>
+              </a:spcBef>
+              <a:buClr>
+                <a:schemeClr val="accent1"/>
+              </a:buClr>
+              <a:buFont typeface="Arial" panose="020B0604020202020204" pitchFamily="34" charset="0"/>
+              <a:buChar char="•"/>
+              <a:defRPr sz="1800" kern="1200">
+                <a:solidFill>
+                  <a:schemeClr val="tx1"/>
+                </a:solidFill>
+                <a:latin typeface="+mn-lt"/>
+                <a:ea typeface="+mn-ea"/>
+                <a:cs typeface="+mn-cs"/>
+              </a:defRPr>
+            </a:lvl2pPr>
+            <a:lvl3pPr marL="685800" indent="-182880" algn="l" defTabSz="914400" rtl="0" eaLnBrk="1" latinLnBrk="0" hangingPunct="1">
+              <a:lnSpc>
+                <a:spcPct val="90000"/>
+              </a:lnSpc>
+              <a:spcBef>
+                <a:spcPts val="800"/>
+              </a:spcBef>
+              <a:buClr>
+                <a:schemeClr val="accent1"/>
+              </a:buClr>
+              <a:buFont typeface="Arial" panose="020B0604020202020204" pitchFamily="34" charset="0"/>
+              <a:buChar char="•"/>
+              <a:defRPr sz="1600" kern="1200">
+                <a:solidFill>
+                  <a:schemeClr val="tx1"/>
+                </a:solidFill>
+                <a:latin typeface="+mn-lt"/>
+                <a:ea typeface="+mn-ea"/>
+                <a:cs typeface="+mn-cs"/>
+              </a:defRPr>
+            </a:lvl3pPr>
+            <a:lvl4pPr marL="914400" indent="-182880" algn="l" defTabSz="914400" rtl="0" eaLnBrk="1" latinLnBrk="0" hangingPunct="1">
+              <a:lnSpc>
+                <a:spcPct val="90000"/>
+              </a:lnSpc>
+              <a:spcBef>
+                <a:spcPts val="800"/>
+              </a:spcBef>
+              <a:buClr>
+                <a:schemeClr val="accent1"/>
+              </a:buClr>
+              <a:buFont typeface="Arial" panose="020B0604020202020204" pitchFamily="34" charset="0"/>
+              <a:buChar char="•"/>
+              <a:defRPr sz="1400" kern="1200">
+                <a:solidFill>
+                  <a:schemeClr val="tx1"/>
+                </a:solidFill>
+                <a:latin typeface="+mn-lt"/>
+                <a:ea typeface="+mn-ea"/>
+                <a:cs typeface="+mn-cs"/>
+              </a:defRPr>
+            </a:lvl4pPr>
+            <a:lvl5pPr marL="1143000" indent="-182880" algn="l" defTabSz="914400" rtl="0" eaLnBrk="1" latinLnBrk="0" hangingPunct="1">
+              <a:lnSpc>
+                <a:spcPct val="90000"/>
+              </a:lnSpc>
+              <a:spcBef>
+                <a:spcPts val="800"/>
+              </a:spcBef>
+              <a:buClr>
+                <a:schemeClr val="accent1"/>
+              </a:buClr>
+              <a:buFont typeface="Arial" panose="020B0604020202020204" pitchFamily="34" charset="0"/>
+              <a:buChar char="•"/>
+              <a:defRPr sz="1400" kern="1200">
+                <a:solidFill>
+                  <a:schemeClr val="tx1"/>
+                </a:solidFill>
+                <a:latin typeface="+mn-lt"/>
+                <a:ea typeface="+mn-ea"/>
+                <a:cs typeface="+mn-cs"/>
+              </a:defRPr>
+            </a:lvl5pPr>
+            <a:lvl6pPr marL="1371600" indent="-182880" algn="l" defTabSz="914400" rtl="0" eaLnBrk="1" latinLnBrk="0" hangingPunct="1">
+              <a:lnSpc>
+                <a:spcPct val="90000"/>
+              </a:lnSpc>
+              <a:spcBef>
+                <a:spcPts val="800"/>
+              </a:spcBef>
+              <a:buClr>
+                <a:schemeClr val="accent1"/>
+              </a:buClr>
+              <a:buFont typeface="Arial" panose="020B0604020202020204" pitchFamily="34" charset="0"/>
+              <a:buChar char="•"/>
+              <a:defRPr sz="1400" kern="1200">
+                <a:solidFill>
+                  <a:schemeClr val="tx1"/>
+                </a:solidFill>
+                <a:latin typeface="+mn-lt"/>
+                <a:ea typeface="+mn-ea"/>
+                <a:cs typeface="+mn-cs"/>
+              </a:defRPr>
+            </a:lvl6pPr>
+            <a:lvl7pPr marL="1600200" indent="-182880" algn="l" defTabSz="914400" rtl="0" eaLnBrk="1" latinLnBrk="0" hangingPunct="1">
+              <a:lnSpc>
+                <a:spcPct val="90000"/>
+              </a:lnSpc>
+              <a:spcBef>
+                <a:spcPts val="800"/>
+              </a:spcBef>
+              <a:buClr>
+                <a:schemeClr val="accent1"/>
+              </a:buClr>
+              <a:buFont typeface="Arial" panose="020B0604020202020204" pitchFamily="34" charset="0"/>
+              <a:buChar char="•"/>
+              <a:defRPr sz="1400" kern="1200">
+                <a:solidFill>
+                  <a:schemeClr val="tx1"/>
+                </a:solidFill>
+                <a:latin typeface="+mn-lt"/>
+                <a:ea typeface="+mn-ea"/>
+                <a:cs typeface="+mn-cs"/>
+              </a:defRPr>
+            </a:lvl7pPr>
+            <a:lvl8pPr marL="1828800" indent="-182880" algn="l" defTabSz="914400" rtl="0" eaLnBrk="1" latinLnBrk="0" hangingPunct="1">
+              <a:lnSpc>
+                <a:spcPct val="90000"/>
+              </a:lnSpc>
+              <a:spcBef>
+                <a:spcPts val="800"/>
+              </a:spcBef>
+              <a:buClr>
+                <a:schemeClr val="accent1"/>
+              </a:buClr>
+              <a:buFont typeface="Arial" panose="020B0604020202020204" pitchFamily="34" charset="0"/>
+              <a:buChar char="•"/>
+              <a:defRPr sz="1400" kern="1200">
+                <a:solidFill>
+                  <a:schemeClr val="tx1"/>
+                </a:solidFill>
+                <a:latin typeface="+mn-lt"/>
+                <a:ea typeface="+mn-ea"/>
+                <a:cs typeface="+mn-cs"/>
+              </a:defRPr>
+            </a:lvl8pPr>
+            <a:lvl9pPr marL="2057400" indent="-182880" algn="l" defTabSz="914400" rtl="0" eaLnBrk="1" latinLnBrk="0" hangingPunct="1">
+              <a:lnSpc>
+                <a:spcPct val="90000"/>
+              </a:lnSpc>
+              <a:spcBef>
+                <a:spcPts val="800"/>
+              </a:spcBef>
+              <a:buClr>
+                <a:schemeClr val="accent1"/>
+              </a:buClr>
+              <a:buFont typeface="Arial" panose="020B0604020202020204" pitchFamily="34" charset="0"/>
+              <a:buChar char="•"/>
+              <a:defRPr sz="1400" kern="1200">
+                <a:solidFill>
+                  <a:schemeClr val="tx1"/>
+                </a:solidFill>
+                <a:latin typeface="+mn-lt"/>
+                <a:ea typeface="+mn-ea"/>
+                <a:cs typeface="+mn-cs"/>
+              </a:defRPr>
+            </a:lvl9pPr>
+          </a:lstStyle>
+          <a:p>
+            <a:r>
+              <a:rPr lang="en-US" dirty="0"/>
+              <a:t>Geopolitical positions correlate with company operations in Russia</a:t>
+            </a:r>
+          </a:p>
+        </p:txBody>
+      </p:sp>
+      <p:pic>
+        <p:nvPicPr>
+          <p:cNvPr id="5" name="Picture 4">
+            <a:extLst>
+              <a:ext uri="{FF2B5EF4-FFF2-40B4-BE49-F238E27FC236}">
+                <a16:creationId xmlns:a16="http://schemas.microsoft.com/office/drawing/2014/main" id="{CE747185-F9AC-06DA-A082-E9D2576F1632}"/>
+              </a:ext>
+            </a:extLst>
+          </p:cNvPr>
+          <p:cNvPicPr>
+            <a:picLocks noChangeAspect="1"/>
+          </p:cNvPicPr>
+          <p:nvPr/>
+        </p:nvPicPr>
+        <p:blipFill>
+          <a:blip r:embed="rId2"/>
+          <a:stretch>
+            <a:fillRect/>
+          </a:stretch>
+        </p:blipFill>
+        <p:spPr>
+          <a:xfrm>
+            <a:off x="1600200" y="1752600"/>
+            <a:ext cx="3952649" cy="3689917"/>
+          </a:xfrm>
+          <a:prstGeom prst="rect">
+            <a:avLst/>
+          </a:prstGeom>
+        </p:spPr>
+      </p:pic>
+      <p:pic>
+        <p:nvPicPr>
+          <p:cNvPr id="7" name="Picture 6">
+            <a:extLst>
+              <a:ext uri="{FF2B5EF4-FFF2-40B4-BE49-F238E27FC236}">
+                <a16:creationId xmlns:a16="http://schemas.microsoft.com/office/drawing/2014/main" id="{52729870-8B45-7F32-33BD-808762985DB1}"/>
+              </a:ext>
+            </a:extLst>
+          </p:cNvPr>
+          <p:cNvPicPr>
+            <a:picLocks noChangeAspect="1"/>
+          </p:cNvPicPr>
+          <p:nvPr/>
+        </p:nvPicPr>
+        <p:blipFill>
+          <a:blip r:embed="rId3"/>
+          <a:stretch>
+            <a:fillRect/>
+          </a:stretch>
+        </p:blipFill>
+        <p:spPr>
+          <a:xfrm>
+            <a:off x="6248400" y="1752600"/>
+            <a:ext cx="4038600" cy="3770156"/>
+          </a:xfrm>
+          <a:prstGeom prst="rect">
+            <a:avLst/>
+          </a:prstGeom>
+        </p:spPr>
+      </p:pic>
+    </p:spTree>
+    <p:extLst>
+      <p:ext uri="{BB962C8B-B14F-4D97-AF65-F5344CB8AC3E}">
+        <p14:creationId xmlns:p14="http://schemas.microsoft.com/office/powerpoint/2010/main" val="430035269"/>
+      </p:ext>
+    </p:extLst>
+  </p:cSld>
+  <p:clrMapOvr>
+    <a:masterClrMapping/>
+  </p:clrMapOvr>
+  <mc:AlternateContent xmlns:mc="http://schemas.openxmlformats.org/markup-compatibility/2006" xmlns:p14="http://schemas.microsoft.com/office/powerpoint/2010/main">
+    <mc:Choice Requires="p14">
+      <p:transition spd="med" p14:dur="700">
+        <p:fade/>
+      </p:transition>
+    </mc:Choice>
+    <mc:Fallback xmlns="">
+      <p:transition spd="med">
+        <p:fade/>
+      </p:transition>
+    </mc:Fallback>
+  </mc:AlternateContent>
+</p:sld>
+</file>
+
+<file path=ppt/slides/slide9.xml><?xml version="1.0" encoding="utf-8"?>
+<p:sld xmlns:a="http://schemas.openxmlformats.org/drawingml/2006/main" xmlns:r="http://schemas.openxmlformats.org/officeDocument/2006/relationships" xmlns:p="http://schemas.openxmlformats.org/presentationml/2006/main">
+  <p:cSld>
+    <p:spTree>
+      <p:nvGrpSpPr>
+        <p:cNvPr id="1" name=""/>
+        <p:cNvGrpSpPr/>
+        <p:nvPr/>
+      </p:nvGrpSpPr>
+      <p:grpSpPr>
+        <a:xfrm>
+          <a:off x="0" y="0"/>
+          <a:ext cx="0" cy="0"/>
+          <a:chOff x="0" y="0"/>
+          <a:chExt cx="0" cy="0"/>
+        </a:xfrm>
+      </p:grpSpPr>
+      <p:sp>
+        <p:nvSpPr>
+          <p:cNvPr id="2" name="Title 1">
+            <a:extLst>
+              <a:ext uri="{FF2B5EF4-FFF2-40B4-BE49-F238E27FC236}">
+                <a16:creationId xmlns:a16="http://schemas.microsoft.com/office/drawing/2014/main" id="{0D2B00F3-016F-0B0A-E0B1-82EB86051AE9}"/>
+              </a:ext>
+            </a:extLst>
+          </p:cNvPr>
+          <p:cNvSpPr>
+            <a:spLocks noGrp="1"/>
+          </p:cNvSpPr>
+          <p:nvPr>
+            <p:ph type="title"/>
+          </p:nvPr>
+        </p:nvSpPr>
+        <p:spPr/>
+        <p:txBody>
+          <a:bodyPr/>
+          <a:lstStyle/>
+          <a:p>
+            <a:endParaRPr lang="en-US"/>
+          </a:p>
+        </p:txBody>
+      </p:sp>
+      <p:sp>
+        <p:nvSpPr>
+          <p:cNvPr id="3" name="Text Placeholder 2">
+            <a:extLst>
+              <a:ext uri="{FF2B5EF4-FFF2-40B4-BE49-F238E27FC236}">
+                <a16:creationId xmlns:a16="http://schemas.microsoft.com/office/drawing/2014/main" id="{01DBF114-242C-4BC1-BE88-010715F924E9}"/>
+              </a:ext>
+            </a:extLst>
+          </p:cNvPr>
+          <p:cNvSpPr>
+            <a:spLocks noGrp="1"/>
+          </p:cNvSpPr>
+          <p:nvPr>
+            <p:ph type="body" idx="1"/>
+          </p:nvPr>
+        </p:nvSpPr>
+        <p:spPr/>
+        <p:txBody>
+          <a:bodyPr/>
+          <a:lstStyle/>
+          <a:p>
+            <a:endParaRPr lang="en-US"/>
+          </a:p>
+        </p:txBody>
+      </p:sp>
+    </p:spTree>
+    <p:extLst>
+      <p:ext uri="{BB962C8B-B14F-4D97-AF65-F5344CB8AC3E}">
+        <p14:creationId xmlns:p14="http://schemas.microsoft.com/office/powerpoint/2010/main" val="308554264"/>
       </p:ext>
     </p:extLst>
   </p:cSld>

</xml_diff>

<commit_message>
Worked on readme and powerpoint to develop a way forward and identify stretch-goals
</commit_message>
<xml_diff>
--- a/ppt/Companies in Russia After Ukrainian Invasion.pptx
+++ b/ppt/Companies in Russia After Ukrainian Invasion.pptx
@@ -4074,58 +4074,37 @@
           <a:p>
             <a:r>
               <a:rPr lang="en-US" dirty="0"/>
-              <a:t>Trending tags, identifying what makes a video trend</a:t>
-            </a:r>
-          </a:p>
-          <a:p>
+              <a:t>Comparison by “Global South” countries: Brazil, South Africa, </a:t>
+            </a:r>
+            <a:r>
+              <a:rPr lang="en-US" dirty="0" err="1"/>
+              <a:t>Turkiye</a:t>
+            </a:r>
             <a:r>
               <a:rPr lang="en-US" dirty="0"/>
-              <a:t>Duration of trending content</a:t>
+              <a:t>, Indonesia, China to see if the “unaligned global south” is less interested in divestment</a:t>
             </a:r>
           </a:p>
           <a:p>
             <a:r>
               <a:rPr lang="en-US" dirty="0"/>
-              <a:t>Identifying social media platforms in descriptions</a:t>
+              <a:t>Perhaps a scatter plot which shows the number of each letter grade by the 10 most represented countries in the study</a:t>
+            </a:r>
+          </a:p>
+          <a:p>
+            <a:r>
+              <a:rPr lang="en-US" dirty="0"/>
+              <a:t>See if there is a difference between state-owner enterprises specifically, though this requires a more individuated look at each company</a:t>
+            </a:r>
+          </a:p>
+          <a:p>
+            <a:r>
+              <a:rPr lang="en-US" dirty="0"/>
+              <a:t>Could group A &amp; B and D &amp; F to show greater aggregation</a:t>
             </a:r>
           </a:p>
           <a:p>
             <a:endParaRPr lang="en-US" dirty="0"/>
-          </a:p>
-        </p:txBody>
-      </p:sp>
-      <p:sp>
-        <p:nvSpPr>
-          <p:cNvPr id="4" name="TextBox 3">
-            <a:extLst>
-              <a:ext uri="{FF2B5EF4-FFF2-40B4-BE49-F238E27FC236}">
-                <a16:creationId xmlns:a16="http://schemas.microsoft.com/office/drawing/2014/main" id="{10DA82BD-3DE2-9957-B778-2EA66EC2E296}"/>
-              </a:ext>
-            </a:extLst>
-          </p:cNvPr>
-          <p:cNvSpPr txBox="1"/>
-          <p:nvPr/>
-        </p:nvSpPr>
-        <p:spPr>
-          <a:xfrm>
-            <a:off x="1513609" y="4049372"/>
-            <a:ext cx="8229600" cy="1200329"/>
-          </a:xfrm>
-          <a:prstGeom prst="rect">
-            <a:avLst/>
-          </a:prstGeom>
-          <a:noFill/>
-        </p:spPr>
-        <p:txBody>
-          <a:bodyPr wrap="square" rtlCol="0">
-            <a:spAutoFit/>
-          </a:bodyPr>
-          <a:lstStyle/>
-          <a:p>
-            <a:r>
-              <a:rPr lang="en-US" sz="7200" dirty="0"/>
-              <a:t>UPDATE</a:t>
-            </a:r>
           </a:p>
         </p:txBody>
       </p:sp>

</xml_diff>

<commit_message>
Built stretch goals, worked on powerpoint and currently hold a step over a minimally viable product.
</commit_message>
<xml_diff>
--- a/ppt/Companies in Russia After Ukrainian Invasion.pptx
+++ b/ppt/Companies in Russia After Ukrainian Invasion.pptx
@@ -5,23 +5,21 @@
     <p:sldMasterId id="2147483648" r:id="rId1"/>
   </p:sldMasterIdLst>
   <p:notesMasterIdLst>
-    <p:notesMasterId r:id="rId13"/>
+    <p:notesMasterId r:id="rId11"/>
   </p:notesMasterIdLst>
   <p:handoutMasterIdLst>
-    <p:handoutMasterId r:id="rId14"/>
+    <p:handoutMasterId r:id="rId12"/>
   </p:handoutMasterIdLst>
   <p:sldIdLst>
     <p:sldId id="256" r:id="rId2"/>
-    <p:sldId id="267" r:id="rId3"/>
-    <p:sldId id="268" r:id="rId4"/>
+    <p:sldId id="268" r:id="rId3"/>
+    <p:sldId id="267" r:id="rId4"/>
     <p:sldId id="263" r:id="rId5"/>
-    <p:sldId id="264" r:id="rId6"/>
-    <p:sldId id="257" r:id="rId7"/>
-    <p:sldId id="261" r:id="rId8"/>
-    <p:sldId id="265" r:id="rId9"/>
-    <p:sldId id="262" r:id="rId10"/>
-    <p:sldId id="269" r:id="rId11"/>
-    <p:sldId id="266" r:id="rId12"/>
+    <p:sldId id="257" r:id="rId6"/>
+    <p:sldId id="265" r:id="rId7"/>
+    <p:sldId id="270" r:id="rId8"/>
+    <p:sldId id="269" r:id="rId9"/>
+    <p:sldId id="266" r:id="rId10"/>
   </p:sldIdLst>
   <p:sldSz cx="12192000" cy="6858000"/>
   <p:notesSz cx="6858000" cy="9144000"/>
@@ -213,7 +211,7 @@
           <a:p>
             <a:fld id="{061C5132-FFA3-4B02-9F09-22FCF40EFA74}" type="datetimeFigureOut">
               <a:rPr lang="en-US" smtClean="0"/>
-              <a:t>7/10/2023</a:t>
+              <a:t>7/11/2023</a:t>
             </a:fld>
             <a:endParaRPr lang="en-US"/>
           </a:p>
@@ -378,7 +376,7 @@
           <a:p>
             <a:fld id="{0B6E42C9-243F-4DC5-AFF6-9D56B5FA9D63}" type="datetimeFigureOut">
               <a:rPr lang="en-US" smtClean="0"/>
-              <a:t>7/10/2023</a:t>
+              <a:t>7/11/2023</a:t>
             </a:fld>
             <a:endParaRPr lang="en-US"/>
           </a:p>
@@ -729,6 +727,283 @@
 </p:notes>
 </file>
 
+<file path=ppt/notesSlides/notesSlide2.xml><?xml version="1.0" encoding="utf-8"?>
+<p:notes xmlns:a="http://schemas.openxmlformats.org/drawingml/2006/main" xmlns:r="http://schemas.openxmlformats.org/officeDocument/2006/relationships" xmlns:p="http://schemas.openxmlformats.org/presentationml/2006/main">
+  <p:cSld>
+    <p:spTree>
+      <p:nvGrpSpPr>
+        <p:cNvPr id="1" name=""/>
+        <p:cNvGrpSpPr/>
+        <p:nvPr/>
+      </p:nvGrpSpPr>
+      <p:grpSpPr>
+        <a:xfrm>
+          <a:off x="0" y="0"/>
+          <a:ext cx="0" cy="0"/>
+          <a:chOff x="0" y="0"/>
+          <a:chExt cx="0" cy="0"/>
+        </a:xfrm>
+      </p:grpSpPr>
+      <p:sp>
+        <p:nvSpPr>
+          <p:cNvPr id="2" name="Slide Image Placeholder 1"/>
+          <p:cNvSpPr>
+            <a:spLocks noGrp="1" noRot="1" noChangeAspect="1"/>
+          </p:cNvSpPr>
+          <p:nvPr>
+            <p:ph type="sldImg"/>
+          </p:nvPr>
+        </p:nvSpPr>
+        <p:spPr/>
+      </p:sp>
+      <p:sp>
+        <p:nvSpPr>
+          <p:cNvPr id="3" name="Notes Placeholder 2"/>
+          <p:cNvSpPr>
+            <a:spLocks noGrp="1"/>
+          </p:cNvSpPr>
+          <p:nvPr>
+            <p:ph type="body" idx="1"/>
+          </p:nvPr>
+        </p:nvSpPr>
+        <p:spPr/>
+        <p:txBody>
+          <a:bodyPr/>
+          <a:lstStyle/>
+          <a:p>
+            <a:r>
+              <a:rPr lang="en-US" dirty="0"/>
+              <a:t>Image from Sputnik, via </a:t>
+            </a:r>
+            <a:r>
+              <a:rPr lang="en-US" dirty="0" err="1"/>
+              <a:t>Agence</a:t>
+            </a:r>
+            <a:r>
+              <a:rPr lang="en-US" dirty="0"/>
+              <a:t> France Presse and accessed from The New York Times JUL 11</a:t>
+            </a:r>
+            <a:r>
+              <a:rPr lang="en-US" baseline="30000" dirty="0"/>
+              <a:t>th</a:t>
+            </a:r>
+            <a:r>
+              <a:rPr lang="en-US" dirty="0"/>
+              <a:t>, 2023 at: https://www.nytimes.com/2023/07/06/opinion/xi-putin-relationship-china.html</a:t>
+            </a:r>
+          </a:p>
+        </p:txBody>
+      </p:sp>
+      <p:sp>
+        <p:nvSpPr>
+          <p:cNvPr id="4" name="Slide Number Placeholder 3"/>
+          <p:cNvSpPr>
+            <a:spLocks noGrp="1"/>
+          </p:cNvSpPr>
+          <p:nvPr>
+            <p:ph type="sldNum" sz="quarter" idx="5"/>
+          </p:nvPr>
+        </p:nvSpPr>
+        <p:spPr/>
+        <p:txBody>
+          <a:bodyPr/>
+          <a:lstStyle/>
+          <a:p>
+            <a:fld id="{8DAEC444-603B-4F09-9A06-5917518DD901}" type="slidenum">
+              <a:rPr lang="en-US" smtClean="0"/>
+              <a:t>3</a:t>
+            </a:fld>
+            <a:endParaRPr lang="en-US"/>
+          </a:p>
+        </p:txBody>
+      </p:sp>
+    </p:spTree>
+    <p:extLst>
+      <p:ext uri="{BB962C8B-B14F-4D97-AF65-F5344CB8AC3E}">
+        <p14:creationId xmlns:p14="http://schemas.microsoft.com/office/powerpoint/2010/main" val="247323585"/>
+      </p:ext>
+    </p:extLst>
+  </p:cSld>
+  <p:clrMapOvr>
+    <a:masterClrMapping/>
+  </p:clrMapOvr>
+</p:notes>
+</file>
+
+<file path=ppt/notesSlides/notesSlide3.xml><?xml version="1.0" encoding="utf-8"?>
+<p:notes xmlns:a="http://schemas.openxmlformats.org/drawingml/2006/main" xmlns:r="http://schemas.openxmlformats.org/officeDocument/2006/relationships" xmlns:p="http://schemas.openxmlformats.org/presentationml/2006/main">
+  <p:cSld>
+    <p:spTree>
+      <p:nvGrpSpPr>
+        <p:cNvPr id="1" name=""/>
+        <p:cNvGrpSpPr/>
+        <p:nvPr/>
+      </p:nvGrpSpPr>
+      <p:grpSpPr>
+        <a:xfrm>
+          <a:off x="0" y="0"/>
+          <a:ext cx="0" cy="0"/>
+          <a:chOff x="0" y="0"/>
+          <a:chExt cx="0" cy="0"/>
+        </a:xfrm>
+      </p:grpSpPr>
+      <p:sp>
+        <p:nvSpPr>
+          <p:cNvPr id="2" name="Slide Image Placeholder 1"/>
+          <p:cNvSpPr>
+            <a:spLocks noGrp="1" noRot="1" noChangeAspect="1"/>
+          </p:cNvSpPr>
+          <p:nvPr>
+            <p:ph type="sldImg"/>
+          </p:nvPr>
+        </p:nvSpPr>
+        <p:spPr/>
+      </p:sp>
+      <p:sp>
+        <p:nvSpPr>
+          <p:cNvPr id="3" name="Notes Placeholder 2"/>
+          <p:cNvSpPr>
+            <a:spLocks noGrp="1"/>
+          </p:cNvSpPr>
+          <p:nvPr>
+            <p:ph type="body" idx="1"/>
+          </p:nvPr>
+        </p:nvSpPr>
+        <p:spPr/>
+        <p:txBody>
+          <a:bodyPr/>
+          <a:lstStyle/>
+          <a:p>
+            <a:r>
+              <a:rPr lang="en-US" dirty="0"/>
+              <a:t>Action &amp; Letter grade are subjective measures.</a:t>
+            </a:r>
+          </a:p>
+        </p:txBody>
+      </p:sp>
+      <p:sp>
+        <p:nvSpPr>
+          <p:cNvPr id="4" name="Slide Number Placeholder 3"/>
+          <p:cNvSpPr>
+            <a:spLocks noGrp="1"/>
+          </p:cNvSpPr>
+          <p:nvPr>
+            <p:ph type="sldNum" sz="quarter" idx="5"/>
+          </p:nvPr>
+        </p:nvSpPr>
+        <p:spPr/>
+        <p:txBody>
+          <a:bodyPr/>
+          <a:lstStyle/>
+          <a:p>
+            <a:fld id="{8DAEC444-603B-4F09-9A06-5917518DD901}" type="slidenum">
+              <a:rPr lang="en-US" smtClean="0"/>
+              <a:t>4</a:t>
+            </a:fld>
+            <a:endParaRPr lang="en-US"/>
+          </a:p>
+        </p:txBody>
+      </p:sp>
+    </p:spTree>
+    <p:extLst>
+      <p:ext uri="{BB962C8B-B14F-4D97-AF65-F5344CB8AC3E}">
+        <p14:creationId xmlns:p14="http://schemas.microsoft.com/office/powerpoint/2010/main" val="1484400702"/>
+      </p:ext>
+    </p:extLst>
+  </p:cSld>
+  <p:clrMapOvr>
+    <a:masterClrMapping/>
+  </p:clrMapOvr>
+</p:notes>
+</file>
+
+<file path=ppt/notesSlides/notesSlide4.xml><?xml version="1.0" encoding="utf-8"?>
+<p:notes xmlns:a="http://schemas.openxmlformats.org/drawingml/2006/main" xmlns:r="http://schemas.openxmlformats.org/officeDocument/2006/relationships" xmlns:p="http://schemas.openxmlformats.org/presentationml/2006/main">
+  <p:cSld>
+    <p:spTree>
+      <p:nvGrpSpPr>
+        <p:cNvPr id="1" name=""/>
+        <p:cNvGrpSpPr/>
+        <p:nvPr/>
+      </p:nvGrpSpPr>
+      <p:grpSpPr>
+        <a:xfrm>
+          <a:off x="0" y="0"/>
+          <a:ext cx="0" cy="0"/>
+          <a:chOff x="0" y="0"/>
+          <a:chExt cx="0" cy="0"/>
+        </a:xfrm>
+      </p:grpSpPr>
+      <p:sp>
+        <p:nvSpPr>
+          <p:cNvPr id="2" name="Slide Image Placeholder 1"/>
+          <p:cNvSpPr>
+            <a:spLocks noGrp="1" noRot="1" noChangeAspect="1"/>
+          </p:cNvSpPr>
+          <p:nvPr>
+            <p:ph type="sldImg"/>
+          </p:nvPr>
+        </p:nvSpPr>
+        <p:spPr/>
+      </p:sp>
+      <p:sp>
+        <p:nvSpPr>
+          <p:cNvPr id="3" name="Notes Placeholder 2"/>
+          <p:cNvSpPr>
+            <a:spLocks noGrp="1"/>
+          </p:cNvSpPr>
+          <p:nvPr>
+            <p:ph type="body" idx="1"/>
+          </p:nvPr>
+        </p:nvSpPr>
+        <p:spPr/>
+        <p:txBody>
+          <a:bodyPr/>
+          <a:lstStyle/>
+          <a:p>
+            <a:r>
+              <a:rPr lang="en-US" dirty="0"/>
+              <a:t>China may be under represented.  However, Finland and China have almost the same number of companies and are opposites in their received grades.</a:t>
+            </a:r>
+          </a:p>
+        </p:txBody>
+      </p:sp>
+      <p:sp>
+        <p:nvSpPr>
+          <p:cNvPr id="4" name="Slide Number Placeholder 3"/>
+          <p:cNvSpPr>
+            <a:spLocks noGrp="1"/>
+          </p:cNvSpPr>
+          <p:nvPr>
+            <p:ph type="sldNum" sz="quarter" idx="5"/>
+          </p:nvPr>
+        </p:nvSpPr>
+        <p:spPr/>
+        <p:txBody>
+          <a:bodyPr/>
+          <a:lstStyle/>
+          <a:p>
+            <a:fld id="{8DAEC444-603B-4F09-9A06-5917518DD901}" type="slidenum">
+              <a:rPr lang="en-US" smtClean="0"/>
+              <a:t>7</a:t>
+            </a:fld>
+            <a:endParaRPr lang="en-US"/>
+          </a:p>
+        </p:txBody>
+      </p:sp>
+    </p:spTree>
+    <p:extLst>
+      <p:ext uri="{BB962C8B-B14F-4D97-AF65-F5344CB8AC3E}">
+        <p14:creationId xmlns:p14="http://schemas.microsoft.com/office/powerpoint/2010/main" val="1527465416"/>
+      </p:ext>
+    </p:extLst>
+  </p:cSld>
+  <p:clrMapOvr>
+    <a:masterClrMapping/>
+  </p:clrMapOvr>
+</p:notes>
+</file>
+
 <file path=ppt/slideLayouts/slideLayout1.xml><?xml version="1.0" encoding="utf-8"?>
 <p:sldLayout xmlns:a="http://schemas.openxmlformats.org/drawingml/2006/main" xmlns:r="http://schemas.openxmlformats.org/officeDocument/2006/relationships" xmlns:p="http://schemas.openxmlformats.org/presentationml/2006/main" showMasterSp="0" type="title" preserve="1">
   <p:cSld name="Title Slide">
@@ -1066,7 +1341,7 @@
           <a:p>
             <a:fld id="{B0FE2824-C2A0-4931-BB32-60B24BDBB3CC}" type="datetimeFigureOut">
               <a:rPr lang="en-US" smtClean="0"/>
-              <a:t>7/10/2023</a:t>
+              <a:t>7/11/2023</a:t>
             </a:fld>
             <a:endParaRPr lang="en-US"/>
           </a:p>
@@ -1261,7 +1536,7 @@
           <a:p>
             <a:fld id="{B0FE2824-C2A0-4931-BB32-60B24BDBB3CC}" type="datetimeFigureOut">
               <a:rPr lang="en-US" smtClean="0"/>
-              <a:t>7/10/2023</a:t>
+              <a:t>7/11/2023</a:t>
             </a:fld>
             <a:endParaRPr lang="en-US"/>
           </a:p>
@@ -1441,7 +1716,7 @@
           <a:p>
             <a:fld id="{B0FE2824-C2A0-4931-BB32-60B24BDBB3CC}" type="datetimeFigureOut">
               <a:rPr lang="en-US" smtClean="0"/>
-              <a:t>7/10/2023</a:t>
+              <a:t>7/11/2023</a:t>
             </a:fld>
             <a:endParaRPr lang="en-US"/>
           </a:p>
@@ -1961,7 +2236,7 @@
           <a:p>
             <a:fld id="{B0FE2824-C2A0-4931-BB32-60B24BDBB3CC}" type="datetimeFigureOut">
               <a:rPr lang="en-US" smtClean="0"/>
-              <a:t>7/10/2023</a:t>
+              <a:t>7/11/2023</a:t>
             </a:fld>
             <a:endParaRPr lang="en-US"/>
           </a:p>
@@ -2403,7 +2678,7 @@
           <a:p>
             <a:fld id="{B0FE2824-C2A0-4931-BB32-60B24BDBB3CC}" type="datetimeFigureOut">
               <a:rPr lang="en-US" smtClean="0"/>
-              <a:t>7/10/2023</a:t>
+              <a:t>7/11/2023</a:t>
             </a:fld>
             <a:endParaRPr lang="en-US"/>
           </a:p>
@@ -2532,7 +2807,7 @@
           <a:p>
             <a:fld id="{B0FE2824-C2A0-4931-BB32-60B24BDBB3CC}" type="datetimeFigureOut">
               <a:rPr lang="en-US" smtClean="0"/>
-              <a:t>7/10/2023</a:t>
+              <a:t>7/11/2023</a:t>
             </a:fld>
             <a:endParaRPr lang="en-US"/>
           </a:p>
@@ -2639,7 +2914,7 @@
           <a:p>
             <a:fld id="{B0FE2824-C2A0-4931-BB32-60B24BDBB3CC}" type="datetimeFigureOut">
               <a:rPr lang="en-US" smtClean="0"/>
-              <a:t>7/10/2023</a:t>
+              <a:t>7/11/2023</a:t>
             </a:fld>
             <a:endParaRPr lang="en-US"/>
           </a:p>
@@ -2935,7 +3210,7 @@
           <a:p>
             <a:fld id="{B0FE2824-C2A0-4931-BB32-60B24BDBB3CC}" type="datetimeFigureOut">
               <a:rPr lang="en-US" smtClean="0"/>
-              <a:t>7/10/2023</a:t>
+              <a:t>7/11/2023</a:t>
             </a:fld>
             <a:endParaRPr lang="en-US"/>
           </a:p>
@@ -3208,7 +3483,7 @@
           <a:p>
             <a:fld id="{B0FE2824-C2A0-4931-BB32-60B24BDBB3CC}" type="datetimeFigureOut">
               <a:rPr lang="en-US" smtClean="0"/>
-              <a:t>7/10/2023</a:t>
+              <a:t>7/11/2023</a:t>
             </a:fld>
             <a:endParaRPr lang="en-US"/>
           </a:p>
@@ -3502,7 +3777,7 @@
             <a:fld id="{B0FE2824-C2A0-4931-BB32-60B24BDBB3CC}" type="datetimeFigureOut">
               <a:rPr lang="en-US" smtClean="0"/>
               <a:pPr/>
-              <a:t>7/10/2023</a:t>
+              <a:t>7/11/2023</a:t>
             </a:fld>
             <a:endParaRPr lang="en-US"/>
           </a:p>
@@ -3937,7 +4212,12 @@
             <p:ph type="ctrTitle"/>
           </p:nvPr>
         </p:nvSpPr>
-        <p:spPr/>
+        <p:spPr>
+          <a:xfrm>
+            <a:off x="609600" y="4179724"/>
+            <a:ext cx="10744199" cy="1158446"/>
+          </a:xfrm>
+        </p:spPr>
         <p:txBody>
           <a:bodyPr>
             <a:normAutofit fontScale="90000"/>
@@ -3946,15 +4226,7 @@
           <a:p>
             <a:r>
               <a:rPr lang="en-US" dirty="0"/>
-              <a:t>Post </a:t>
-            </a:r>
-            <a:r>
-              <a:rPr lang="en-US"/>
-              <a:t>Invasion Companies </a:t>
-            </a:r>
-            <a:r>
-              <a:rPr lang="en-US" dirty="0"/>
-              <a:t>in Russia</a:t>
+              <a:t>Companies Leaving or Staying in Russia Following Invasion of Ukraine</a:t>
             </a:r>
           </a:p>
         </p:txBody>
@@ -4006,452 +4278,8 @@
 </p:sld>
 </file>
 
-<file path=ppt/slides/slide10.xml><?xml version="1.0" encoding="utf-8"?>
-<p:sld xmlns:a="http://schemas.openxmlformats.org/drawingml/2006/main" xmlns:r="http://schemas.openxmlformats.org/officeDocument/2006/relationships" xmlns:p="http://schemas.openxmlformats.org/presentationml/2006/main">
-  <p:cSld>
-    <p:spTree>
-      <p:nvGrpSpPr>
-        <p:cNvPr id="1" name=""/>
-        <p:cNvGrpSpPr/>
-        <p:nvPr/>
-      </p:nvGrpSpPr>
-      <p:grpSpPr>
-        <a:xfrm>
-          <a:off x="0" y="0"/>
-          <a:ext cx="0" cy="0"/>
-          <a:chOff x="0" y="0"/>
-          <a:chExt cx="0" cy="0"/>
-        </a:xfrm>
-      </p:grpSpPr>
-      <p:sp>
-        <p:nvSpPr>
-          <p:cNvPr id="2" name="Title 1">
-            <a:extLst>
-              <a:ext uri="{FF2B5EF4-FFF2-40B4-BE49-F238E27FC236}">
-                <a16:creationId xmlns:a16="http://schemas.microsoft.com/office/drawing/2014/main" id="{68BDA5B9-F67F-38E2-88E2-74F2FB831908}"/>
-              </a:ext>
-            </a:extLst>
-          </p:cNvPr>
-          <p:cNvSpPr>
-            <a:spLocks noGrp="1"/>
-          </p:cNvSpPr>
-          <p:nvPr>
-            <p:ph type="title"/>
-          </p:nvPr>
-        </p:nvSpPr>
-        <p:spPr/>
-        <p:txBody>
-          <a:bodyPr/>
-          <a:lstStyle/>
-          <a:p>
-            <a:r>
-              <a:rPr lang="en-US" dirty="0"/>
-              <a:t>Future Project Plans</a:t>
-            </a:r>
-          </a:p>
-        </p:txBody>
-      </p:sp>
-      <p:sp>
-        <p:nvSpPr>
-          <p:cNvPr id="3" name="Content Placeholder 2">
-            <a:extLst>
-              <a:ext uri="{FF2B5EF4-FFF2-40B4-BE49-F238E27FC236}">
-                <a16:creationId xmlns:a16="http://schemas.microsoft.com/office/drawing/2014/main" id="{D2AD61E8-F4CF-3990-D3F2-C9529D155318}"/>
-              </a:ext>
-            </a:extLst>
-          </p:cNvPr>
-          <p:cNvSpPr>
-            <a:spLocks noGrp="1"/>
-          </p:cNvSpPr>
-          <p:nvPr>
-            <p:ph idx="1"/>
-          </p:nvPr>
-        </p:nvSpPr>
-        <p:spPr/>
-        <p:txBody>
-          <a:bodyPr/>
-          <a:lstStyle/>
-          <a:p>
-            <a:r>
-              <a:rPr lang="en-US" dirty="0"/>
-              <a:t>Comparison by “Global South” countries: Brazil, South Africa, </a:t>
-            </a:r>
-            <a:r>
-              <a:rPr lang="en-US" dirty="0" err="1"/>
-              <a:t>Turkiye</a:t>
-            </a:r>
-            <a:r>
-              <a:rPr lang="en-US" dirty="0"/>
-              <a:t>, Indonesia, China to see if the “unaligned global south” is less interested in divestment</a:t>
-            </a:r>
-          </a:p>
-          <a:p>
-            <a:r>
-              <a:rPr lang="en-US" dirty="0"/>
-              <a:t>Perhaps a scatter plot which shows the number of each letter grade by the 10 most represented countries in the study</a:t>
-            </a:r>
-          </a:p>
-          <a:p>
-            <a:r>
-              <a:rPr lang="en-US" dirty="0"/>
-              <a:t>See if there is a difference between state-owner enterprises specifically, though this requires a more individuated look at each company</a:t>
-            </a:r>
-          </a:p>
-          <a:p>
-            <a:r>
-              <a:rPr lang="en-US" dirty="0"/>
-              <a:t>Could group A &amp; B and D &amp; F to show greater aggregation</a:t>
-            </a:r>
-          </a:p>
-          <a:p>
-            <a:endParaRPr lang="en-US" dirty="0"/>
-          </a:p>
-        </p:txBody>
-      </p:sp>
-    </p:spTree>
-    <p:extLst>
-      <p:ext uri="{BB962C8B-B14F-4D97-AF65-F5344CB8AC3E}">
-        <p14:creationId xmlns:p14="http://schemas.microsoft.com/office/powerpoint/2010/main" val="3326759480"/>
-      </p:ext>
-    </p:extLst>
-  </p:cSld>
-  <p:clrMapOvr>
-    <a:masterClrMapping/>
-  </p:clrMapOvr>
-  <mc:AlternateContent xmlns:mc="http://schemas.openxmlformats.org/markup-compatibility/2006" xmlns:p14="http://schemas.microsoft.com/office/powerpoint/2010/main">
-    <mc:Choice Requires="p14">
-      <p:transition spd="med" p14:dur="700">
-        <p:fade/>
-      </p:transition>
-    </mc:Choice>
-    <mc:Fallback xmlns="">
-      <p:transition spd="med">
-        <p:fade/>
-      </p:transition>
-    </mc:Fallback>
-  </mc:AlternateContent>
-</p:sld>
-</file>
-
-<file path=ppt/slides/slide11.xml><?xml version="1.0" encoding="utf-8"?>
-<p:sld xmlns:a="http://schemas.openxmlformats.org/drawingml/2006/main" xmlns:r="http://schemas.openxmlformats.org/officeDocument/2006/relationships" xmlns:p="http://schemas.openxmlformats.org/presentationml/2006/main">
-  <p:cSld>
-    <p:spTree>
-      <p:nvGrpSpPr>
-        <p:cNvPr id="1" name=""/>
-        <p:cNvGrpSpPr/>
-        <p:nvPr/>
-      </p:nvGrpSpPr>
-      <p:grpSpPr>
-        <a:xfrm>
-          <a:off x="0" y="0"/>
-          <a:ext cx="0" cy="0"/>
-          <a:chOff x="0" y="0"/>
-          <a:chExt cx="0" cy="0"/>
-        </a:xfrm>
-      </p:grpSpPr>
-      <p:sp>
-        <p:nvSpPr>
-          <p:cNvPr id="2" name="Title 1">
-            <a:extLst>
-              <a:ext uri="{FF2B5EF4-FFF2-40B4-BE49-F238E27FC236}">
-                <a16:creationId xmlns:a16="http://schemas.microsoft.com/office/drawing/2014/main" id="{4C44AF5E-4726-3FCA-3646-6CC8BA08E269}"/>
-              </a:ext>
-            </a:extLst>
-          </p:cNvPr>
-          <p:cNvSpPr>
-            <a:spLocks noGrp="1"/>
-          </p:cNvSpPr>
-          <p:nvPr>
-            <p:ph type="title"/>
-          </p:nvPr>
-        </p:nvSpPr>
-        <p:spPr>
-          <a:xfrm>
-            <a:off x="838200" y="152400"/>
-            <a:ext cx="10515600" cy="1145224"/>
-          </a:xfrm>
-        </p:spPr>
-        <p:txBody>
-          <a:bodyPr/>
-          <a:lstStyle/>
-          <a:p>
-            <a:r>
-              <a:rPr lang="en-US" dirty="0"/>
-              <a:t>Contact Info, Repository &amp; Dataset</a:t>
-            </a:r>
-          </a:p>
-        </p:txBody>
-      </p:sp>
-      <p:sp>
-        <p:nvSpPr>
-          <p:cNvPr id="3" name="Content Placeholder 2">
-            <a:extLst>
-              <a:ext uri="{FF2B5EF4-FFF2-40B4-BE49-F238E27FC236}">
-                <a16:creationId xmlns:a16="http://schemas.microsoft.com/office/drawing/2014/main" id="{4710CCA1-8679-6A6E-6A9E-F91CC74A80E2}"/>
-              </a:ext>
-            </a:extLst>
-          </p:cNvPr>
-          <p:cNvSpPr>
-            <a:spLocks noGrp="1"/>
-          </p:cNvSpPr>
-          <p:nvPr>
-            <p:ph idx="1"/>
-          </p:nvPr>
-        </p:nvSpPr>
-        <p:spPr>
-          <a:xfrm>
-            <a:off x="838200" y="1607416"/>
-            <a:ext cx="10515600" cy="4351338"/>
-          </a:xfrm>
-        </p:spPr>
-        <p:txBody>
-          <a:bodyPr>
-            <a:normAutofit fontScale="92500" lnSpcReduction="10000"/>
-          </a:bodyPr>
-          <a:lstStyle/>
-          <a:p>
-            <a:r>
-              <a:rPr lang="en-US" sz="3000" dirty="0"/>
-              <a:t>Contact Info</a:t>
-            </a:r>
-          </a:p>
-          <a:p>
-            <a:pPr lvl="1"/>
-            <a:r>
-              <a:rPr lang="en-US" sz="2600" dirty="0"/>
-              <a:t>Travis Lindeman </a:t>
-            </a:r>
-          </a:p>
-          <a:p>
-            <a:pPr lvl="2"/>
-            <a:r>
-              <a:rPr lang="en-US" sz="2400" dirty="0">
-                <a:hlinkClick r:id="rId2"/>
-              </a:rPr>
-              <a:t>travis.lindeman@socom.mil</a:t>
-            </a:r>
-            <a:endParaRPr lang="en-US" sz="2400" dirty="0"/>
-          </a:p>
-          <a:p>
-            <a:pPr lvl="2"/>
-            <a:r>
-              <a:rPr lang="en-US" sz="2400" dirty="0">
-                <a:hlinkClick r:id="rId3"/>
-              </a:rPr>
-              <a:t>tralinde@gmail.com</a:t>
-            </a:r>
-            <a:endParaRPr lang="en-US" sz="2400" dirty="0"/>
-          </a:p>
-          <a:p>
-            <a:r>
-              <a:rPr lang="en-US" sz="3300" dirty="0"/>
-              <a:t>Repository link:</a:t>
-            </a:r>
-          </a:p>
-          <a:p>
-            <a:pPr marL="0" indent="0">
-              <a:buNone/>
-            </a:pPr>
-            <a:r>
-              <a:rPr lang="en-US" sz="2400" dirty="0"/>
-              <a:t>  </a:t>
-            </a:r>
-            <a:r>
-              <a:rPr lang="en-US" sz="2600" dirty="0">
-                <a:hlinkClick r:id="rId4"/>
-              </a:rPr>
-              <a:t>https://github.com/tralinde/companies_in_russia</a:t>
-            </a:r>
-            <a:endParaRPr lang="en-US" sz="2600" dirty="0"/>
-          </a:p>
-          <a:p>
-            <a:r>
-              <a:rPr lang="en-US" sz="3300" dirty="0"/>
-              <a:t>Dataset link: </a:t>
-            </a:r>
-          </a:p>
-          <a:p>
-            <a:pPr marL="0" indent="0">
-              <a:buNone/>
-            </a:pPr>
-            <a:r>
-              <a:rPr lang="en-US" sz="2400" dirty="0"/>
-              <a:t>  </a:t>
-            </a:r>
-            <a:r>
-              <a:rPr lang="en-US" sz="2600" dirty="0">
-                <a:hlinkClick r:id="rId5"/>
-              </a:rPr>
-              <a:t>https://www.kaggle.com/datasets/vadimtynchenko/list-of-companies-leaving-or-staying-in-russia</a:t>
-            </a:r>
-            <a:endParaRPr lang="en-US" sz="2600" dirty="0"/>
-          </a:p>
-          <a:p>
-            <a:pPr marL="0" indent="0">
-              <a:buNone/>
-            </a:pPr>
-            <a:endParaRPr lang="en-US" sz="2400" dirty="0"/>
-          </a:p>
-        </p:txBody>
-      </p:sp>
-    </p:spTree>
-    <p:extLst>
-      <p:ext uri="{BB962C8B-B14F-4D97-AF65-F5344CB8AC3E}">
-        <p14:creationId xmlns:p14="http://schemas.microsoft.com/office/powerpoint/2010/main" val="2164851717"/>
-      </p:ext>
-    </p:extLst>
-  </p:cSld>
-  <p:clrMapOvr>
-    <a:masterClrMapping/>
-  </p:clrMapOvr>
-  <mc:AlternateContent xmlns:mc="http://schemas.openxmlformats.org/markup-compatibility/2006" xmlns:p14="http://schemas.microsoft.com/office/powerpoint/2010/main">
-    <mc:Choice Requires="p14">
-      <p:transition spd="med" p14:dur="700">
-        <p:fade/>
-      </p:transition>
-    </mc:Choice>
-    <mc:Fallback xmlns="">
-      <p:transition spd="med">
-        <p:fade/>
-      </p:transition>
-    </mc:Fallback>
-  </mc:AlternateContent>
-</p:sld>
-</file>
-
 <file path=ppt/slides/slide2.xml><?xml version="1.0" encoding="utf-8"?>
-<p:sld xmlns:a="http://schemas.openxmlformats.org/drawingml/2006/main" xmlns:r="http://schemas.openxmlformats.org/officeDocument/2006/relationships" xmlns:p="http://schemas.openxmlformats.org/presentationml/2006/main">
-  <p:cSld>
-    <p:spTree>
-      <p:nvGrpSpPr>
-        <p:cNvPr id="1" name=""/>
-        <p:cNvGrpSpPr/>
-        <p:nvPr/>
-      </p:nvGrpSpPr>
-      <p:grpSpPr>
-        <a:xfrm>
-          <a:off x="0" y="0"/>
-          <a:ext cx="0" cy="0"/>
-          <a:chOff x="0" y="0"/>
-          <a:chExt cx="0" cy="0"/>
-        </a:xfrm>
-      </p:grpSpPr>
-      <p:sp>
-        <p:nvSpPr>
-          <p:cNvPr id="2" name="Title 1">
-            <a:extLst>
-              <a:ext uri="{FF2B5EF4-FFF2-40B4-BE49-F238E27FC236}">
-                <a16:creationId xmlns:a16="http://schemas.microsoft.com/office/drawing/2014/main" id="{C60C9FC5-B5D5-E232-2B47-446FDCCFD8C8}"/>
-              </a:ext>
-            </a:extLst>
-          </p:cNvPr>
-          <p:cNvSpPr>
-            <a:spLocks noGrp="1"/>
-          </p:cNvSpPr>
-          <p:nvPr>
-            <p:ph type="title"/>
-          </p:nvPr>
-        </p:nvSpPr>
-        <p:spPr/>
-        <p:txBody>
-          <a:bodyPr/>
-          <a:lstStyle/>
-          <a:p>
-            <a:r>
-              <a:rPr lang="en-US" dirty="0"/>
-              <a:t>Stakeholder Interest</a:t>
-            </a:r>
-          </a:p>
-        </p:txBody>
-      </p:sp>
-      <p:sp>
-        <p:nvSpPr>
-          <p:cNvPr id="3" name="Content Placeholder 2">
-            <a:extLst>
-              <a:ext uri="{FF2B5EF4-FFF2-40B4-BE49-F238E27FC236}">
-                <a16:creationId xmlns:a16="http://schemas.microsoft.com/office/drawing/2014/main" id="{12EDB104-3CF2-E9BA-0CBF-F497C3B5C063}"/>
-              </a:ext>
-            </a:extLst>
-          </p:cNvPr>
-          <p:cNvSpPr>
-            <a:spLocks noGrp="1"/>
-          </p:cNvSpPr>
-          <p:nvPr>
-            <p:ph idx="1"/>
-          </p:nvPr>
-        </p:nvSpPr>
-        <p:spPr/>
-        <p:txBody>
-          <a:bodyPr/>
-          <a:lstStyle/>
-          <a:p>
-            <a:endParaRPr lang="en-US" dirty="0"/>
-          </a:p>
-        </p:txBody>
-      </p:sp>
-      <p:sp>
-        <p:nvSpPr>
-          <p:cNvPr id="5" name="TextBox 4">
-            <a:extLst>
-              <a:ext uri="{FF2B5EF4-FFF2-40B4-BE49-F238E27FC236}">
-                <a16:creationId xmlns:a16="http://schemas.microsoft.com/office/drawing/2014/main" id="{EDD52C49-D541-5504-B2E6-969D47994B2E}"/>
-              </a:ext>
-            </a:extLst>
-          </p:cNvPr>
-          <p:cNvSpPr txBox="1"/>
-          <p:nvPr/>
-        </p:nvSpPr>
-        <p:spPr>
-          <a:xfrm>
-            <a:off x="2514600" y="1676400"/>
-            <a:ext cx="8229600" cy="1200329"/>
-          </a:xfrm>
-          <a:prstGeom prst="rect">
-            <a:avLst/>
-          </a:prstGeom>
-          <a:noFill/>
-        </p:spPr>
-        <p:txBody>
-          <a:bodyPr wrap="square" rtlCol="0">
-            <a:spAutoFit/>
-          </a:bodyPr>
-          <a:lstStyle/>
-          <a:p>
-            <a:r>
-              <a:rPr lang="en-US" sz="7200" dirty="0"/>
-              <a:t>UPDATE</a:t>
-            </a:r>
-          </a:p>
-        </p:txBody>
-      </p:sp>
-    </p:spTree>
-    <p:extLst>
-      <p:ext uri="{BB962C8B-B14F-4D97-AF65-F5344CB8AC3E}">
-        <p14:creationId xmlns:p14="http://schemas.microsoft.com/office/powerpoint/2010/main" val="3181378257"/>
-      </p:ext>
-    </p:extLst>
-  </p:cSld>
-  <p:clrMapOvr>
-    <a:masterClrMapping/>
-  </p:clrMapOvr>
-  <mc:AlternateContent xmlns:mc="http://schemas.openxmlformats.org/markup-compatibility/2006" xmlns:p14="http://schemas.microsoft.com/office/powerpoint/2010/main">
-    <mc:Choice Requires="p14">
-      <p:transition spd="med" p14:dur="700">
-        <p:fade/>
-      </p:transition>
-    </mc:Choice>
-    <mc:Fallback xmlns="">
-      <p:transition spd="med">
-        <p:fade/>
-      </p:transition>
-    </mc:Fallback>
-  </mc:AlternateContent>
-</p:sld>
-</file>
-
-<file path=ppt/slides/slide3.xml><?xml version="1.0" encoding="utf-8"?>
-<p:sld xmlns:a="http://schemas.openxmlformats.org/drawingml/2006/main" xmlns:r="http://schemas.openxmlformats.org/officeDocument/2006/relationships" xmlns:p="http://schemas.openxmlformats.org/presentationml/2006/main">
+<p:sld xmlns:a="http://schemas.openxmlformats.org/drawingml/2006/main" xmlns:r="http://schemas.openxmlformats.org/officeDocument/2006/relationships" xmlns:p="http://schemas.openxmlformats.org/presentationml/2006/main" show="0">
   <p:cSld>
     <p:spTree>
       <p:nvGrpSpPr>
@@ -4715,45 +4543,51 @@
           </a:lstStyle>
           <a:p>
             <a:r>
-              <a:rPr lang="en-US"/>
-              <a:t>Most popular content creators</a:t>
-            </a:r>
-          </a:p>
-          <a:p>
-            <a:r>
-              <a:rPr lang="en-US"/>
-              <a:t>Analysis by video category</a:t>
+              <a:rPr lang="en-US" dirty="0"/>
+              <a:t>Stakeholder Interest</a:t>
+            </a:r>
+          </a:p>
+          <a:p>
+            <a:r>
+              <a:rPr lang="en-US" dirty="0"/>
+              <a:t>Data of Interest</a:t>
+            </a:r>
+          </a:p>
+          <a:p>
+            <a:r>
+              <a:rPr lang="en-US" dirty="0"/>
+              <a:t>Compare Company Activity following invasion of Ukraine</a:t>
             </a:r>
           </a:p>
           <a:p>
             <a:pPr lvl="1"/>
             <a:r>
-              <a:rPr lang="en-US"/>
-              <a:t>Most viewed</a:t>
+              <a:rPr lang="en-US" dirty="0"/>
+              <a:t>Type of Industry</a:t>
             </a:r>
           </a:p>
           <a:p>
             <a:pPr lvl="1"/>
             <a:r>
-              <a:rPr lang="en-US"/>
-              <a:t>Most commented</a:t>
-            </a:r>
-          </a:p>
-          <a:p>
-            <a:r>
-              <a:rPr lang="en-US"/>
-              <a:t>Timeline between publication and trending status</a:t>
-            </a:r>
-          </a:p>
-          <a:p>
-            <a:pPr marL="0" indent="0">
-              <a:buFont typeface="Arial" panose="020B0604020202020204" pitchFamily="34" charset="0"/>
-              <a:buNone/>
-            </a:pPr>
-            <a:endParaRPr lang="en-US"/>
-          </a:p>
-          <a:p>
-            <a:endParaRPr lang="en-US"/>
+              <a:rPr lang="en-US" dirty="0"/>
+              <a:t>Country of Origin</a:t>
+            </a:r>
+          </a:p>
+          <a:p>
+            <a:pPr lvl="1"/>
+            <a:r>
+              <a:rPr lang="en-US" dirty="0"/>
+              <a:t>Scale Comparison</a:t>
+            </a:r>
+          </a:p>
+          <a:p>
+            <a:r>
+              <a:rPr lang="en-US" dirty="0"/>
+              <a:t>Way Forward</a:t>
+            </a:r>
+          </a:p>
+          <a:p>
+            <a:endParaRPr lang="en-US" dirty="0"/>
           </a:p>
           <a:p>
             <a:pPr marL="0" indent="0">
@@ -4764,45 +4598,167 @@
           </a:p>
         </p:txBody>
       </p:sp>
-      <p:sp>
-        <p:nvSpPr>
-          <p:cNvPr id="5" name="TextBox 4">
+    </p:spTree>
+    <p:extLst>
+      <p:ext uri="{BB962C8B-B14F-4D97-AF65-F5344CB8AC3E}">
+        <p14:creationId xmlns:p14="http://schemas.microsoft.com/office/powerpoint/2010/main" val="3987091705"/>
+      </p:ext>
+    </p:extLst>
+  </p:cSld>
+  <p:clrMapOvr>
+    <a:masterClrMapping/>
+  </p:clrMapOvr>
+  <mc:AlternateContent xmlns:mc="http://schemas.openxmlformats.org/markup-compatibility/2006">
+    <mc:Choice xmlns:p14="http://schemas.microsoft.com/office/powerpoint/2010/main" Requires="p14">
+      <p:transition spd="med" p14:dur="700">
+        <p:fade/>
+      </p:transition>
+    </mc:Choice>
+    <mc:Fallback>
+      <p:transition spd="med">
+        <p:fade/>
+      </p:transition>
+    </mc:Fallback>
+  </mc:AlternateContent>
+</p:sld>
+</file>
+
+<file path=ppt/slides/slide3.xml><?xml version="1.0" encoding="utf-8"?>
+<p:sld xmlns:a="http://schemas.openxmlformats.org/drawingml/2006/main" xmlns:r="http://schemas.openxmlformats.org/officeDocument/2006/relationships" xmlns:p="http://schemas.openxmlformats.org/presentationml/2006/main">
+  <p:cSld>
+    <p:spTree>
+      <p:nvGrpSpPr>
+        <p:cNvPr id="1" name=""/>
+        <p:cNvGrpSpPr/>
+        <p:nvPr/>
+      </p:nvGrpSpPr>
+      <p:grpSpPr>
+        <a:xfrm>
+          <a:off x="0" y="0"/>
+          <a:ext cx="0" cy="0"/>
+          <a:chOff x="0" y="0"/>
+          <a:chExt cx="0" cy="0"/>
+        </a:xfrm>
+      </p:grpSpPr>
+      <p:sp>
+        <p:nvSpPr>
+          <p:cNvPr id="2" name="Title 1">
             <a:extLst>
               <a:ext uri="{FF2B5EF4-FFF2-40B4-BE49-F238E27FC236}">
-                <a16:creationId xmlns:a16="http://schemas.microsoft.com/office/drawing/2014/main" id="{A8B4C3B4-D262-4FF2-3AE0-F5365A212DA8}"/>
+                <a16:creationId xmlns:a16="http://schemas.microsoft.com/office/drawing/2014/main" id="{C60C9FC5-B5D5-E232-2B47-446FDCCFD8C8}"/>
               </a:ext>
             </a:extLst>
           </p:cNvPr>
-          <p:cNvSpPr txBox="1"/>
+          <p:cNvSpPr>
+            <a:spLocks noGrp="1"/>
+          </p:cNvSpPr>
+          <p:nvPr>
+            <p:ph type="title"/>
+          </p:nvPr>
+        </p:nvSpPr>
+        <p:spPr/>
+        <p:txBody>
+          <a:bodyPr/>
+          <a:lstStyle/>
+          <a:p>
+            <a:r>
+              <a:rPr lang="en-US" dirty="0"/>
+              <a:t>Stakeholder Interest</a:t>
+            </a:r>
+          </a:p>
+        </p:txBody>
+      </p:sp>
+      <p:sp>
+        <p:nvSpPr>
+          <p:cNvPr id="3" name="Content Placeholder 2">
+            <a:extLst>
+              <a:ext uri="{FF2B5EF4-FFF2-40B4-BE49-F238E27FC236}">
+                <a16:creationId xmlns:a16="http://schemas.microsoft.com/office/drawing/2014/main" id="{12EDB104-3CF2-E9BA-0CBF-F497C3B5C063}"/>
+              </a:ext>
+            </a:extLst>
+          </p:cNvPr>
+          <p:cNvSpPr>
+            <a:spLocks noGrp="1"/>
+          </p:cNvSpPr>
+          <p:nvPr>
+            <p:ph idx="1"/>
+          </p:nvPr>
+        </p:nvSpPr>
+        <p:spPr/>
+        <p:txBody>
+          <a:bodyPr/>
+          <a:lstStyle/>
+          <a:p>
+            <a:r>
+              <a:rPr lang="en-US" dirty="0"/>
+              <a:t>Evaluate whether specific industries are unable/unlikely to divest</a:t>
+            </a:r>
+          </a:p>
+          <a:p>
+            <a:r>
+              <a:rPr lang="en-US" dirty="0"/>
+              <a:t>Inform future negotiation strategies</a:t>
+            </a:r>
+          </a:p>
+          <a:p>
+            <a:r>
+              <a:rPr lang="en-US" dirty="0"/>
+              <a:t>Assess significant disparities to determine vulnerable companies for sanctions strategies</a:t>
+            </a:r>
+          </a:p>
+        </p:txBody>
+      </p:sp>
+      <p:pic>
+        <p:nvPicPr>
+          <p:cNvPr id="1026" name="Picture 2" descr="Xi Jinping and Vladimir Putin in a photo released by Russian state media.">
+            <a:extLst>
+              <a:ext uri="{FF2B5EF4-FFF2-40B4-BE49-F238E27FC236}">
+                <a16:creationId xmlns:a16="http://schemas.microsoft.com/office/drawing/2014/main" id="{3623747D-348C-8774-A9FD-4D914FD83FAA}"/>
+              </a:ext>
+            </a:extLst>
+          </p:cNvPr>
+          <p:cNvPicPr>
+            <a:picLocks noChangeAspect="1" noChangeArrowheads="1"/>
+          </p:cNvPicPr>
           <p:nvPr/>
-        </p:nvSpPr>
-        <p:spPr>
+        </p:nvPicPr>
+        <p:blipFill>
+          <a:blip r:embed="rId3">
+            <a:extLst>
+              <a:ext uri="{28A0092B-C50C-407E-A947-70E740481C1C}">
+                <a14:useLocalDpi xmlns:a14="http://schemas.microsoft.com/office/drawing/2010/main" val="0"/>
+              </a:ext>
+            </a:extLst>
+          </a:blip>
+          <a:srcRect/>
+          <a:stretch>
+            <a:fillRect/>
+          </a:stretch>
+        </p:blipFill>
+        <p:spPr bwMode="auto">
           <a:xfrm>
-            <a:off x="2514600" y="1676400"/>
-            <a:ext cx="8229600" cy="1200329"/>
+            <a:off x="6972300" y="3505200"/>
+            <a:ext cx="3771900" cy="2514600"/>
           </a:xfrm>
           <a:prstGeom prst="rect">
             <a:avLst/>
           </a:prstGeom>
           <a:noFill/>
+          <a:extLst>
+            <a:ext uri="{909E8E84-426E-40DD-AFC4-6F175D3DCCD1}">
+              <a14:hiddenFill xmlns:a14="http://schemas.microsoft.com/office/drawing/2010/main">
+                <a:solidFill>
+                  <a:srgbClr val="FFFFFF"/>
+                </a:solidFill>
+              </a14:hiddenFill>
+            </a:ext>
+          </a:extLst>
         </p:spPr>
-        <p:txBody>
-          <a:bodyPr wrap="square" rtlCol="0">
-            <a:spAutoFit/>
-          </a:bodyPr>
-          <a:lstStyle/>
-          <a:p>
-            <a:r>
-              <a:rPr lang="en-US" sz="7200" dirty="0"/>
-              <a:t>UPDATE</a:t>
-            </a:r>
-          </a:p>
-        </p:txBody>
-      </p:sp>
+      </p:pic>
     </p:spTree>
     <p:extLst>
       <p:ext uri="{BB962C8B-B14F-4D97-AF65-F5344CB8AC3E}">
-        <p14:creationId xmlns:p14="http://schemas.microsoft.com/office/powerpoint/2010/main" val="3987091705"/>
+        <p14:creationId xmlns:p14="http://schemas.microsoft.com/office/powerpoint/2010/main" val="3181378257"/>
       </p:ext>
     </p:extLst>
   </p:cSld>
@@ -4859,8 +4815,8 @@
         </p:nvSpPr>
         <p:spPr>
           <a:xfrm>
-            <a:off x="640773" y="195986"/>
-            <a:ext cx="10515600" cy="1325563"/>
+            <a:off x="609600" y="228600"/>
+            <a:ext cx="10515600" cy="911949"/>
           </a:xfrm>
         </p:spPr>
         <p:txBody>
@@ -4892,247 +4848,633 @@
         </p:nvSpPr>
         <p:spPr>
           <a:xfrm>
-            <a:off x="370609" y="1358034"/>
-            <a:ext cx="10515600" cy="4351338"/>
+            <a:off x="421950" y="1447800"/>
+            <a:ext cx="3680560" cy="4800601"/>
           </a:xfrm>
         </p:spPr>
         <p:txBody>
-          <a:bodyPr/>
+          <a:bodyPr>
+            <a:normAutofit/>
+          </a:bodyPr>
           <a:lstStyle/>
           <a:p>
             <a:r>
               <a:rPr lang="en-US" dirty="0"/>
-              <a:t>Channel name</a:t>
-            </a:r>
-          </a:p>
-          <a:p>
+              <a:t>Company Name</a:t>
+            </a:r>
+          </a:p>
+          <a:p>
+            <a:pPr lvl="1"/>
             <a:r>
               <a:rPr lang="en-US" dirty="0"/>
-              <a:t>Trending date</a:t>
+              <a:t>1581 Companies</a:t>
             </a:r>
           </a:p>
           <a:p>
             <a:r>
               <a:rPr lang="en-US" dirty="0"/>
-              <a:t>Publish time</a:t>
+              <a:t>Actions taken since the Invasion</a:t>
             </a:r>
           </a:p>
           <a:p>
             <a:r>
               <a:rPr lang="en-US" dirty="0"/>
-              <a:t>Views</a:t>
-            </a:r>
-          </a:p>
-          <a:p>
+              <a:t>Company Industry: </a:t>
+            </a:r>
+          </a:p>
+          <a:p>
+            <a:pPr lvl="1"/>
             <a:r>
               <a:rPr lang="en-US" dirty="0"/>
-              <a:t>Comment count</a:t>
+              <a:t>12 categories</a:t>
             </a:r>
           </a:p>
           <a:p>
             <a:r>
               <a:rPr lang="en-US" dirty="0"/>
-              <a:t>Video Id</a:t>
-            </a:r>
-          </a:p>
-          <a:p>
+              <a:t>Country of Origin: </a:t>
+            </a:r>
+          </a:p>
+          <a:p>
+            <a:pPr lvl="1"/>
             <a:r>
               <a:rPr lang="en-US" dirty="0"/>
-              <a:t>Category </a:t>
-            </a:r>
-          </a:p>
-        </p:txBody>
-      </p:sp>
-      <p:grpSp>
-        <p:nvGrpSpPr>
-          <p:cNvPr id="4" name="Group 3">
+              <a:t>67 represented</a:t>
+            </a:r>
+          </a:p>
+          <a:p>
+            <a:r>
+              <a:rPr lang="en-US" dirty="0"/>
+              <a:t>Grade: </a:t>
+            </a:r>
+          </a:p>
+          <a:p>
+            <a:pPr lvl="1"/>
+            <a:r>
+              <a:rPr lang="en-US" dirty="0"/>
+              <a:t>A, B, C, D, F</a:t>
+            </a:r>
+          </a:p>
+        </p:txBody>
+      </p:sp>
+      <p:graphicFrame>
+        <p:nvGraphicFramePr>
+          <p:cNvPr id="6" name="Table 9">
             <a:extLst>
               <a:ext uri="{FF2B5EF4-FFF2-40B4-BE49-F238E27FC236}">
-                <a16:creationId xmlns:a16="http://schemas.microsoft.com/office/drawing/2014/main" id="{4A63A429-1917-3EEF-F56E-16779D7CAB1F}"/>
+                <a16:creationId xmlns:a16="http://schemas.microsoft.com/office/drawing/2014/main" id="{977B4097-1DB4-ABC0-CB93-7C396AACFD70}"/>
               </a:ext>
             </a:extLst>
           </p:cNvPr>
-          <p:cNvGrpSpPr/>
-          <p:nvPr/>
-        </p:nvGrpSpPr>
-        <p:grpSpPr>
-          <a:xfrm>
-            <a:off x="3886200" y="762000"/>
-            <a:ext cx="8132620" cy="5228359"/>
-            <a:chOff x="5104255" y="1825625"/>
-            <a:chExt cx="6249545" cy="3689125"/>
-          </a:xfrm>
-        </p:grpSpPr>
-        <p:pic>
-          <p:nvPicPr>
-            <p:cNvPr id="7" name="Picture 6">
-              <a:extLst>
-                <a:ext uri="{FF2B5EF4-FFF2-40B4-BE49-F238E27FC236}">
-                  <a16:creationId xmlns:a16="http://schemas.microsoft.com/office/drawing/2014/main" id="{872CBD46-C24B-8F44-F617-BC86E411AE5B}"/>
-                </a:ext>
-              </a:extLst>
-            </p:cNvPr>
-            <p:cNvPicPr>
-              <a:picLocks noChangeAspect="1"/>
-            </p:cNvPicPr>
-            <p:nvPr/>
-          </p:nvPicPr>
-          <p:blipFill>
-            <a:blip r:embed="rId2">
-              <a:extLst>
-                <a:ext uri="{28A0092B-C50C-407E-A947-70E740481C1C}">
-                  <a14:useLocalDpi xmlns:a14="http://schemas.microsoft.com/office/drawing/2010/main" val="0"/>
-                </a:ext>
-              </a:extLst>
-            </a:blip>
-            <a:stretch>
-              <a:fillRect/>
-            </a:stretch>
-          </p:blipFill>
-          <p:spPr>
-            <a:xfrm>
-              <a:off x="5104255" y="1825625"/>
-              <a:ext cx="6249545" cy="3689125"/>
-            </a:xfrm>
-            <a:prstGeom prst="rect">
-              <a:avLst/>
-            </a:prstGeom>
-          </p:spPr>
-        </p:pic>
-        <p:sp>
-          <p:nvSpPr>
-            <p:cNvPr id="8" name="Rectangle 7">
-              <a:extLst>
-                <a:ext uri="{FF2B5EF4-FFF2-40B4-BE49-F238E27FC236}">
-                  <a16:creationId xmlns:a16="http://schemas.microsoft.com/office/drawing/2014/main" id="{53B37133-9BA9-E94A-8ADC-3F696ED7CE97}"/>
-                </a:ext>
-              </a:extLst>
-            </p:cNvPr>
-            <p:cNvSpPr/>
-            <p:nvPr/>
-          </p:nvSpPr>
-          <p:spPr>
-            <a:xfrm>
-              <a:off x="5264209" y="1825625"/>
-              <a:ext cx="1602583" cy="3689125"/>
-            </a:xfrm>
-            <a:prstGeom prst="rect">
-              <a:avLst/>
-            </a:prstGeom>
-            <a:solidFill>
-              <a:schemeClr val="accent1">
-                <a:alpha val="30000"/>
-              </a:schemeClr>
-            </a:solidFill>
-          </p:spPr>
-          <p:style>
-            <a:lnRef idx="2">
-              <a:schemeClr val="accent1">
-                <a:shade val="15000"/>
-              </a:schemeClr>
-            </a:lnRef>
-            <a:fillRef idx="1">
-              <a:schemeClr val="accent1"/>
-            </a:fillRef>
-            <a:effectRef idx="0">
-              <a:schemeClr val="accent1"/>
-            </a:effectRef>
-            <a:fontRef idx="minor">
-              <a:schemeClr val="lt1"/>
-            </a:fontRef>
-          </p:style>
-          <p:txBody>
-            <a:bodyPr rtlCol="0" anchor="ctr"/>
-            <a:lstStyle/>
-            <a:p>
-              <a:pPr algn="ctr"/>
-              <a:endParaRPr lang="en-US"/>
-            </a:p>
-          </p:txBody>
-        </p:sp>
-        <p:sp>
-          <p:nvSpPr>
-            <p:cNvPr id="9" name="Rectangle 8">
-              <a:extLst>
-                <a:ext uri="{FF2B5EF4-FFF2-40B4-BE49-F238E27FC236}">
-                  <a16:creationId xmlns:a16="http://schemas.microsoft.com/office/drawing/2014/main" id="{4FDA7B98-96E1-6683-BEB7-73C8BCAE1E0F}"/>
-                </a:ext>
-              </a:extLst>
-            </p:cNvPr>
-            <p:cNvSpPr/>
-            <p:nvPr/>
-          </p:nvSpPr>
-          <p:spPr>
-            <a:xfrm>
-              <a:off x="7940002" y="1825625"/>
-              <a:ext cx="263222" cy="3689125"/>
-            </a:xfrm>
-            <a:prstGeom prst="rect">
-              <a:avLst/>
-            </a:prstGeom>
-            <a:solidFill>
-              <a:schemeClr val="accent1">
-                <a:alpha val="30000"/>
-              </a:schemeClr>
-            </a:solidFill>
-          </p:spPr>
-          <p:style>
-            <a:lnRef idx="2">
-              <a:schemeClr val="accent1">
-                <a:shade val="15000"/>
-              </a:schemeClr>
-            </a:lnRef>
-            <a:fillRef idx="1">
-              <a:schemeClr val="accent1"/>
-            </a:fillRef>
-            <a:effectRef idx="0">
-              <a:schemeClr val="accent1"/>
-            </a:effectRef>
-            <a:fontRef idx="minor">
-              <a:schemeClr val="lt1"/>
-            </a:fontRef>
-          </p:style>
-          <p:txBody>
-            <a:bodyPr rtlCol="0" anchor="ctr"/>
-            <a:lstStyle/>
-            <a:p>
-              <a:pPr algn="ctr"/>
-              <a:endParaRPr lang="en-US"/>
-            </a:p>
-          </p:txBody>
-        </p:sp>
-      </p:grpSp>
-      <p:sp>
-        <p:nvSpPr>
-          <p:cNvPr id="5" name="TextBox 4">
+          <p:cNvGraphicFramePr>
+            <a:graphicFrameLocks noGrp="1"/>
+          </p:cNvGraphicFramePr>
+          <p:nvPr>
+            <p:extLst>
+              <p:ext uri="{D42A27DB-BD31-4B8C-83A1-F6EECF244321}">
+                <p14:modId xmlns:p14="http://schemas.microsoft.com/office/powerpoint/2010/main" val="1191686251"/>
+              </p:ext>
+            </p:extLst>
+          </p:nvPr>
+        </p:nvGraphicFramePr>
+        <p:xfrm>
+          <a:off x="4343400" y="1787898"/>
+          <a:ext cx="7426650" cy="3282203"/>
+        </p:xfrm>
+        <a:graphic>
+          <a:graphicData uri="http://schemas.openxmlformats.org/drawingml/2006/table">
+            <a:tbl>
+              <a:tblPr firstRow="1" bandRow="1">
+                <a:tableStyleId>{3B4B98B0-60AC-42C2-AFA5-B58CD77FA1E5}</a:tableStyleId>
+              </a:tblPr>
+              <a:tblGrid>
+                <a:gridCol w="1215830">
+                  <a:extLst>
+                    <a:ext uri="{9D8B030D-6E8A-4147-A177-3AD203B41FA5}">
+                      <a16:colId xmlns:a16="http://schemas.microsoft.com/office/drawing/2014/main" val="1291309560"/>
+                    </a:ext>
+                  </a:extLst>
+                </a:gridCol>
+                <a:gridCol w="2061808">
+                  <a:extLst>
+                    <a:ext uri="{9D8B030D-6E8A-4147-A177-3AD203B41FA5}">
+                      <a16:colId xmlns:a16="http://schemas.microsoft.com/office/drawing/2014/main" val="3583882788"/>
+                    </a:ext>
+                  </a:extLst>
+                </a:gridCol>
+                <a:gridCol w="1752600">
+                  <a:extLst>
+                    <a:ext uri="{9D8B030D-6E8A-4147-A177-3AD203B41FA5}">
+                      <a16:colId xmlns:a16="http://schemas.microsoft.com/office/drawing/2014/main" val="3171032614"/>
+                    </a:ext>
+                  </a:extLst>
+                </a:gridCol>
+                <a:gridCol w="1600200">
+                  <a:extLst>
+                    <a:ext uri="{9D8B030D-6E8A-4147-A177-3AD203B41FA5}">
+                      <a16:colId xmlns:a16="http://schemas.microsoft.com/office/drawing/2014/main" val="297590897"/>
+                    </a:ext>
+                  </a:extLst>
+                </a:gridCol>
+                <a:gridCol w="796212">
+                  <a:extLst>
+                    <a:ext uri="{9D8B030D-6E8A-4147-A177-3AD203B41FA5}">
+                      <a16:colId xmlns:a16="http://schemas.microsoft.com/office/drawing/2014/main" val="2816260752"/>
+                    </a:ext>
+                  </a:extLst>
+                </a:gridCol>
+              </a:tblGrid>
+              <a:tr h="349373">
+                <a:tc>
+                  <a:txBody>
+                    <a:bodyPr/>
+                    <a:lstStyle/>
+                    <a:p>
+                      <a:r>
+                        <a:rPr lang="en-US" sz="1400" b="1" u="sng" dirty="0"/>
+                        <a:t>Name</a:t>
+                      </a:r>
+                    </a:p>
+                  </a:txBody>
+                  <a:tcPr/>
+                </a:tc>
+                <a:tc>
+                  <a:txBody>
+                    <a:bodyPr/>
+                    <a:lstStyle/>
+                    <a:p>
+                      <a:r>
+                        <a:rPr lang="en-US" sz="1400" b="1" u="sng" dirty="0"/>
+                        <a:t>Action</a:t>
+                      </a:r>
+                    </a:p>
+                  </a:txBody>
+                  <a:tcPr/>
+                </a:tc>
+                <a:tc>
+                  <a:txBody>
+                    <a:bodyPr/>
+                    <a:lstStyle/>
+                    <a:p>
+                      <a:r>
+                        <a:rPr lang="en-US" sz="1400" b="1" u="sng" dirty="0"/>
+                        <a:t>Industry</a:t>
+                      </a:r>
+                    </a:p>
+                  </a:txBody>
+                  <a:tcPr/>
+                </a:tc>
+                <a:tc>
+                  <a:txBody>
+                    <a:bodyPr/>
+                    <a:lstStyle/>
+                    <a:p>
+                      <a:r>
+                        <a:rPr lang="en-US" sz="1400" b="1" u="sng" dirty="0"/>
+                        <a:t>Country</a:t>
+                      </a:r>
+                    </a:p>
+                  </a:txBody>
+                  <a:tcPr/>
+                </a:tc>
+                <a:tc>
+                  <a:txBody>
+                    <a:bodyPr/>
+                    <a:lstStyle/>
+                    <a:p>
+                      <a:r>
+                        <a:rPr lang="en-US" sz="1400" b="1" u="sng" dirty="0"/>
+                        <a:t>Grade</a:t>
+                      </a:r>
+                    </a:p>
+                  </a:txBody>
+                  <a:tcPr/>
+                </a:tc>
+                <a:extLst>
+                  <a:ext uri="{0D108BD9-81ED-4DB2-BD59-A6C34878D82A}">
+                    <a16:rowId xmlns:a16="http://schemas.microsoft.com/office/drawing/2014/main" val="2571287981"/>
+                  </a:ext>
+                </a:extLst>
+              </a:tr>
+              <a:tr h="349373">
+                <a:tc>
+                  <a:txBody>
+                    <a:bodyPr/>
+                    <a:lstStyle/>
+                    <a:p>
+                      <a:r>
+                        <a:rPr lang="en-US" sz="1400" dirty="0"/>
+                        <a:t>China Mobile</a:t>
+                      </a:r>
+                    </a:p>
+                  </a:txBody>
+                  <a:tcPr/>
+                </a:tc>
+                <a:tc>
+                  <a:txBody>
+                    <a:bodyPr/>
+                    <a:lstStyle/>
+                    <a:p>
+                      <a:r>
+                        <a:rPr lang="en-US" sz="1400" dirty="0"/>
+                        <a:t>Business as usual</a:t>
+                      </a:r>
+                    </a:p>
+                  </a:txBody>
+                  <a:tcPr/>
+                </a:tc>
+                <a:tc>
+                  <a:txBody>
+                    <a:bodyPr/>
+                    <a:lstStyle/>
+                    <a:p>
+                      <a:r>
+                        <a:rPr lang="en-US" sz="1400" dirty="0"/>
+                        <a:t>Communications</a:t>
+                      </a:r>
+                    </a:p>
+                  </a:txBody>
+                  <a:tcPr/>
+                </a:tc>
+                <a:tc>
+                  <a:txBody>
+                    <a:bodyPr/>
+                    <a:lstStyle/>
+                    <a:p>
+                      <a:r>
+                        <a:rPr lang="en-US" sz="1400" dirty="0"/>
+                        <a:t>China</a:t>
+                      </a:r>
+                    </a:p>
+                  </a:txBody>
+                  <a:tcPr/>
+                </a:tc>
+                <a:tc>
+                  <a:txBody>
+                    <a:bodyPr/>
+                    <a:lstStyle/>
+                    <a:p>
+                      <a:r>
+                        <a:rPr lang="en-US" sz="1400" dirty="0"/>
+                        <a:t>F</a:t>
+                      </a:r>
+                    </a:p>
+                  </a:txBody>
+                  <a:tcPr/>
+                </a:tc>
+                <a:extLst>
+                  <a:ext uri="{0D108BD9-81ED-4DB2-BD59-A6C34878D82A}">
+                    <a16:rowId xmlns:a16="http://schemas.microsoft.com/office/drawing/2014/main" val="1293308160"/>
+                  </a:ext>
+                </a:extLst>
+              </a:tr>
+              <a:tr h="488166">
+                <a:tc>
+                  <a:txBody>
+                    <a:bodyPr/>
+                    <a:lstStyle/>
+                    <a:p>
+                      <a:r>
+                        <a:rPr lang="en-US" sz="1400" dirty="0"/>
+                        <a:t>Guess</a:t>
+                      </a:r>
+                    </a:p>
+                  </a:txBody>
+                  <a:tcPr/>
+                </a:tc>
+                <a:tc>
+                  <a:txBody>
+                    <a:bodyPr/>
+                    <a:lstStyle/>
+                    <a:p>
+                      <a:r>
+                        <a:rPr lang="en-US" sz="1400" dirty="0"/>
+                        <a:t>Business as usual</a:t>
+                      </a:r>
+                    </a:p>
+                  </a:txBody>
+                  <a:tcPr/>
+                </a:tc>
+                <a:tc>
+                  <a:txBody>
+                    <a:bodyPr/>
+                    <a:lstStyle/>
+                    <a:p>
+                      <a:r>
+                        <a:rPr lang="en-US" sz="1400" dirty="0"/>
+                        <a:t>Consumer Discretionary</a:t>
+                      </a:r>
+                    </a:p>
+                  </a:txBody>
+                  <a:tcPr/>
+                </a:tc>
+                <a:tc>
+                  <a:txBody>
+                    <a:bodyPr/>
+                    <a:lstStyle/>
+                    <a:p>
+                      <a:r>
+                        <a:rPr lang="en-US" sz="1400" dirty="0"/>
+                        <a:t>United States</a:t>
+                      </a:r>
+                    </a:p>
+                  </a:txBody>
+                  <a:tcPr/>
+                </a:tc>
+                <a:tc>
+                  <a:txBody>
+                    <a:bodyPr/>
+                    <a:lstStyle/>
+                    <a:p>
+                      <a:r>
+                        <a:rPr lang="en-US" sz="1400" dirty="0"/>
+                        <a:t>F</a:t>
+                      </a:r>
+                    </a:p>
+                  </a:txBody>
+                  <a:tcPr/>
+                </a:tc>
+                <a:extLst>
+                  <a:ext uri="{0D108BD9-81ED-4DB2-BD59-A6C34878D82A}">
+                    <a16:rowId xmlns:a16="http://schemas.microsoft.com/office/drawing/2014/main" val="909069325"/>
+                  </a:ext>
+                </a:extLst>
+              </a:tr>
+              <a:tr h="689175">
+                <a:tc>
+                  <a:txBody>
+                    <a:bodyPr/>
+                    <a:lstStyle/>
+                    <a:p>
+                      <a:r>
+                        <a:rPr lang="en-US" sz="1400" dirty="0"/>
+                        <a:t>TEPCO</a:t>
+                      </a:r>
+                    </a:p>
+                  </a:txBody>
+                  <a:tcPr/>
+                </a:tc>
+                <a:tc>
+                  <a:txBody>
+                    <a:bodyPr/>
+                    <a:lstStyle/>
+                    <a:p>
+                      <a:r>
+                        <a:rPr lang="en-US" sz="1400" dirty="0"/>
+                        <a:t>Continues purchasing Russian Gas</a:t>
+                      </a:r>
+                    </a:p>
+                  </a:txBody>
+                  <a:tcPr/>
+                </a:tc>
+                <a:tc>
+                  <a:txBody>
+                    <a:bodyPr/>
+                    <a:lstStyle/>
+                    <a:p>
+                      <a:r>
+                        <a:rPr lang="en-US" sz="1400" dirty="0"/>
+                        <a:t>Energy</a:t>
+                      </a:r>
+                    </a:p>
+                  </a:txBody>
+                  <a:tcPr/>
+                </a:tc>
+                <a:tc>
+                  <a:txBody>
+                    <a:bodyPr/>
+                    <a:lstStyle/>
+                    <a:p>
+                      <a:r>
+                        <a:rPr lang="en-US" sz="1400" dirty="0"/>
+                        <a:t>Japan</a:t>
+                      </a:r>
+                    </a:p>
+                  </a:txBody>
+                  <a:tcPr/>
+                </a:tc>
+                <a:tc>
+                  <a:txBody>
+                    <a:bodyPr/>
+                    <a:lstStyle/>
+                    <a:p>
+                      <a:r>
+                        <a:rPr lang="en-US" sz="1400" dirty="0"/>
+                        <a:t>F</a:t>
+                      </a:r>
+                    </a:p>
+                  </a:txBody>
+                  <a:tcPr/>
+                </a:tc>
+                <a:extLst>
+                  <a:ext uri="{0D108BD9-81ED-4DB2-BD59-A6C34878D82A}">
+                    <a16:rowId xmlns:a16="http://schemas.microsoft.com/office/drawing/2014/main" val="4139178464"/>
+                  </a:ext>
+                </a:extLst>
+              </a:tr>
+              <a:tr h="689175">
+                <a:tc>
+                  <a:txBody>
+                    <a:bodyPr/>
+                    <a:lstStyle/>
+                    <a:p>
+                      <a:r>
+                        <a:rPr lang="en-US" sz="1400" dirty="0" err="1"/>
+                        <a:t>WeWork</a:t>
+                      </a:r>
+                      <a:endParaRPr lang="en-US" sz="1400" dirty="0"/>
+                    </a:p>
+                  </a:txBody>
+                  <a:tcPr/>
+                </a:tc>
+                <a:tc>
+                  <a:txBody>
+                    <a:bodyPr/>
+                    <a:lstStyle/>
+                    <a:p>
+                      <a:r>
+                        <a:rPr lang="en-US" sz="1400" dirty="0"/>
+                        <a:t>Planning Divestment of Russian Operations</a:t>
+                      </a:r>
+                    </a:p>
+                  </a:txBody>
+                  <a:tcPr/>
+                </a:tc>
+                <a:tc>
+                  <a:txBody>
+                    <a:bodyPr/>
+                    <a:lstStyle/>
+                    <a:p>
+                      <a:r>
+                        <a:rPr lang="en-US" sz="1400" dirty="0"/>
+                        <a:t>Real Estate</a:t>
+                      </a:r>
+                    </a:p>
+                  </a:txBody>
+                  <a:tcPr/>
+                </a:tc>
+                <a:tc>
+                  <a:txBody>
+                    <a:bodyPr/>
+                    <a:lstStyle/>
+                    <a:p>
+                      <a:r>
+                        <a:rPr lang="en-US" sz="1400" dirty="0"/>
+                        <a:t>United States</a:t>
+                      </a:r>
+                    </a:p>
+                  </a:txBody>
+                  <a:tcPr/>
+                </a:tc>
+                <a:tc>
+                  <a:txBody>
+                    <a:bodyPr/>
+                    <a:lstStyle/>
+                    <a:p>
+                      <a:r>
+                        <a:rPr lang="en-US" sz="1400" dirty="0"/>
+                        <a:t>A</a:t>
+                      </a:r>
+                    </a:p>
+                  </a:txBody>
+                  <a:tcPr/>
+                </a:tc>
+                <a:extLst>
+                  <a:ext uri="{0D108BD9-81ED-4DB2-BD59-A6C34878D82A}">
+                    <a16:rowId xmlns:a16="http://schemas.microsoft.com/office/drawing/2014/main" val="2284074517"/>
+                  </a:ext>
+                </a:extLst>
+              </a:tr>
+              <a:tr h="488166">
+                <a:tc>
+                  <a:txBody>
+                    <a:bodyPr/>
+                    <a:lstStyle/>
+                    <a:p>
+                      <a:r>
+                        <a:rPr lang="en-US" sz="1400" dirty="0"/>
+                        <a:t>Uber</a:t>
+                      </a:r>
+                    </a:p>
+                  </a:txBody>
+                  <a:tcPr/>
+                </a:tc>
+                <a:tc>
+                  <a:txBody>
+                    <a:bodyPr/>
+                    <a:lstStyle/>
+                    <a:p>
+                      <a:r>
+                        <a:rPr lang="en-US" sz="1400" dirty="0"/>
+                        <a:t>Divest Yandex Partnership</a:t>
+                      </a:r>
+                    </a:p>
+                  </a:txBody>
+                  <a:tcPr/>
+                </a:tc>
+                <a:tc>
+                  <a:txBody>
+                    <a:bodyPr/>
+                    <a:lstStyle/>
+                    <a:p>
+                      <a:r>
+                        <a:rPr lang="en-US" sz="1400" dirty="0"/>
+                        <a:t>Information Technology</a:t>
+                      </a:r>
+                    </a:p>
+                  </a:txBody>
+                  <a:tcPr/>
+                </a:tc>
+                <a:tc>
+                  <a:txBody>
+                    <a:bodyPr/>
+                    <a:lstStyle/>
+                    <a:p>
+                      <a:r>
+                        <a:rPr lang="en-US" sz="1400" dirty="0"/>
+                        <a:t>United States</a:t>
+                      </a:r>
+                    </a:p>
+                  </a:txBody>
+                  <a:tcPr/>
+                </a:tc>
+                <a:tc>
+                  <a:txBody>
+                    <a:bodyPr/>
+                    <a:lstStyle/>
+                    <a:p>
+                      <a:r>
+                        <a:rPr lang="en-US" sz="1400" dirty="0"/>
+                        <a:t>A</a:t>
+                      </a:r>
+                    </a:p>
+                  </a:txBody>
+                  <a:tcPr/>
+                </a:tc>
+                <a:extLst>
+                  <a:ext uri="{0D108BD9-81ED-4DB2-BD59-A6C34878D82A}">
+                    <a16:rowId xmlns:a16="http://schemas.microsoft.com/office/drawing/2014/main" val="1286426115"/>
+                  </a:ext>
+                </a:extLst>
+              </a:tr>
+            </a:tbl>
+          </a:graphicData>
+        </a:graphic>
+      </p:graphicFrame>
+      <p:sp>
+        <p:nvSpPr>
+          <p:cNvPr id="10" name="Title 1">
             <a:extLst>
               <a:ext uri="{FF2B5EF4-FFF2-40B4-BE49-F238E27FC236}">
-                <a16:creationId xmlns:a16="http://schemas.microsoft.com/office/drawing/2014/main" id="{75B490BA-2504-277B-6923-05C81DEED74E}"/>
+                <a16:creationId xmlns:a16="http://schemas.microsoft.com/office/drawing/2014/main" id="{85658EFE-B8EB-9060-6199-36C41DB83389}"/>
               </a:ext>
             </a:extLst>
           </p:cNvPr>
-          <p:cNvSpPr txBox="1"/>
+          <p:cNvSpPr txBox="1">
+            <a:spLocks/>
+          </p:cNvSpPr>
           <p:nvPr/>
         </p:nvSpPr>
         <p:spPr>
           <a:xfrm>
-            <a:off x="1513609" y="4049372"/>
-            <a:ext cx="8229600" cy="1200329"/>
+            <a:off x="1249785" y="6400800"/>
+            <a:ext cx="10515600" cy="457200"/>
           </a:xfrm>
           <a:prstGeom prst="rect">
             <a:avLst/>
           </a:prstGeom>
-          <a:noFill/>
         </p:spPr>
         <p:txBody>
-          <a:bodyPr wrap="square" rtlCol="0">
-            <a:spAutoFit/>
+          <a:bodyPr vert="horz" lIns="91440" tIns="45720" rIns="91440" bIns="45720" rtlCol="0" anchor="b">
+            <a:normAutofit/>
           </a:bodyPr>
-          <a:lstStyle/>
-          <a:p>
-            <a:r>
-              <a:rPr lang="en-US" sz="7200" dirty="0"/>
-              <a:t>UPDATE</a:t>
+          <a:lstStyle>
+            <a:lvl1pPr algn="l" defTabSz="914400" rtl="0" eaLnBrk="1" latinLnBrk="0" hangingPunct="1">
+              <a:lnSpc>
+                <a:spcPct val="90000"/>
+              </a:lnSpc>
+              <a:spcBef>
+                <a:spcPct val="0"/>
+              </a:spcBef>
+              <a:buNone/>
+              <a:defRPr sz="3400" kern="1200">
+                <a:solidFill>
+                  <a:schemeClr val="accent1"/>
+                </a:solidFill>
+                <a:latin typeface="+mj-lt"/>
+                <a:ea typeface="+mj-ea"/>
+                <a:cs typeface="+mj-cs"/>
+              </a:defRPr>
+            </a:lvl1pPr>
+          </a:lstStyle>
+          <a:p>
+            <a:r>
+              <a:rPr lang="en-US" sz="2000" dirty="0">
+                <a:solidFill>
+                  <a:schemeClr val="tx1"/>
+                </a:solidFill>
+              </a:rPr>
+              <a:t>Data aggregated by researchers at the Yale Chief Executive Leadership Institute</a:t>
             </a:r>
           </a:p>
         </p:txBody>
@@ -5181,171 +5523,6 @@
       </p:grpSpPr>
       <p:sp>
         <p:nvSpPr>
-          <p:cNvPr id="2" name="Title 1">
-            <a:extLst>
-              <a:ext uri="{FF2B5EF4-FFF2-40B4-BE49-F238E27FC236}">
-                <a16:creationId xmlns:a16="http://schemas.microsoft.com/office/drawing/2014/main" id="{9139F471-CE0F-E83D-9D1E-3F11E509C543}"/>
-              </a:ext>
-            </a:extLst>
-          </p:cNvPr>
-          <p:cNvSpPr>
-            <a:spLocks noGrp="1"/>
-          </p:cNvSpPr>
-          <p:nvPr>
-            <p:ph type="title"/>
-          </p:nvPr>
-        </p:nvSpPr>
-        <p:spPr/>
-        <p:txBody>
-          <a:bodyPr/>
-          <a:lstStyle/>
-          <a:p>
-            <a:r>
-              <a:rPr lang="en-US" dirty="0"/>
-              <a:t>Data Cleaning</a:t>
-            </a:r>
-          </a:p>
-        </p:txBody>
-      </p:sp>
-      <p:sp>
-        <p:nvSpPr>
-          <p:cNvPr id="3" name="Content Placeholder 2">
-            <a:extLst>
-              <a:ext uri="{FF2B5EF4-FFF2-40B4-BE49-F238E27FC236}">
-                <a16:creationId xmlns:a16="http://schemas.microsoft.com/office/drawing/2014/main" id="{FC94F795-2A2D-F82F-AC6F-4612AB182093}"/>
-              </a:ext>
-            </a:extLst>
-          </p:cNvPr>
-          <p:cNvSpPr>
-            <a:spLocks noGrp="1"/>
-          </p:cNvSpPr>
-          <p:nvPr>
-            <p:ph idx="1"/>
-          </p:nvPr>
-        </p:nvSpPr>
-        <p:spPr/>
-        <p:txBody>
-          <a:bodyPr/>
-          <a:lstStyle/>
-          <a:p>
-            <a:r>
-              <a:rPr lang="en-US" dirty="0"/>
-              <a:t>Duplicate data</a:t>
-            </a:r>
-          </a:p>
-          <a:p>
-            <a:r>
-              <a:rPr lang="en-US" dirty="0"/>
-              <a:t>Time formatting consistency</a:t>
-            </a:r>
-          </a:p>
-          <a:p>
-            <a:pPr lvl="1"/>
-            <a:r>
-              <a:rPr lang="en-US" dirty="0"/>
-              <a:t>Converting time to integers</a:t>
-            </a:r>
-          </a:p>
-          <a:p>
-            <a:pPr lvl="1"/>
-            <a:r>
-              <a:rPr lang="en-US" dirty="0"/>
-              <a:t>Date/time formatting</a:t>
-            </a:r>
-          </a:p>
-          <a:p>
-            <a:r>
-              <a:rPr lang="en-US" dirty="0"/>
-              <a:t>Removing outliers</a:t>
-            </a:r>
-          </a:p>
-          <a:p>
-            <a:r>
-              <a:rPr lang="en-US" dirty="0"/>
-              <a:t>Visual clarity on category ids</a:t>
-            </a:r>
-          </a:p>
-        </p:txBody>
-      </p:sp>
-      <p:sp>
-        <p:nvSpPr>
-          <p:cNvPr id="4" name="TextBox 3">
-            <a:extLst>
-              <a:ext uri="{FF2B5EF4-FFF2-40B4-BE49-F238E27FC236}">
-                <a16:creationId xmlns:a16="http://schemas.microsoft.com/office/drawing/2014/main" id="{83419B16-88B0-C31E-1B69-1569A89DF86B}"/>
-              </a:ext>
-            </a:extLst>
-          </p:cNvPr>
-          <p:cNvSpPr txBox="1"/>
-          <p:nvPr/>
-        </p:nvSpPr>
-        <p:spPr>
-          <a:xfrm>
-            <a:off x="1513609" y="4049372"/>
-            <a:ext cx="8229600" cy="1200329"/>
-          </a:xfrm>
-          <a:prstGeom prst="rect">
-            <a:avLst/>
-          </a:prstGeom>
-          <a:noFill/>
-        </p:spPr>
-        <p:txBody>
-          <a:bodyPr wrap="square" rtlCol="0">
-            <a:spAutoFit/>
-          </a:bodyPr>
-          <a:lstStyle/>
-          <a:p>
-            <a:r>
-              <a:rPr lang="en-US" sz="7200" dirty="0"/>
-              <a:t>UPDATE</a:t>
-            </a:r>
-          </a:p>
-        </p:txBody>
-      </p:sp>
-    </p:spTree>
-    <p:extLst>
-      <p:ext uri="{BB962C8B-B14F-4D97-AF65-F5344CB8AC3E}">
-        <p14:creationId xmlns:p14="http://schemas.microsoft.com/office/powerpoint/2010/main" val="1644278326"/>
-      </p:ext>
-    </p:extLst>
-  </p:cSld>
-  <p:clrMapOvr>
-    <a:masterClrMapping/>
-  </p:clrMapOvr>
-  <mc:AlternateContent xmlns:mc="http://schemas.openxmlformats.org/markup-compatibility/2006" xmlns:p14="http://schemas.microsoft.com/office/powerpoint/2010/main">
-    <mc:Choice Requires="p14">
-      <p:transition spd="med" p14:dur="700">
-        <p:fade/>
-      </p:transition>
-    </mc:Choice>
-    <mc:Fallback xmlns="">
-      <p:transition spd="med">
-        <p:fade/>
-      </p:transition>
-    </mc:Fallback>
-  </mc:AlternateContent>
-</p:sld>
-</file>
-
-<file path=ppt/slides/slide6.xml><?xml version="1.0" encoding="utf-8"?>
-<p:sld xmlns:a="http://schemas.openxmlformats.org/drawingml/2006/main" xmlns:r="http://schemas.openxmlformats.org/officeDocument/2006/relationships" xmlns:p="http://schemas.openxmlformats.org/presentationml/2006/main">
-  <p:cSld>
-    <p:spTree>
-      <p:nvGrpSpPr>
-        <p:cNvPr id="1" name=""/>
-        <p:cNvGrpSpPr/>
-        <p:nvPr/>
-      </p:nvGrpSpPr>
-      <p:grpSpPr>
-        <a:xfrm>
-          <a:off x="0" y="0"/>
-          <a:ext cx="0" cy="0"/>
-          <a:chOff x="0" y="0"/>
-          <a:chExt cx="0" cy="0"/>
-        </a:xfrm>
-      </p:grpSpPr>
-      <p:sp>
-        <p:nvSpPr>
           <p:cNvPr id="2" name="Title 1"/>
           <p:cNvSpPr>
             <a:spLocks noGrp="1"/>
@@ -5400,7 +5577,7 @@
         </p:blipFill>
         <p:spPr>
           <a:xfrm>
-            <a:off x="1447800" y="1771650"/>
+            <a:off x="1981200" y="1750618"/>
             <a:ext cx="3657600" cy="3657600"/>
           </a:xfrm>
           <a:prstGeom prst="rect">
@@ -5430,7 +5607,7 @@
         </p:blipFill>
         <p:spPr>
           <a:xfrm>
-            <a:off x="6705600" y="1771650"/>
+            <a:off x="6096000" y="1771650"/>
             <a:ext cx="3657600" cy="3657600"/>
           </a:xfrm>
           <a:prstGeom prst="rect">
@@ -5690,90 +5867,7 @@
 </p:sld>
 </file>
 
-<file path=ppt/slides/slide7.xml><?xml version="1.0" encoding="utf-8"?>
-<p:sld xmlns:a="http://schemas.openxmlformats.org/drawingml/2006/main" xmlns:r="http://schemas.openxmlformats.org/officeDocument/2006/relationships" xmlns:p="http://schemas.openxmlformats.org/presentationml/2006/main">
-  <p:cSld>
-    <p:spTree>
-      <p:nvGrpSpPr>
-        <p:cNvPr id="1" name=""/>
-        <p:cNvGrpSpPr/>
-        <p:nvPr/>
-      </p:nvGrpSpPr>
-      <p:grpSpPr>
-        <a:xfrm>
-          <a:off x="0" y="0"/>
-          <a:ext cx="0" cy="0"/>
-          <a:chOff x="0" y="0"/>
-          <a:chExt cx="0" cy="0"/>
-        </a:xfrm>
-      </p:grpSpPr>
-      <p:sp>
-        <p:nvSpPr>
-          <p:cNvPr id="2" name="Title 1"/>
-          <p:cNvSpPr>
-            <a:spLocks noGrp="1"/>
-          </p:cNvSpPr>
-          <p:nvPr>
-            <p:ph type="title"/>
-          </p:nvPr>
-        </p:nvSpPr>
-        <p:spPr/>
-        <p:txBody>
-          <a:bodyPr/>
-          <a:lstStyle/>
-          <a:p>
-            <a:r>
-              <a:rPr lang="en-US" dirty="0"/>
-              <a:t>Add a Slide Title - 1</a:t>
-            </a:r>
-          </a:p>
-        </p:txBody>
-      </p:sp>
-      <p:sp>
-        <p:nvSpPr>
-          <p:cNvPr id="3" name="Text Placeholder 2"/>
-          <p:cNvSpPr>
-            <a:spLocks noGrp="1"/>
-          </p:cNvSpPr>
-          <p:nvPr>
-            <p:ph type="body" idx="1"/>
-          </p:nvPr>
-        </p:nvSpPr>
-        <p:spPr/>
-        <p:txBody>
-          <a:bodyPr/>
-          <a:lstStyle/>
-          <a:p>
-            <a:endParaRPr lang="en-US"/>
-          </a:p>
-        </p:txBody>
-      </p:sp>
-    </p:spTree>
-    <p:extLst>
-      <p:ext uri="{BB962C8B-B14F-4D97-AF65-F5344CB8AC3E}">
-        <p14:creationId xmlns:p14="http://schemas.microsoft.com/office/powerpoint/2010/main" val="1783796071"/>
-      </p:ext>
-    </p:extLst>
-  </p:cSld>
-  <p:clrMapOvr>
-    <a:masterClrMapping/>
-  </p:clrMapOvr>
-  <mc:AlternateContent xmlns:mc="http://schemas.openxmlformats.org/markup-compatibility/2006" xmlns:p14="http://schemas.microsoft.com/office/powerpoint/2010/main">
-    <mc:Choice Requires="p14">
-      <p:transition spd="med" p14:dur="700">
-        <p:fade/>
-      </p:transition>
-    </mc:Choice>
-    <mc:Fallback xmlns="">
-      <p:transition spd="med">
-        <p:fade/>
-      </p:transition>
-    </mc:Fallback>
-  </mc:AlternateContent>
-</p:sld>
-</file>
-
-<file path=ppt/slides/slide8.xml><?xml version="1.0" encoding="utf-8"?>
+<file path=ppt/slides/slide6.xml><?xml version="1.0" encoding="utf-8"?>
 <p:sld xmlns:a="http://schemas.openxmlformats.org/drawingml/2006/main" xmlns:r="http://schemas.openxmlformats.org/officeDocument/2006/relationships" xmlns:p="http://schemas.openxmlformats.org/presentationml/2006/main">
   <p:cSld>
     <p:spTree>
@@ -6072,8 +6166,8 @@
         </p:blipFill>
         <p:spPr>
           <a:xfrm>
-            <a:off x="1600200" y="1752600"/>
-            <a:ext cx="3952649" cy="3689917"/>
+            <a:off x="456885" y="1752600"/>
+            <a:ext cx="4038601" cy="3770156"/>
           </a:xfrm>
           <a:prstGeom prst="rect">
             <a:avLst/>
@@ -6102,7 +6196,7 @@
         </p:blipFill>
         <p:spPr>
           <a:xfrm>
-            <a:off x="6248400" y="1752600"/>
+            <a:off x="4800600" y="1752600"/>
             <a:ext cx="4038600" cy="3770156"/>
           </a:xfrm>
           <a:prstGeom prst="rect">
@@ -6110,10 +6204,1225 @@
           </a:prstGeom>
         </p:spPr>
       </p:pic>
+      <p:grpSp>
+        <p:nvGrpSpPr>
+          <p:cNvPr id="13" name="Group 12">
+            <a:extLst>
+              <a:ext uri="{FF2B5EF4-FFF2-40B4-BE49-F238E27FC236}">
+                <a16:creationId xmlns:a16="http://schemas.microsoft.com/office/drawing/2014/main" id="{30B6350C-95B3-3A38-F0B1-E4A2FAE2E26B}"/>
+              </a:ext>
+            </a:extLst>
+          </p:cNvPr>
+          <p:cNvGrpSpPr/>
+          <p:nvPr/>
+        </p:nvGrpSpPr>
+        <p:grpSpPr>
+          <a:xfrm>
+            <a:off x="8610600" y="1828078"/>
+            <a:ext cx="3124200" cy="1200329"/>
+            <a:chOff x="8610600" y="1828078"/>
+            <a:chExt cx="3124200" cy="1200329"/>
+          </a:xfrm>
+        </p:grpSpPr>
+        <p:sp>
+          <p:nvSpPr>
+            <p:cNvPr id="4" name="TextBox 3">
+              <a:extLst>
+                <a:ext uri="{FF2B5EF4-FFF2-40B4-BE49-F238E27FC236}">
+                  <a16:creationId xmlns:a16="http://schemas.microsoft.com/office/drawing/2014/main" id="{E3E8AEE9-85E0-E6AD-FE6B-54D6F2A657C9}"/>
+                </a:ext>
+              </a:extLst>
+            </p:cNvPr>
+            <p:cNvSpPr txBox="1"/>
+            <p:nvPr/>
+          </p:nvSpPr>
+          <p:spPr>
+            <a:xfrm>
+              <a:off x="9220200" y="1828078"/>
+              <a:ext cx="2514600" cy="1200329"/>
+            </a:xfrm>
+            <a:prstGeom prst="rect">
+              <a:avLst/>
+            </a:prstGeom>
+            <a:noFill/>
+            <a:ln>
+              <a:solidFill>
+                <a:schemeClr val="tx2">
+                  <a:lumMod val="90000"/>
+                </a:schemeClr>
+              </a:solidFill>
+            </a:ln>
+          </p:spPr>
+          <p:txBody>
+            <a:bodyPr wrap="square" rtlCol="0">
+              <a:spAutoFit/>
+            </a:bodyPr>
+            <a:lstStyle/>
+            <a:p>
+              <a:r>
+                <a:rPr lang="en-US" dirty="0"/>
+                <a:t>Reflected by “no-limit” partnership between China &amp; Russia.</a:t>
+              </a:r>
+            </a:p>
+          </p:txBody>
+        </p:sp>
+        <p:sp>
+          <p:nvSpPr>
+            <p:cNvPr id="12" name="Arrow: Left 11">
+              <a:extLst>
+                <a:ext uri="{FF2B5EF4-FFF2-40B4-BE49-F238E27FC236}">
+                  <a16:creationId xmlns:a16="http://schemas.microsoft.com/office/drawing/2014/main" id="{8587F76A-8F51-C7AB-2CE8-965392CFABE5}"/>
+                </a:ext>
+              </a:extLst>
+            </p:cNvPr>
+            <p:cNvSpPr/>
+            <p:nvPr/>
+          </p:nvSpPr>
+          <p:spPr>
+            <a:xfrm>
+              <a:off x="8610600" y="2474312"/>
+              <a:ext cx="615820" cy="192687"/>
+            </a:xfrm>
+            <a:prstGeom prst="leftArrow">
+              <a:avLst/>
+            </a:prstGeom>
+          </p:spPr>
+          <p:style>
+            <a:lnRef idx="2">
+              <a:schemeClr val="accent1">
+                <a:shade val="15000"/>
+              </a:schemeClr>
+            </a:lnRef>
+            <a:fillRef idx="1">
+              <a:schemeClr val="accent1"/>
+            </a:fillRef>
+            <a:effectRef idx="0">
+              <a:schemeClr val="accent1"/>
+            </a:effectRef>
+            <a:fontRef idx="minor">
+              <a:schemeClr val="lt1"/>
+            </a:fontRef>
+          </p:style>
+          <p:txBody>
+            <a:bodyPr rtlCol="0" anchor="ctr"/>
+            <a:lstStyle/>
+            <a:p>
+              <a:pPr algn="ctr"/>
+              <a:endParaRPr lang="en-US"/>
+            </a:p>
+          </p:txBody>
+        </p:sp>
+      </p:grpSp>
+      <p:grpSp>
+        <p:nvGrpSpPr>
+          <p:cNvPr id="15" name="Group 14">
+            <a:extLst>
+              <a:ext uri="{FF2B5EF4-FFF2-40B4-BE49-F238E27FC236}">
+                <a16:creationId xmlns:a16="http://schemas.microsoft.com/office/drawing/2014/main" id="{B92A07B0-21E0-0977-092D-91105BE676EF}"/>
+              </a:ext>
+            </a:extLst>
+          </p:cNvPr>
+          <p:cNvGrpSpPr/>
+          <p:nvPr/>
+        </p:nvGrpSpPr>
+        <p:grpSpPr>
+          <a:xfrm>
+            <a:off x="7848600" y="3368954"/>
+            <a:ext cx="3886200" cy="2031325"/>
+            <a:chOff x="7848600" y="3368954"/>
+            <a:chExt cx="3886200" cy="2031325"/>
+          </a:xfrm>
+        </p:grpSpPr>
+        <p:sp>
+          <p:nvSpPr>
+            <p:cNvPr id="6" name="TextBox 5">
+              <a:extLst>
+                <a:ext uri="{FF2B5EF4-FFF2-40B4-BE49-F238E27FC236}">
+                  <a16:creationId xmlns:a16="http://schemas.microsoft.com/office/drawing/2014/main" id="{4EE197AE-C054-86DE-22D8-314B6E8E9F58}"/>
+                </a:ext>
+              </a:extLst>
+            </p:cNvPr>
+            <p:cNvSpPr txBox="1"/>
+            <p:nvPr/>
+          </p:nvSpPr>
+          <p:spPr>
+            <a:xfrm>
+              <a:off x="9220200" y="3368954"/>
+              <a:ext cx="2514600" cy="2031325"/>
+            </a:xfrm>
+            <a:prstGeom prst="rect">
+              <a:avLst/>
+            </a:prstGeom>
+            <a:noFill/>
+            <a:ln>
+              <a:solidFill>
+                <a:schemeClr val="tx2">
+                  <a:lumMod val="90000"/>
+                </a:schemeClr>
+              </a:solidFill>
+            </a:ln>
+          </p:spPr>
+          <p:txBody>
+            <a:bodyPr wrap="square" rtlCol="0">
+              <a:spAutoFit/>
+            </a:bodyPr>
+            <a:lstStyle/>
+            <a:p>
+              <a:r>
+                <a:rPr lang="en-US" dirty="0"/>
+                <a:t>Reflected by President Macron’s statement about “getting caught up in crises that are not ours” and “strategic autonomy.”</a:t>
+              </a:r>
+            </a:p>
+          </p:txBody>
+        </p:sp>
+        <p:sp>
+          <p:nvSpPr>
+            <p:cNvPr id="14" name="Arrow: Left 13">
+              <a:extLst>
+                <a:ext uri="{FF2B5EF4-FFF2-40B4-BE49-F238E27FC236}">
+                  <a16:creationId xmlns:a16="http://schemas.microsoft.com/office/drawing/2014/main" id="{02D26443-FDAA-336C-9F6A-7FDA72264868}"/>
+                </a:ext>
+              </a:extLst>
+            </p:cNvPr>
+            <p:cNvSpPr/>
+            <p:nvPr/>
+          </p:nvSpPr>
+          <p:spPr>
+            <a:xfrm>
+              <a:off x="7848600" y="3691133"/>
+              <a:ext cx="1371600" cy="192687"/>
+            </a:xfrm>
+            <a:prstGeom prst="leftArrow">
+              <a:avLst/>
+            </a:prstGeom>
+          </p:spPr>
+          <p:style>
+            <a:lnRef idx="2">
+              <a:schemeClr val="accent1">
+                <a:shade val="15000"/>
+              </a:schemeClr>
+            </a:lnRef>
+            <a:fillRef idx="1">
+              <a:schemeClr val="accent1"/>
+            </a:fillRef>
+            <a:effectRef idx="0">
+              <a:schemeClr val="accent1"/>
+            </a:effectRef>
+            <a:fontRef idx="minor">
+              <a:schemeClr val="lt1"/>
+            </a:fontRef>
+          </p:style>
+          <p:txBody>
+            <a:bodyPr rtlCol="0" anchor="ctr"/>
+            <a:lstStyle/>
+            <a:p>
+              <a:pPr algn="ctr"/>
+              <a:endParaRPr lang="en-US"/>
+            </a:p>
+          </p:txBody>
+        </p:sp>
+      </p:grpSp>
     </p:spTree>
     <p:extLst>
       <p:ext uri="{BB962C8B-B14F-4D97-AF65-F5344CB8AC3E}">
         <p14:creationId xmlns:p14="http://schemas.microsoft.com/office/powerpoint/2010/main" val="430035269"/>
+      </p:ext>
+    </p:extLst>
+  </p:cSld>
+  <p:clrMapOvr>
+    <a:masterClrMapping/>
+  </p:clrMapOvr>
+  <mc:AlternateContent xmlns:mc="http://schemas.openxmlformats.org/markup-compatibility/2006" xmlns:p14="http://schemas.microsoft.com/office/powerpoint/2010/main">
+    <mc:Choice Requires="p14">
+      <p:transition spd="med" p14:dur="700">
+        <p:fade/>
+      </p:transition>
+    </mc:Choice>
+    <mc:Fallback xmlns="">
+      <p:transition spd="med">
+        <p:fade/>
+      </p:transition>
+    </mc:Fallback>
+  </mc:AlternateContent>
+  <p:timing>
+    <p:tnLst>
+      <p:par>
+        <p:cTn id="1" dur="indefinite" restart="never" nodeType="tmRoot">
+          <p:childTnLst>
+            <p:seq concurrent="1" nextAc="seek">
+              <p:cTn id="2" dur="indefinite" nodeType="mainSeq">
+                <p:childTnLst>
+                  <p:par>
+                    <p:cTn id="3" fill="hold">
+                      <p:stCondLst>
+                        <p:cond delay="indefinite"/>
+                      </p:stCondLst>
+                      <p:childTnLst>
+                        <p:par>
+                          <p:cTn id="4" fill="hold">
+                            <p:stCondLst>
+                              <p:cond delay="0"/>
+                            </p:stCondLst>
+                            <p:childTnLst>
+                              <p:par>
+                                <p:cTn id="5" presetID="1" presetClass="entr" presetSubtype="0" fill="hold" nodeType="clickEffect">
+                                  <p:stCondLst>
+                                    <p:cond delay="0"/>
+                                  </p:stCondLst>
+                                  <p:childTnLst>
+                                    <p:set>
+                                      <p:cBhvr>
+                                        <p:cTn id="6" dur="1" fill="hold">
+                                          <p:stCondLst>
+                                            <p:cond delay="0"/>
+                                          </p:stCondLst>
+                                        </p:cTn>
+                                        <p:tgtEl>
+                                          <p:spTgt spid="13"/>
+                                        </p:tgtEl>
+                                        <p:attrNameLst>
+                                          <p:attrName>style.visibility</p:attrName>
+                                        </p:attrNameLst>
+                                      </p:cBhvr>
+                                      <p:to>
+                                        <p:strVal val="visible"/>
+                                      </p:to>
+                                    </p:set>
+                                  </p:childTnLst>
+                                  <p:subTnLst>
+                                    <p:set>
+                                      <p:cBhvr override="childStyle">
+                                        <p:cTn dur="1" fill="hold" display="0" masterRel="nextClick" afterEffect="1"/>
+                                        <p:tgtEl>
+                                          <p:spTgt spid="13"/>
+                                        </p:tgtEl>
+                                        <p:attrNameLst>
+                                          <p:attrName>style.visibility</p:attrName>
+                                        </p:attrNameLst>
+                                      </p:cBhvr>
+                                      <p:to>
+                                        <p:strVal val="hidden"/>
+                                      </p:to>
+                                    </p:set>
+                                  </p:subTnLst>
+                                </p:cTn>
+                              </p:par>
+                            </p:childTnLst>
+                          </p:cTn>
+                        </p:par>
+                      </p:childTnLst>
+                    </p:cTn>
+                  </p:par>
+                  <p:par>
+                    <p:cTn id="7" fill="hold">
+                      <p:stCondLst>
+                        <p:cond delay="indefinite"/>
+                      </p:stCondLst>
+                      <p:childTnLst>
+                        <p:par>
+                          <p:cTn id="8" fill="hold">
+                            <p:stCondLst>
+                              <p:cond delay="0"/>
+                            </p:stCondLst>
+                            <p:childTnLst>
+                              <p:par>
+                                <p:cTn id="9" presetID="1" presetClass="entr" presetSubtype="0" fill="hold" nodeType="clickEffect">
+                                  <p:stCondLst>
+                                    <p:cond delay="0"/>
+                                  </p:stCondLst>
+                                  <p:childTnLst>
+                                    <p:set>
+                                      <p:cBhvr>
+                                        <p:cTn id="10" dur="1" fill="hold">
+                                          <p:stCondLst>
+                                            <p:cond delay="0"/>
+                                          </p:stCondLst>
+                                        </p:cTn>
+                                        <p:tgtEl>
+                                          <p:spTgt spid="15"/>
+                                        </p:tgtEl>
+                                        <p:attrNameLst>
+                                          <p:attrName>style.visibility</p:attrName>
+                                        </p:attrNameLst>
+                                      </p:cBhvr>
+                                      <p:to>
+                                        <p:strVal val="visible"/>
+                                      </p:to>
+                                    </p:set>
+                                  </p:childTnLst>
+                                </p:cTn>
+                              </p:par>
+                            </p:childTnLst>
+                          </p:cTn>
+                        </p:par>
+                      </p:childTnLst>
+                    </p:cTn>
+                  </p:par>
+                </p:childTnLst>
+              </p:cTn>
+              <p:prevCondLst>
+                <p:cond evt="onPrev" delay="0">
+                  <p:tgtEl>
+                    <p:sldTgt/>
+                  </p:tgtEl>
+                </p:cond>
+              </p:prevCondLst>
+              <p:nextCondLst>
+                <p:cond evt="onNext" delay="0">
+                  <p:tgtEl>
+                    <p:sldTgt/>
+                  </p:tgtEl>
+                </p:cond>
+              </p:nextCondLst>
+            </p:seq>
+          </p:childTnLst>
+        </p:cTn>
+      </p:par>
+    </p:tnLst>
+  </p:timing>
+</p:sld>
+</file>
+
+<file path=ppt/slides/slide7.xml><?xml version="1.0" encoding="utf-8"?>
+<p:sld xmlns:a="http://schemas.openxmlformats.org/drawingml/2006/main" xmlns:r="http://schemas.openxmlformats.org/officeDocument/2006/relationships" xmlns:p="http://schemas.openxmlformats.org/presentationml/2006/main">
+  <p:cSld>
+    <p:spTree>
+      <p:nvGrpSpPr>
+        <p:cNvPr id="1" name=""/>
+        <p:cNvGrpSpPr/>
+        <p:nvPr/>
+      </p:nvGrpSpPr>
+      <p:grpSpPr>
+        <a:xfrm>
+          <a:off x="0" y="0"/>
+          <a:ext cx="0" cy="0"/>
+          <a:chOff x="0" y="0"/>
+          <a:chExt cx="0" cy="0"/>
+        </a:xfrm>
+      </p:grpSpPr>
+      <p:sp>
+        <p:nvSpPr>
+          <p:cNvPr id="2" name="Title 1"/>
+          <p:cNvSpPr>
+            <a:spLocks noGrp="1"/>
+          </p:cNvSpPr>
+          <p:nvPr>
+            <p:ph type="title"/>
+          </p:nvPr>
+        </p:nvSpPr>
+        <p:spPr>
+          <a:xfrm>
+            <a:off x="838200" y="41292"/>
+            <a:ext cx="10515600" cy="1145224"/>
+          </a:xfrm>
+        </p:spPr>
+        <p:txBody>
+          <a:bodyPr>
+            <a:normAutofit/>
+          </a:bodyPr>
+          <a:lstStyle/>
+          <a:p>
+            <a:r>
+              <a:rPr lang="en-US" dirty="0"/>
+              <a:t>Scale Comparison with Total of all Companies</a:t>
+            </a:r>
+          </a:p>
+        </p:txBody>
+      </p:sp>
+      <p:sp>
+        <p:nvSpPr>
+          <p:cNvPr id="3" name="Text Placeholder 3">
+            <a:extLst>
+              <a:ext uri="{FF2B5EF4-FFF2-40B4-BE49-F238E27FC236}">
+                <a16:creationId xmlns:a16="http://schemas.microsoft.com/office/drawing/2014/main" id="{CE8AC5BF-36CB-34A3-9CD7-3C8C22B73B72}"/>
+              </a:ext>
+            </a:extLst>
+          </p:cNvPr>
+          <p:cNvSpPr txBox="1">
+            <a:spLocks/>
+          </p:cNvSpPr>
+          <p:nvPr/>
+        </p:nvSpPr>
+        <p:spPr>
+          <a:xfrm>
+            <a:off x="457820" y="5596428"/>
+            <a:ext cx="11276360" cy="896446"/>
+          </a:xfrm>
+          <a:prstGeom prst="rect">
+            <a:avLst/>
+          </a:prstGeom>
+        </p:spPr>
+        <p:txBody>
+          <a:bodyPr/>
+          <a:lstStyle>
+            <a:lvl1pPr marL="228600" indent="-228600" algn="l" defTabSz="914400" rtl="0" eaLnBrk="1" latinLnBrk="0" hangingPunct="1">
+              <a:lnSpc>
+                <a:spcPct val="90000"/>
+              </a:lnSpc>
+              <a:spcBef>
+                <a:spcPts val="1800"/>
+              </a:spcBef>
+              <a:buClr>
+                <a:schemeClr val="accent1"/>
+              </a:buClr>
+              <a:buFont typeface="Arial" panose="020B0604020202020204" pitchFamily="34" charset="0"/>
+              <a:buChar char="•"/>
+              <a:defRPr sz="2000" kern="1200">
+                <a:solidFill>
+                  <a:schemeClr val="tx1"/>
+                </a:solidFill>
+                <a:latin typeface="+mn-lt"/>
+                <a:ea typeface="+mn-ea"/>
+                <a:cs typeface="+mn-cs"/>
+              </a:defRPr>
+            </a:lvl1pPr>
+            <a:lvl2pPr marL="457200" indent="-228600" algn="l" defTabSz="914400" rtl="0" eaLnBrk="1" latinLnBrk="0" hangingPunct="1">
+              <a:lnSpc>
+                <a:spcPct val="90000"/>
+              </a:lnSpc>
+              <a:spcBef>
+                <a:spcPts val="1000"/>
+              </a:spcBef>
+              <a:buClr>
+                <a:schemeClr val="accent1"/>
+              </a:buClr>
+              <a:buFont typeface="Arial" panose="020B0604020202020204" pitchFamily="34" charset="0"/>
+              <a:buChar char="•"/>
+              <a:defRPr sz="1800" kern="1200">
+                <a:solidFill>
+                  <a:schemeClr val="tx1"/>
+                </a:solidFill>
+                <a:latin typeface="+mn-lt"/>
+                <a:ea typeface="+mn-ea"/>
+                <a:cs typeface="+mn-cs"/>
+              </a:defRPr>
+            </a:lvl2pPr>
+            <a:lvl3pPr marL="685800" indent="-182880" algn="l" defTabSz="914400" rtl="0" eaLnBrk="1" latinLnBrk="0" hangingPunct="1">
+              <a:lnSpc>
+                <a:spcPct val="90000"/>
+              </a:lnSpc>
+              <a:spcBef>
+                <a:spcPts val="800"/>
+              </a:spcBef>
+              <a:buClr>
+                <a:schemeClr val="accent1"/>
+              </a:buClr>
+              <a:buFont typeface="Arial" panose="020B0604020202020204" pitchFamily="34" charset="0"/>
+              <a:buChar char="•"/>
+              <a:defRPr sz="1600" kern="1200">
+                <a:solidFill>
+                  <a:schemeClr val="tx1"/>
+                </a:solidFill>
+                <a:latin typeface="+mn-lt"/>
+                <a:ea typeface="+mn-ea"/>
+                <a:cs typeface="+mn-cs"/>
+              </a:defRPr>
+            </a:lvl3pPr>
+            <a:lvl4pPr marL="914400" indent="-182880" algn="l" defTabSz="914400" rtl="0" eaLnBrk="1" latinLnBrk="0" hangingPunct="1">
+              <a:lnSpc>
+                <a:spcPct val="90000"/>
+              </a:lnSpc>
+              <a:spcBef>
+                <a:spcPts val="800"/>
+              </a:spcBef>
+              <a:buClr>
+                <a:schemeClr val="accent1"/>
+              </a:buClr>
+              <a:buFont typeface="Arial" panose="020B0604020202020204" pitchFamily="34" charset="0"/>
+              <a:buChar char="•"/>
+              <a:defRPr sz="1400" kern="1200">
+                <a:solidFill>
+                  <a:schemeClr val="tx1"/>
+                </a:solidFill>
+                <a:latin typeface="+mn-lt"/>
+                <a:ea typeface="+mn-ea"/>
+                <a:cs typeface="+mn-cs"/>
+              </a:defRPr>
+            </a:lvl4pPr>
+            <a:lvl5pPr marL="1143000" indent="-182880" algn="l" defTabSz="914400" rtl="0" eaLnBrk="1" latinLnBrk="0" hangingPunct="1">
+              <a:lnSpc>
+                <a:spcPct val="90000"/>
+              </a:lnSpc>
+              <a:spcBef>
+                <a:spcPts val="800"/>
+              </a:spcBef>
+              <a:buClr>
+                <a:schemeClr val="accent1"/>
+              </a:buClr>
+              <a:buFont typeface="Arial" panose="020B0604020202020204" pitchFamily="34" charset="0"/>
+              <a:buChar char="•"/>
+              <a:defRPr sz="1400" kern="1200">
+                <a:solidFill>
+                  <a:schemeClr val="tx1"/>
+                </a:solidFill>
+                <a:latin typeface="+mn-lt"/>
+                <a:ea typeface="+mn-ea"/>
+                <a:cs typeface="+mn-cs"/>
+              </a:defRPr>
+            </a:lvl5pPr>
+            <a:lvl6pPr marL="1371600" indent="-182880" algn="l" defTabSz="914400" rtl="0" eaLnBrk="1" latinLnBrk="0" hangingPunct="1">
+              <a:lnSpc>
+                <a:spcPct val="90000"/>
+              </a:lnSpc>
+              <a:spcBef>
+                <a:spcPts val="800"/>
+              </a:spcBef>
+              <a:buClr>
+                <a:schemeClr val="accent1"/>
+              </a:buClr>
+              <a:buFont typeface="Arial" panose="020B0604020202020204" pitchFamily="34" charset="0"/>
+              <a:buChar char="•"/>
+              <a:defRPr sz="1400" kern="1200">
+                <a:solidFill>
+                  <a:schemeClr val="tx1"/>
+                </a:solidFill>
+                <a:latin typeface="+mn-lt"/>
+                <a:ea typeface="+mn-ea"/>
+                <a:cs typeface="+mn-cs"/>
+              </a:defRPr>
+            </a:lvl6pPr>
+            <a:lvl7pPr marL="1600200" indent="-182880" algn="l" defTabSz="914400" rtl="0" eaLnBrk="1" latinLnBrk="0" hangingPunct="1">
+              <a:lnSpc>
+                <a:spcPct val="90000"/>
+              </a:lnSpc>
+              <a:spcBef>
+                <a:spcPts val="800"/>
+              </a:spcBef>
+              <a:buClr>
+                <a:schemeClr val="accent1"/>
+              </a:buClr>
+              <a:buFont typeface="Arial" panose="020B0604020202020204" pitchFamily="34" charset="0"/>
+              <a:buChar char="•"/>
+              <a:defRPr sz="1400" kern="1200">
+                <a:solidFill>
+                  <a:schemeClr val="tx1"/>
+                </a:solidFill>
+                <a:latin typeface="+mn-lt"/>
+                <a:ea typeface="+mn-ea"/>
+                <a:cs typeface="+mn-cs"/>
+              </a:defRPr>
+            </a:lvl7pPr>
+            <a:lvl8pPr marL="1828800" indent="-182880" algn="l" defTabSz="914400" rtl="0" eaLnBrk="1" latinLnBrk="0" hangingPunct="1">
+              <a:lnSpc>
+                <a:spcPct val="90000"/>
+              </a:lnSpc>
+              <a:spcBef>
+                <a:spcPts val="800"/>
+              </a:spcBef>
+              <a:buClr>
+                <a:schemeClr val="accent1"/>
+              </a:buClr>
+              <a:buFont typeface="Arial" panose="020B0604020202020204" pitchFamily="34" charset="0"/>
+              <a:buChar char="•"/>
+              <a:defRPr sz="1400" kern="1200">
+                <a:solidFill>
+                  <a:schemeClr val="tx1"/>
+                </a:solidFill>
+                <a:latin typeface="+mn-lt"/>
+                <a:ea typeface="+mn-ea"/>
+                <a:cs typeface="+mn-cs"/>
+              </a:defRPr>
+            </a:lvl8pPr>
+            <a:lvl9pPr marL="2057400" indent="-182880" algn="l" defTabSz="914400" rtl="0" eaLnBrk="1" latinLnBrk="0" hangingPunct="1">
+              <a:lnSpc>
+                <a:spcPct val="90000"/>
+              </a:lnSpc>
+              <a:spcBef>
+                <a:spcPts val="800"/>
+              </a:spcBef>
+              <a:buClr>
+                <a:schemeClr val="accent1"/>
+              </a:buClr>
+              <a:buFont typeface="Arial" panose="020B0604020202020204" pitchFamily="34" charset="0"/>
+              <a:buChar char="•"/>
+              <a:defRPr sz="1400" kern="1200">
+                <a:solidFill>
+                  <a:schemeClr val="tx1"/>
+                </a:solidFill>
+                <a:latin typeface="+mn-lt"/>
+                <a:ea typeface="+mn-ea"/>
+                <a:cs typeface="+mn-cs"/>
+              </a:defRPr>
+            </a:lvl9pPr>
+          </a:lstStyle>
+          <a:p>
+            <a:r>
+              <a:rPr lang="en-US" dirty="0"/>
+              <a:t>F Grades account for 41 Chinese, 26 French, and 27 U.S. companies</a:t>
+            </a:r>
+          </a:p>
+        </p:txBody>
+      </p:sp>
+      <p:pic>
+        <p:nvPicPr>
+          <p:cNvPr id="7" name="Picture 6">
+            <a:extLst>
+              <a:ext uri="{FF2B5EF4-FFF2-40B4-BE49-F238E27FC236}">
+                <a16:creationId xmlns:a16="http://schemas.microsoft.com/office/drawing/2014/main" id="{52729870-8B45-7F32-33BD-808762985DB1}"/>
+              </a:ext>
+            </a:extLst>
+          </p:cNvPr>
+          <p:cNvPicPr>
+            <a:picLocks noChangeAspect="1"/>
+          </p:cNvPicPr>
+          <p:nvPr/>
+        </p:nvPicPr>
+        <p:blipFill>
+          <a:blip r:embed="rId3"/>
+          <a:stretch>
+            <a:fillRect/>
+          </a:stretch>
+        </p:blipFill>
+        <p:spPr>
+          <a:xfrm>
+            <a:off x="1143000" y="1312636"/>
+            <a:ext cx="4419600" cy="4125831"/>
+          </a:xfrm>
+          <a:prstGeom prst="rect">
+            <a:avLst/>
+          </a:prstGeom>
+        </p:spPr>
+      </p:pic>
+      <p:pic>
+        <p:nvPicPr>
+          <p:cNvPr id="6" name="Picture 5" descr="A graph of different colored bars&#10;&#10;Description automatically generated">
+            <a:extLst>
+              <a:ext uri="{FF2B5EF4-FFF2-40B4-BE49-F238E27FC236}">
+                <a16:creationId xmlns:a16="http://schemas.microsoft.com/office/drawing/2014/main" id="{F004C133-DA71-487D-5310-70DC1153DB31}"/>
+              </a:ext>
+            </a:extLst>
+          </p:cNvPr>
+          <p:cNvPicPr>
+            <a:picLocks noChangeAspect="1"/>
+          </p:cNvPicPr>
+          <p:nvPr/>
+        </p:nvPicPr>
+        <p:blipFill>
+          <a:blip r:embed="rId4">
+            <a:extLst>
+              <a:ext uri="{28A0092B-C50C-407E-A947-70E740481C1C}">
+                <a14:useLocalDpi xmlns:a14="http://schemas.microsoft.com/office/drawing/2010/main" val="0"/>
+              </a:ext>
+            </a:extLst>
+          </a:blip>
+          <a:stretch>
+            <a:fillRect/>
+          </a:stretch>
+        </p:blipFill>
+        <p:spPr>
+          <a:xfrm>
+            <a:off x="5867400" y="1315752"/>
+            <a:ext cx="4485543" cy="4150707"/>
+          </a:xfrm>
+          <a:prstGeom prst="rect">
+            <a:avLst/>
+          </a:prstGeom>
+        </p:spPr>
+      </p:pic>
+      <p:grpSp>
+        <p:nvGrpSpPr>
+          <p:cNvPr id="13" name="Group 12">
+            <a:extLst>
+              <a:ext uri="{FF2B5EF4-FFF2-40B4-BE49-F238E27FC236}">
+                <a16:creationId xmlns:a16="http://schemas.microsoft.com/office/drawing/2014/main" id="{A14D3862-FF80-773D-5CB1-7BC3EC15B776}"/>
+              </a:ext>
+            </a:extLst>
+          </p:cNvPr>
+          <p:cNvGrpSpPr/>
+          <p:nvPr/>
+        </p:nvGrpSpPr>
+        <p:grpSpPr>
+          <a:xfrm>
+            <a:off x="1428018" y="1524000"/>
+            <a:ext cx="8889021" cy="3048000"/>
+            <a:chOff x="1428018" y="1524000"/>
+            <a:chExt cx="8889021" cy="3048000"/>
+          </a:xfrm>
+        </p:grpSpPr>
+        <p:grpSp>
+          <p:nvGrpSpPr>
+            <p:cNvPr id="10" name="Group 9">
+              <a:extLst>
+                <a:ext uri="{FF2B5EF4-FFF2-40B4-BE49-F238E27FC236}">
+                  <a16:creationId xmlns:a16="http://schemas.microsoft.com/office/drawing/2014/main" id="{0236EDB7-E204-E0D6-E30A-91431692A239}"/>
+                </a:ext>
+              </a:extLst>
+            </p:cNvPr>
+            <p:cNvGrpSpPr/>
+            <p:nvPr/>
+          </p:nvGrpSpPr>
+          <p:grpSpPr>
+            <a:xfrm>
+              <a:off x="6400800" y="3962400"/>
+              <a:ext cx="3916239" cy="533400"/>
+              <a:chOff x="6400800" y="3962400"/>
+              <a:chExt cx="3916239" cy="533400"/>
+            </a:xfrm>
+          </p:grpSpPr>
+          <p:sp>
+            <p:nvSpPr>
+              <p:cNvPr id="8" name="Rectangle 7">
+                <a:extLst>
+                  <a:ext uri="{FF2B5EF4-FFF2-40B4-BE49-F238E27FC236}">
+                    <a16:creationId xmlns:a16="http://schemas.microsoft.com/office/drawing/2014/main" id="{A6DB08B4-198E-03E2-9839-A806E60FEFAF}"/>
+                  </a:ext>
+                </a:extLst>
+              </p:cNvPr>
+              <p:cNvSpPr/>
+              <p:nvPr/>
+            </p:nvSpPr>
+            <p:spPr>
+              <a:xfrm>
+                <a:off x="9906000" y="3962400"/>
+                <a:ext cx="411039" cy="533400"/>
+              </a:xfrm>
+              <a:prstGeom prst="rect">
+                <a:avLst/>
+              </a:prstGeom>
+              <a:solidFill>
+                <a:schemeClr val="tx2">
+                  <a:lumMod val="90000"/>
+                  <a:alpha val="0"/>
+                </a:schemeClr>
+              </a:solidFill>
+              <a:ln w="60325">
+                <a:solidFill>
+                  <a:srgbClr val="993300"/>
+                </a:solidFill>
+              </a:ln>
+            </p:spPr>
+            <p:style>
+              <a:lnRef idx="2">
+                <a:schemeClr val="accent1">
+                  <a:shade val="15000"/>
+                </a:schemeClr>
+              </a:lnRef>
+              <a:fillRef idx="1">
+                <a:schemeClr val="accent1"/>
+              </a:fillRef>
+              <a:effectRef idx="0">
+                <a:schemeClr val="accent1"/>
+              </a:effectRef>
+              <a:fontRef idx="minor">
+                <a:schemeClr val="lt1"/>
+              </a:fontRef>
+            </p:style>
+            <p:txBody>
+              <a:bodyPr rtlCol="0" anchor="ctr"/>
+              <a:lstStyle/>
+              <a:p>
+                <a:pPr algn="ctr"/>
+                <a:endParaRPr lang="en-US">
+                  <a:ln>
+                    <a:solidFill>
+                      <a:schemeClr val="tx1"/>
+                    </a:solidFill>
+                    <a:prstDash val="solid"/>
+                  </a:ln>
+                </a:endParaRPr>
+              </a:p>
+            </p:txBody>
+          </p:sp>
+          <p:sp>
+            <p:nvSpPr>
+              <p:cNvPr id="9" name="Rectangle 8">
+                <a:extLst>
+                  <a:ext uri="{FF2B5EF4-FFF2-40B4-BE49-F238E27FC236}">
+                    <a16:creationId xmlns:a16="http://schemas.microsoft.com/office/drawing/2014/main" id="{A8416A91-798F-A15A-EEF2-6E56385403BD}"/>
+                  </a:ext>
+                </a:extLst>
+              </p:cNvPr>
+              <p:cNvSpPr/>
+              <p:nvPr/>
+            </p:nvSpPr>
+            <p:spPr>
+              <a:xfrm>
+                <a:off x="6400800" y="3962400"/>
+                <a:ext cx="411039" cy="533400"/>
+              </a:xfrm>
+              <a:prstGeom prst="rect">
+                <a:avLst/>
+              </a:prstGeom>
+              <a:solidFill>
+                <a:schemeClr val="tx2">
+                  <a:lumMod val="90000"/>
+                  <a:alpha val="0"/>
+                </a:schemeClr>
+              </a:solidFill>
+              <a:ln w="60325">
+                <a:solidFill>
+                  <a:srgbClr val="993300"/>
+                </a:solidFill>
+              </a:ln>
+            </p:spPr>
+            <p:style>
+              <a:lnRef idx="2">
+                <a:schemeClr val="accent1">
+                  <a:shade val="15000"/>
+                </a:schemeClr>
+              </a:lnRef>
+              <a:fillRef idx="1">
+                <a:schemeClr val="accent1"/>
+              </a:fillRef>
+              <a:effectRef idx="0">
+                <a:schemeClr val="accent1"/>
+              </a:effectRef>
+              <a:fontRef idx="minor">
+                <a:schemeClr val="lt1"/>
+              </a:fontRef>
+            </p:style>
+            <p:txBody>
+              <a:bodyPr rtlCol="0" anchor="ctr"/>
+              <a:lstStyle/>
+              <a:p>
+                <a:pPr algn="ctr"/>
+                <a:endParaRPr lang="en-US">
+                  <a:ln>
+                    <a:solidFill>
+                      <a:schemeClr val="tx1"/>
+                    </a:solidFill>
+                    <a:prstDash val="solid"/>
+                  </a:ln>
+                </a:endParaRPr>
+              </a:p>
+            </p:txBody>
+          </p:sp>
+        </p:grpSp>
+        <p:sp>
+          <p:nvSpPr>
+            <p:cNvPr id="11" name="Rectangle 10">
+              <a:extLst>
+                <a:ext uri="{FF2B5EF4-FFF2-40B4-BE49-F238E27FC236}">
+                  <a16:creationId xmlns:a16="http://schemas.microsoft.com/office/drawing/2014/main" id="{663CE3D9-4660-357D-B050-2343D0FC3664}"/>
+                </a:ext>
+              </a:extLst>
+            </p:cNvPr>
+            <p:cNvSpPr/>
+            <p:nvPr/>
+          </p:nvSpPr>
+          <p:spPr>
+            <a:xfrm>
+              <a:off x="1428018" y="4038600"/>
+              <a:ext cx="411039" cy="533400"/>
+            </a:xfrm>
+            <a:prstGeom prst="rect">
+              <a:avLst/>
+            </a:prstGeom>
+            <a:solidFill>
+              <a:schemeClr val="tx2">
+                <a:lumMod val="90000"/>
+                <a:alpha val="0"/>
+              </a:schemeClr>
+            </a:solidFill>
+            <a:ln w="60325">
+              <a:solidFill>
+                <a:srgbClr val="993300"/>
+              </a:solidFill>
+            </a:ln>
+          </p:spPr>
+          <p:style>
+            <a:lnRef idx="2">
+              <a:schemeClr val="accent1">
+                <a:shade val="15000"/>
+              </a:schemeClr>
+            </a:lnRef>
+            <a:fillRef idx="1">
+              <a:schemeClr val="accent1"/>
+            </a:fillRef>
+            <a:effectRef idx="0">
+              <a:schemeClr val="accent1"/>
+            </a:effectRef>
+            <a:fontRef idx="minor">
+              <a:schemeClr val="lt1"/>
+            </a:fontRef>
+          </p:style>
+          <p:txBody>
+            <a:bodyPr rtlCol="0" anchor="ctr"/>
+            <a:lstStyle/>
+            <a:p>
+              <a:pPr algn="ctr"/>
+              <a:endParaRPr lang="en-US">
+                <a:ln>
+                  <a:solidFill>
+                    <a:schemeClr val="tx1"/>
+                  </a:solidFill>
+                  <a:prstDash val="solid"/>
+                </a:ln>
+              </a:endParaRPr>
+            </a:p>
+          </p:txBody>
+        </p:sp>
+        <p:sp>
+          <p:nvSpPr>
+            <p:cNvPr id="12" name="Rectangle 11">
+              <a:extLst>
+                <a:ext uri="{FF2B5EF4-FFF2-40B4-BE49-F238E27FC236}">
+                  <a16:creationId xmlns:a16="http://schemas.microsoft.com/office/drawing/2014/main" id="{0D894331-8EFF-A610-874D-E46BCB998466}"/>
+                </a:ext>
+              </a:extLst>
+            </p:cNvPr>
+            <p:cNvSpPr/>
+            <p:nvPr/>
+          </p:nvSpPr>
+          <p:spPr>
+            <a:xfrm>
+              <a:off x="5093526" y="1524000"/>
+              <a:ext cx="411039" cy="3036939"/>
+            </a:xfrm>
+            <a:prstGeom prst="rect">
+              <a:avLst/>
+            </a:prstGeom>
+            <a:solidFill>
+              <a:schemeClr val="tx2">
+                <a:lumMod val="90000"/>
+                <a:alpha val="0"/>
+              </a:schemeClr>
+            </a:solidFill>
+            <a:ln w="60325">
+              <a:solidFill>
+                <a:srgbClr val="993300"/>
+              </a:solidFill>
+            </a:ln>
+          </p:spPr>
+          <p:style>
+            <a:lnRef idx="2">
+              <a:schemeClr val="accent1">
+                <a:shade val="15000"/>
+              </a:schemeClr>
+            </a:lnRef>
+            <a:fillRef idx="1">
+              <a:schemeClr val="accent1"/>
+            </a:fillRef>
+            <a:effectRef idx="0">
+              <a:schemeClr val="accent1"/>
+            </a:effectRef>
+            <a:fontRef idx="minor">
+              <a:schemeClr val="lt1"/>
+            </a:fontRef>
+          </p:style>
+          <p:txBody>
+            <a:bodyPr rtlCol="0" anchor="ctr"/>
+            <a:lstStyle/>
+            <a:p>
+              <a:pPr algn="ctr"/>
+              <a:endParaRPr lang="en-US">
+                <a:ln>
+                  <a:solidFill>
+                    <a:schemeClr val="tx1"/>
+                  </a:solidFill>
+                  <a:prstDash val="solid"/>
+                </a:ln>
+              </a:endParaRPr>
+            </a:p>
+          </p:txBody>
+        </p:sp>
+      </p:grpSp>
+    </p:spTree>
+    <p:extLst>
+      <p:ext uri="{BB962C8B-B14F-4D97-AF65-F5344CB8AC3E}">
+        <p14:creationId xmlns:p14="http://schemas.microsoft.com/office/powerpoint/2010/main" val="1335205536"/>
+      </p:ext>
+    </p:extLst>
+  </p:cSld>
+  <p:clrMapOvr>
+    <a:masterClrMapping/>
+  </p:clrMapOvr>
+  <mc:AlternateContent xmlns:mc="http://schemas.openxmlformats.org/markup-compatibility/2006" xmlns:p14="http://schemas.microsoft.com/office/powerpoint/2010/main">
+    <mc:Choice Requires="p14">
+      <p:transition spd="med" p14:dur="700">
+        <p:fade/>
+      </p:transition>
+    </mc:Choice>
+    <mc:Fallback xmlns="">
+      <p:transition spd="med">
+        <p:fade/>
+      </p:transition>
+    </mc:Fallback>
+  </mc:AlternateContent>
+  <p:timing>
+    <p:tnLst>
+      <p:par>
+        <p:cTn id="1" dur="indefinite" restart="never" nodeType="tmRoot">
+          <p:childTnLst>
+            <p:seq concurrent="1" nextAc="seek">
+              <p:cTn id="2" dur="indefinite" nodeType="mainSeq">
+                <p:childTnLst>
+                  <p:par>
+                    <p:cTn id="3" fill="hold">
+                      <p:stCondLst>
+                        <p:cond delay="indefinite"/>
+                      </p:stCondLst>
+                      <p:childTnLst>
+                        <p:par>
+                          <p:cTn id="4" fill="hold">
+                            <p:stCondLst>
+                              <p:cond delay="0"/>
+                            </p:stCondLst>
+                            <p:childTnLst>
+                              <p:par>
+                                <p:cTn id="5" presetID="1" presetClass="entr" presetSubtype="0" fill="hold" nodeType="clickEffect">
+                                  <p:stCondLst>
+                                    <p:cond delay="0"/>
+                                  </p:stCondLst>
+                                  <p:childTnLst>
+                                    <p:set>
+                                      <p:cBhvr>
+                                        <p:cTn id="6" dur="1" fill="hold">
+                                          <p:stCondLst>
+                                            <p:cond delay="0"/>
+                                          </p:stCondLst>
+                                        </p:cTn>
+                                        <p:tgtEl>
+                                          <p:spTgt spid="13"/>
+                                        </p:tgtEl>
+                                        <p:attrNameLst>
+                                          <p:attrName>style.visibility</p:attrName>
+                                        </p:attrNameLst>
+                                      </p:cBhvr>
+                                      <p:to>
+                                        <p:strVal val="visible"/>
+                                      </p:to>
+                                    </p:set>
+                                  </p:childTnLst>
+                                </p:cTn>
+                              </p:par>
+                            </p:childTnLst>
+                          </p:cTn>
+                        </p:par>
+                      </p:childTnLst>
+                    </p:cTn>
+                  </p:par>
+                </p:childTnLst>
+              </p:cTn>
+              <p:prevCondLst>
+                <p:cond evt="onPrev" delay="0">
+                  <p:tgtEl>
+                    <p:sldTgt/>
+                  </p:tgtEl>
+                </p:cond>
+              </p:prevCondLst>
+              <p:nextCondLst>
+                <p:cond evt="onNext" delay="0">
+                  <p:tgtEl>
+                    <p:sldTgt/>
+                  </p:tgtEl>
+                </p:cond>
+              </p:nextCondLst>
+            </p:seq>
+          </p:childTnLst>
+        </p:cTn>
+      </p:par>
+    </p:tnLst>
+  </p:timing>
+</p:sld>
+</file>
+
+<file path=ppt/slides/slide8.xml><?xml version="1.0" encoding="utf-8"?>
+<p:sld xmlns:a="http://schemas.openxmlformats.org/drawingml/2006/main" xmlns:r="http://schemas.openxmlformats.org/officeDocument/2006/relationships" xmlns:p="http://schemas.openxmlformats.org/presentationml/2006/main">
+  <p:cSld>
+    <p:spTree>
+      <p:nvGrpSpPr>
+        <p:cNvPr id="1" name=""/>
+        <p:cNvGrpSpPr/>
+        <p:nvPr/>
+      </p:nvGrpSpPr>
+      <p:grpSpPr>
+        <a:xfrm>
+          <a:off x="0" y="0"/>
+          <a:ext cx="0" cy="0"/>
+          <a:chOff x="0" y="0"/>
+          <a:chExt cx="0" cy="0"/>
+        </a:xfrm>
+      </p:grpSpPr>
+      <p:sp>
+        <p:nvSpPr>
+          <p:cNvPr id="2" name="Title 1">
+            <a:extLst>
+              <a:ext uri="{FF2B5EF4-FFF2-40B4-BE49-F238E27FC236}">
+                <a16:creationId xmlns:a16="http://schemas.microsoft.com/office/drawing/2014/main" id="{68BDA5B9-F67F-38E2-88E2-74F2FB831908}"/>
+              </a:ext>
+            </a:extLst>
+          </p:cNvPr>
+          <p:cNvSpPr>
+            <a:spLocks noGrp="1"/>
+          </p:cNvSpPr>
+          <p:nvPr>
+            <p:ph type="title"/>
+          </p:nvPr>
+        </p:nvSpPr>
+        <p:spPr/>
+        <p:txBody>
+          <a:bodyPr/>
+          <a:lstStyle/>
+          <a:p>
+            <a:r>
+              <a:rPr lang="en-US" dirty="0"/>
+              <a:t>Future Project Plans</a:t>
+            </a:r>
+          </a:p>
+        </p:txBody>
+      </p:sp>
+      <p:sp>
+        <p:nvSpPr>
+          <p:cNvPr id="3" name="Content Placeholder 2">
+            <a:extLst>
+              <a:ext uri="{FF2B5EF4-FFF2-40B4-BE49-F238E27FC236}">
+                <a16:creationId xmlns:a16="http://schemas.microsoft.com/office/drawing/2014/main" id="{D2AD61E8-F4CF-3990-D3F2-C9529D155318}"/>
+              </a:ext>
+            </a:extLst>
+          </p:cNvPr>
+          <p:cNvSpPr>
+            <a:spLocks noGrp="1"/>
+          </p:cNvSpPr>
+          <p:nvPr>
+            <p:ph idx="1"/>
+          </p:nvPr>
+        </p:nvSpPr>
+        <p:spPr/>
+        <p:txBody>
+          <a:bodyPr/>
+          <a:lstStyle/>
+          <a:p>
+            <a:r>
+              <a:rPr lang="en-US" dirty="0"/>
+              <a:t>Comparison by “Global South” countries: Brazil, South Africa, </a:t>
+            </a:r>
+            <a:r>
+              <a:rPr lang="en-US" dirty="0" err="1"/>
+              <a:t>Turkiye</a:t>
+            </a:r>
+            <a:r>
+              <a:rPr lang="en-US" dirty="0"/>
+              <a:t>, Indonesia, China to see if the “unaligned global south” is less interested in divestment</a:t>
+            </a:r>
+          </a:p>
+          <a:p>
+            <a:r>
+              <a:rPr lang="en-US" dirty="0"/>
+              <a:t>Perhaps a scatter plot which shows the number of each letter grade by the 10 most represented countries in the study</a:t>
+            </a:r>
+          </a:p>
+          <a:p>
+            <a:r>
+              <a:rPr lang="en-US" dirty="0"/>
+              <a:t>See if there is a difference between state-owned enterprises specifically, though this requires a more individuated look at each company</a:t>
+            </a:r>
+          </a:p>
+          <a:p>
+            <a:r>
+              <a:rPr lang="en-US" strike="sngStrike" dirty="0"/>
+              <a:t>Could group A &amp; B and D &amp; F to show greater aggregation</a:t>
+            </a:r>
+          </a:p>
+          <a:p>
+            <a:endParaRPr lang="en-US" dirty="0"/>
+          </a:p>
+        </p:txBody>
+      </p:sp>
+    </p:spTree>
+    <p:extLst>
+      <p:ext uri="{BB962C8B-B14F-4D97-AF65-F5344CB8AC3E}">
+        <p14:creationId xmlns:p14="http://schemas.microsoft.com/office/powerpoint/2010/main" val="3326759480"/>
       </p:ext>
     </p:extLst>
   </p:cSld>
@@ -6157,7 +7466,7 @@
           <p:cNvPr id="2" name="Title 1">
             <a:extLst>
               <a:ext uri="{FF2B5EF4-FFF2-40B4-BE49-F238E27FC236}">
-                <a16:creationId xmlns:a16="http://schemas.microsoft.com/office/drawing/2014/main" id="{0D2B00F3-016F-0B0A-E0B1-82EB86051AE9}"/>
+                <a16:creationId xmlns:a16="http://schemas.microsoft.com/office/drawing/2014/main" id="{4C44AF5E-4726-3FCA-3646-6CC8BA08E269}"/>
               </a:ext>
             </a:extLst>
           </p:cNvPr>
@@ -6168,21 +7477,29 @@
             <p:ph type="title"/>
           </p:nvPr>
         </p:nvSpPr>
-        <p:spPr/>
+        <p:spPr>
+          <a:xfrm>
+            <a:off x="838200" y="152400"/>
+            <a:ext cx="10515600" cy="1145224"/>
+          </a:xfrm>
+        </p:spPr>
         <p:txBody>
           <a:bodyPr/>
           <a:lstStyle/>
           <a:p>
-            <a:endParaRPr lang="en-US"/>
-          </a:p>
-        </p:txBody>
-      </p:sp>
-      <p:sp>
-        <p:nvSpPr>
-          <p:cNvPr id="3" name="Text Placeholder 2">
+            <a:r>
+              <a:rPr lang="en-US" dirty="0"/>
+              <a:t>Contact and Data Links</a:t>
+            </a:r>
+          </a:p>
+        </p:txBody>
+      </p:sp>
+      <p:sp>
+        <p:nvSpPr>
+          <p:cNvPr id="3" name="Content Placeholder 2">
             <a:extLst>
               <a:ext uri="{FF2B5EF4-FFF2-40B4-BE49-F238E27FC236}">
-                <a16:creationId xmlns:a16="http://schemas.microsoft.com/office/drawing/2014/main" id="{01DBF114-242C-4BC1-BE88-010715F924E9}"/>
+                <a16:creationId xmlns:a16="http://schemas.microsoft.com/office/drawing/2014/main" id="{4710CCA1-8679-6A6E-6A9E-F91CC74A80E2}"/>
               </a:ext>
             </a:extLst>
           </p:cNvPr>
@@ -6190,22 +7507,99 @@
             <a:spLocks noGrp="1"/>
           </p:cNvSpPr>
           <p:nvPr>
-            <p:ph type="body" idx="1"/>
-          </p:nvPr>
-        </p:nvSpPr>
-        <p:spPr/>
-        <p:txBody>
-          <a:bodyPr/>
+            <p:ph idx="1"/>
+          </p:nvPr>
+        </p:nvSpPr>
+        <p:spPr>
+          <a:xfrm>
+            <a:off x="838200" y="1607416"/>
+            <a:ext cx="10515600" cy="4351338"/>
+          </a:xfrm>
+        </p:spPr>
+        <p:txBody>
+          <a:bodyPr>
+            <a:normAutofit lnSpcReduction="10000"/>
+          </a:bodyPr>
           <a:lstStyle/>
           <a:p>
-            <a:endParaRPr lang="en-US"/>
+            <a:r>
+              <a:rPr lang="en-US" sz="3000" dirty="0"/>
+              <a:t>Contact Info:</a:t>
+            </a:r>
+          </a:p>
+          <a:p>
+            <a:pPr lvl="1"/>
+            <a:r>
+              <a:rPr lang="en-US" sz="2600" dirty="0"/>
+              <a:t>Travis Lindeman </a:t>
+            </a:r>
+          </a:p>
+          <a:p>
+            <a:pPr lvl="1"/>
+            <a:r>
+              <a:rPr lang="en-US" sz="2600" dirty="0">
+                <a:hlinkClick r:id="rId2"/>
+              </a:rPr>
+              <a:t>tralinde@gmail.com</a:t>
+            </a:r>
+            <a:endParaRPr lang="en-US" sz="2600" dirty="0"/>
+          </a:p>
+          <a:p>
+            <a:r>
+              <a:rPr lang="en-US" sz="3300" dirty="0"/>
+              <a:t>Repository link:</a:t>
+            </a:r>
+          </a:p>
+          <a:p>
+            <a:pPr marL="0" indent="0">
+              <a:buNone/>
+            </a:pPr>
+            <a:r>
+              <a:rPr lang="en-US" sz="2400" dirty="0"/>
+              <a:t>  </a:t>
+            </a:r>
+            <a:r>
+              <a:rPr lang="en-US" sz="2600" dirty="0">
+                <a:hlinkClick r:id="rId3"/>
+              </a:rPr>
+              <a:t>https://github.com/tralinde/companies_in_russia</a:t>
+            </a:r>
+            <a:endParaRPr lang="en-US" sz="2600" dirty="0"/>
+          </a:p>
+          <a:p>
+            <a:r>
+              <a:rPr lang="en-US" sz="3300" dirty="0"/>
+              <a:t>Dataset link: </a:t>
+            </a:r>
+          </a:p>
+          <a:p>
+            <a:pPr marL="0" indent="0">
+              <a:buNone/>
+            </a:pPr>
+            <a:r>
+              <a:rPr lang="en-US" sz="2400" dirty="0"/>
+              <a:t>  </a:t>
+            </a:r>
+            <a:r>
+              <a:rPr lang="en-US" sz="2600" dirty="0">
+                <a:hlinkClick r:id="rId4"/>
+              </a:rPr>
+              <a:t>https://www.kaggle.com/datasets/vadimtynchenko/list-of-companies-leaving-or-staying-in-russia</a:t>
+            </a:r>
+            <a:endParaRPr lang="en-US" sz="2600" dirty="0"/>
+          </a:p>
+          <a:p>
+            <a:pPr marL="0" indent="0">
+              <a:buNone/>
+            </a:pPr>
+            <a:endParaRPr lang="en-US" sz="2400" dirty="0"/>
           </a:p>
         </p:txBody>
       </p:sp>
     </p:spTree>
     <p:extLst>
       <p:ext uri="{BB962C8B-B14F-4D97-AF65-F5344CB8AC3E}">
-        <p14:creationId xmlns:p14="http://schemas.microsoft.com/office/powerpoint/2010/main" val="308554264"/>
+        <p14:creationId xmlns:p14="http://schemas.microsoft.com/office/powerpoint/2010/main" val="2164851717"/>
       </p:ext>
     </p:extLst>
   </p:cSld>

</xml_diff>

<commit_message>
Cleaned up some bugs in the data to pull a more refined chart from the code.
</commit_message>
<xml_diff>
--- a/ppt/Companies in Russia After Ukrainian Invasion.pptx
+++ b/ppt/Companies in Russia After Ukrainian Invasion.pptx
@@ -211,7 +211,7 @@
           <a:p>
             <a:fld id="{061C5132-FFA3-4B02-9F09-22FCF40EFA74}" type="datetimeFigureOut">
               <a:rPr lang="en-US" smtClean="0"/>
-              <a:t>7/11/2023</a:t>
+              <a:t>7/12/2023</a:t>
             </a:fld>
             <a:endParaRPr lang="en-US"/>
           </a:p>
@@ -376,7 +376,7 @@
           <a:p>
             <a:fld id="{0B6E42C9-243F-4DC5-AFF6-9D56B5FA9D63}" type="datetimeFigureOut">
               <a:rPr lang="en-US" smtClean="0"/>
-              <a:t>7/11/2023</a:t>
+              <a:t>7/12/2023</a:t>
             </a:fld>
             <a:endParaRPr lang="en-US"/>
           </a:p>
@@ -1341,7 +1341,7 @@
           <a:p>
             <a:fld id="{B0FE2824-C2A0-4931-BB32-60B24BDBB3CC}" type="datetimeFigureOut">
               <a:rPr lang="en-US" smtClean="0"/>
-              <a:t>7/11/2023</a:t>
+              <a:t>7/12/2023</a:t>
             </a:fld>
             <a:endParaRPr lang="en-US"/>
           </a:p>
@@ -1536,7 +1536,7 @@
           <a:p>
             <a:fld id="{B0FE2824-C2A0-4931-BB32-60B24BDBB3CC}" type="datetimeFigureOut">
               <a:rPr lang="en-US" smtClean="0"/>
-              <a:t>7/11/2023</a:t>
+              <a:t>7/12/2023</a:t>
             </a:fld>
             <a:endParaRPr lang="en-US"/>
           </a:p>
@@ -1716,7 +1716,7 @@
           <a:p>
             <a:fld id="{B0FE2824-C2A0-4931-BB32-60B24BDBB3CC}" type="datetimeFigureOut">
               <a:rPr lang="en-US" smtClean="0"/>
-              <a:t>7/11/2023</a:t>
+              <a:t>7/12/2023</a:t>
             </a:fld>
             <a:endParaRPr lang="en-US"/>
           </a:p>
@@ -2236,7 +2236,7 @@
           <a:p>
             <a:fld id="{B0FE2824-C2A0-4931-BB32-60B24BDBB3CC}" type="datetimeFigureOut">
               <a:rPr lang="en-US" smtClean="0"/>
-              <a:t>7/11/2023</a:t>
+              <a:t>7/12/2023</a:t>
             </a:fld>
             <a:endParaRPr lang="en-US"/>
           </a:p>
@@ -2678,7 +2678,7 @@
           <a:p>
             <a:fld id="{B0FE2824-C2A0-4931-BB32-60B24BDBB3CC}" type="datetimeFigureOut">
               <a:rPr lang="en-US" smtClean="0"/>
-              <a:t>7/11/2023</a:t>
+              <a:t>7/12/2023</a:t>
             </a:fld>
             <a:endParaRPr lang="en-US"/>
           </a:p>
@@ -2807,7 +2807,7 @@
           <a:p>
             <a:fld id="{B0FE2824-C2A0-4931-BB32-60B24BDBB3CC}" type="datetimeFigureOut">
               <a:rPr lang="en-US" smtClean="0"/>
-              <a:t>7/11/2023</a:t>
+              <a:t>7/12/2023</a:t>
             </a:fld>
             <a:endParaRPr lang="en-US"/>
           </a:p>
@@ -2914,7 +2914,7 @@
           <a:p>
             <a:fld id="{B0FE2824-C2A0-4931-BB32-60B24BDBB3CC}" type="datetimeFigureOut">
               <a:rPr lang="en-US" smtClean="0"/>
-              <a:t>7/11/2023</a:t>
+              <a:t>7/12/2023</a:t>
             </a:fld>
             <a:endParaRPr lang="en-US"/>
           </a:p>
@@ -3210,7 +3210,7 @@
           <a:p>
             <a:fld id="{B0FE2824-C2A0-4931-BB32-60B24BDBB3CC}" type="datetimeFigureOut">
               <a:rPr lang="en-US" smtClean="0"/>
-              <a:t>7/11/2023</a:t>
+              <a:t>7/12/2023</a:t>
             </a:fld>
             <a:endParaRPr lang="en-US"/>
           </a:p>
@@ -3483,7 +3483,7 @@
           <a:p>
             <a:fld id="{B0FE2824-C2A0-4931-BB32-60B24BDBB3CC}" type="datetimeFigureOut">
               <a:rPr lang="en-US" smtClean="0"/>
-              <a:t>7/11/2023</a:t>
+              <a:t>7/12/2023</a:t>
             </a:fld>
             <a:endParaRPr lang="en-US"/>
           </a:p>
@@ -3777,7 +3777,7 @@
             <a:fld id="{B0FE2824-C2A0-4931-BB32-60B24BDBB3CC}" type="datetimeFigureOut">
               <a:rPr lang="en-US" smtClean="0"/>
               <a:pPr/>
-              <a:t>7/11/2023</a:t>
+              <a:t>7/12/2023</a:t>
             </a:fld>
             <a:endParaRPr lang="en-US"/>
           </a:p>
@@ -4608,13 +4608,13 @@
   <p:clrMapOvr>
     <a:masterClrMapping/>
   </p:clrMapOvr>
-  <mc:AlternateContent xmlns:mc="http://schemas.openxmlformats.org/markup-compatibility/2006">
-    <mc:Choice xmlns:p14="http://schemas.microsoft.com/office/powerpoint/2010/main" Requires="p14">
+  <mc:AlternateContent xmlns:mc="http://schemas.openxmlformats.org/markup-compatibility/2006" xmlns:p14="http://schemas.microsoft.com/office/powerpoint/2010/main">
+    <mc:Choice Requires="p14">
       <p:transition spd="med" p14:dur="700">
         <p:fade/>
       </p:transition>
     </mc:Choice>
-    <mc:Fallback>
+    <mc:Fallback xmlns="">
       <p:transition spd="med">
         <p:fade/>
       </p:transition>
@@ -6600,6 +6600,42 @@
           <a:chExt cx="0" cy="0"/>
         </a:xfrm>
       </p:grpSpPr>
+      <p:pic>
+        <p:nvPicPr>
+          <p:cNvPr id="5" name="Picture 4" descr="A graph of a number of companies&#10;&#10;Description automatically generated">
+            <a:extLst>
+              <a:ext uri="{FF2B5EF4-FFF2-40B4-BE49-F238E27FC236}">
+                <a16:creationId xmlns:a16="http://schemas.microsoft.com/office/drawing/2014/main" id="{CE7C9325-8678-2C24-A0DC-AAA98261843F}"/>
+              </a:ext>
+            </a:extLst>
+          </p:cNvPr>
+          <p:cNvPicPr>
+            <a:picLocks noChangeAspect="1"/>
+          </p:cNvPicPr>
+          <p:nvPr/>
+        </p:nvPicPr>
+        <p:blipFill>
+          <a:blip r:embed="rId3">
+            <a:extLst>
+              <a:ext uri="{28A0092B-C50C-407E-A947-70E740481C1C}">
+                <a14:useLocalDpi xmlns:a14="http://schemas.microsoft.com/office/drawing/2010/main" val="0"/>
+              </a:ext>
+            </a:extLst>
+          </a:blip>
+          <a:stretch>
+            <a:fillRect/>
+          </a:stretch>
+        </p:blipFill>
+        <p:spPr>
+          <a:xfrm>
+            <a:off x="5927890" y="1312636"/>
+            <a:ext cx="4663910" cy="4139875"/>
+          </a:xfrm>
+          <a:prstGeom prst="rect">
+            <a:avLst/>
+          </a:prstGeom>
+        </p:spPr>
+      </p:pic>
       <p:sp>
         <p:nvSpPr>
           <p:cNvPr id="2" name="Title 1"/>
@@ -6868,7 +6904,7 @@
           <p:nvPr/>
         </p:nvPicPr>
         <p:blipFill>
-          <a:blip r:embed="rId3"/>
+          <a:blip r:embed="rId4"/>
           <a:stretch>
             <a:fillRect/>
           </a:stretch>
@@ -6877,42 +6913,6 @@
           <a:xfrm>
             <a:off x="1143000" y="1312636"/>
             <a:ext cx="4419600" cy="4125831"/>
-          </a:xfrm>
-          <a:prstGeom prst="rect">
-            <a:avLst/>
-          </a:prstGeom>
-        </p:spPr>
-      </p:pic>
-      <p:pic>
-        <p:nvPicPr>
-          <p:cNvPr id="6" name="Picture 5" descr="A graph of different colored bars&#10;&#10;Description automatically generated">
-            <a:extLst>
-              <a:ext uri="{FF2B5EF4-FFF2-40B4-BE49-F238E27FC236}">
-                <a16:creationId xmlns:a16="http://schemas.microsoft.com/office/drawing/2014/main" id="{F004C133-DA71-487D-5310-70DC1153DB31}"/>
-              </a:ext>
-            </a:extLst>
-          </p:cNvPr>
-          <p:cNvPicPr>
-            <a:picLocks noChangeAspect="1"/>
-          </p:cNvPicPr>
-          <p:nvPr/>
-        </p:nvPicPr>
-        <p:blipFill>
-          <a:blip r:embed="rId4">
-            <a:extLst>
-              <a:ext uri="{28A0092B-C50C-407E-A947-70E740481C1C}">
-                <a14:useLocalDpi xmlns:a14="http://schemas.microsoft.com/office/drawing/2010/main" val="0"/>
-              </a:ext>
-            </a:extLst>
-          </a:blip>
-          <a:stretch>
-            <a:fillRect/>
-          </a:stretch>
-        </p:blipFill>
-        <p:spPr>
-          <a:xfrm>
-            <a:off x="5867400" y="1315752"/>
-            <a:ext cx="4485543" cy="4150707"/>
           </a:xfrm>
           <a:prstGeom prst="rect">
             <a:avLst/>
@@ -6934,9 +6934,9 @@
         <p:grpSpPr>
           <a:xfrm>
             <a:off x="1428018" y="1524000"/>
-            <a:ext cx="8889021" cy="3048000"/>
+            <a:ext cx="9117621" cy="3124200"/>
             <a:chOff x="1428018" y="1524000"/>
-            <a:chExt cx="8889021" cy="3048000"/>
+            <a:chExt cx="9117621" cy="3124200"/>
           </a:xfrm>
         </p:grpSpPr>
         <p:grpSp>
@@ -6953,10 +6953,10 @@
           </p:nvGrpSpPr>
           <p:grpSpPr>
             <a:xfrm>
-              <a:off x="6400800" y="3962400"/>
-              <a:ext cx="3916239" cy="533400"/>
-              <a:chOff x="6400800" y="3962400"/>
-              <a:chExt cx="3916239" cy="533400"/>
+              <a:off x="6446961" y="4114800"/>
+              <a:ext cx="4098678" cy="533400"/>
+              <a:chOff x="6446961" y="4114800"/>
+              <a:chExt cx="4098678" cy="533400"/>
             </a:xfrm>
           </p:grpSpPr>
           <p:sp>
@@ -6973,7 +6973,7 @@
             </p:nvSpPr>
             <p:spPr>
               <a:xfrm>
-                <a:off x="9906000" y="3962400"/>
+                <a:off x="10134600" y="4114800"/>
                 <a:ext cx="411039" cy="533400"/>
               </a:xfrm>
               <a:prstGeom prst="rect">
@@ -7037,7 +7037,7 @@
             </p:nvSpPr>
             <p:spPr>
               <a:xfrm>
-                <a:off x="6400800" y="3962400"/>
+                <a:off x="6446961" y="4114800"/>
                 <a:ext cx="411039" cy="533400"/>
               </a:xfrm>
               <a:prstGeom prst="rect">
@@ -7102,7 +7102,7 @@
           </p:nvSpPr>
           <p:spPr>
             <a:xfrm>
-              <a:off x="1428018" y="4038600"/>
+              <a:off x="1428018" y="4114800"/>
               <a:ext cx="411039" cy="533400"/>
             </a:xfrm>
             <a:prstGeom prst="rect">
@@ -7385,7 +7385,7 @@
           <a:p>
             <a:r>
               <a:rPr lang="en-US" dirty="0"/>
-              <a:t>Comparison by “Global South” countries: Brazil, South Africa, </a:t>
+              <a:t>Comparison by “Global South” countries such as Brazil, South Africa, </a:t>
             </a:r>
             <a:r>
               <a:rPr lang="en-US" dirty="0" err="1"/>
@@ -7393,28 +7393,18 @@
             </a:r>
             <a:r>
               <a:rPr lang="en-US" dirty="0"/>
-              <a:t>, Indonesia, China to see if the “unaligned global south” is less interested in divestment</a:t>
+              <a:t>, Indonesia, China to see if the “unaligned global south” demonstrates less interested in divestment</a:t>
             </a:r>
           </a:p>
           <a:p>
             <a:r>
               <a:rPr lang="en-US" dirty="0"/>
-              <a:t>Perhaps a scatter plot which shows the number of each letter grade by the 10 most represented countries in the study</a:t>
-            </a:r>
-          </a:p>
-          <a:p>
-            <a:r>
-              <a:rPr lang="en-US" dirty="0"/>
-              <a:t>See if there is a difference between state-owned enterprises specifically, though this requires a more individuated look at each company</a:t>
-            </a:r>
-          </a:p>
-          <a:p>
-            <a:r>
-              <a:rPr lang="en-US" strike="sngStrike" dirty="0"/>
-              <a:t>Could group A &amp; B and D &amp; F to show greater aggregation</a:t>
-            </a:r>
-          </a:p>
-          <a:p>
+              <a:t>Look for correlations on whether or not companies are state owned enterprises to see if there is a significant disposition to stay </a:t>
+            </a:r>
+            <a:r>
+              <a:rPr lang="en-US"/>
+              <a:t>or leave</a:t>
+            </a:r>
             <a:endParaRPr lang="en-US" dirty="0"/>
           </a:p>
         </p:txBody>

</xml_diff>

<commit_message>
Final touches on powerpoint and the creation of a couple pie charts for proof of concept and contextualization of the data.
</commit_message>
<xml_diff>
--- a/ppt/Companies in Russia After Ukrainian Invasion.pptx
+++ b/ppt/Companies in Russia After Ukrainian Invasion.pptx
@@ -5,10 +5,10 @@
     <p:sldMasterId id="2147483648" r:id="rId1"/>
   </p:sldMasterIdLst>
   <p:notesMasterIdLst>
-    <p:notesMasterId r:id="rId11"/>
+    <p:notesMasterId r:id="rId12"/>
   </p:notesMasterIdLst>
   <p:handoutMasterIdLst>
-    <p:handoutMasterId r:id="rId12"/>
+    <p:handoutMasterId r:id="rId13"/>
   </p:handoutMasterIdLst>
   <p:sldIdLst>
     <p:sldId id="256" r:id="rId2"/>
@@ -16,10 +16,11 @@
     <p:sldId id="267" r:id="rId4"/>
     <p:sldId id="263" r:id="rId5"/>
     <p:sldId id="257" r:id="rId6"/>
-    <p:sldId id="265" r:id="rId7"/>
-    <p:sldId id="270" r:id="rId8"/>
-    <p:sldId id="269" r:id="rId9"/>
-    <p:sldId id="266" r:id="rId10"/>
+    <p:sldId id="271" r:id="rId7"/>
+    <p:sldId id="265" r:id="rId8"/>
+    <p:sldId id="270" r:id="rId9"/>
+    <p:sldId id="269" r:id="rId10"/>
+    <p:sldId id="266" r:id="rId11"/>
   </p:sldIdLst>
   <p:sldSz cx="12192000" cy="6858000"/>
   <p:notesSz cx="6858000" cy="9144000"/>
@@ -211,7 +212,7 @@
           <a:p>
             <a:fld id="{061C5132-FFA3-4B02-9F09-22FCF40EFA74}" type="datetimeFigureOut">
               <a:rPr lang="en-US" smtClean="0"/>
-              <a:t>7/12/2023</a:t>
+              <a:t>7/13/2023</a:t>
             </a:fld>
             <a:endParaRPr lang="en-US"/>
           </a:p>
@@ -376,7 +377,7 @@
           <a:p>
             <a:fld id="{0B6E42C9-243F-4DC5-AFF6-9D56B5FA9D63}" type="datetimeFigureOut">
               <a:rPr lang="en-US" smtClean="0"/>
-              <a:t>7/12/2023</a:t>
+              <a:t>7/13/2023</a:t>
             </a:fld>
             <a:endParaRPr lang="en-US"/>
           </a:p>
@@ -985,7 +986,7 @@
           <a:p>
             <a:fld id="{8DAEC444-603B-4F09-9A06-5917518DD901}" type="slidenum">
               <a:rPr lang="en-US" smtClean="0"/>
-              <a:t>7</a:t>
+              <a:t>8</a:t>
             </a:fld>
             <a:endParaRPr lang="en-US"/>
           </a:p>
@@ -1341,7 +1342,7 @@
           <a:p>
             <a:fld id="{B0FE2824-C2A0-4931-BB32-60B24BDBB3CC}" type="datetimeFigureOut">
               <a:rPr lang="en-US" smtClean="0"/>
-              <a:t>7/12/2023</a:t>
+              <a:t>7/13/2023</a:t>
             </a:fld>
             <a:endParaRPr lang="en-US"/>
           </a:p>
@@ -1536,7 +1537,7 @@
           <a:p>
             <a:fld id="{B0FE2824-C2A0-4931-BB32-60B24BDBB3CC}" type="datetimeFigureOut">
               <a:rPr lang="en-US" smtClean="0"/>
-              <a:t>7/12/2023</a:t>
+              <a:t>7/13/2023</a:t>
             </a:fld>
             <a:endParaRPr lang="en-US"/>
           </a:p>
@@ -1716,7 +1717,7 @@
           <a:p>
             <a:fld id="{B0FE2824-C2A0-4931-BB32-60B24BDBB3CC}" type="datetimeFigureOut">
               <a:rPr lang="en-US" smtClean="0"/>
-              <a:t>7/12/2023</a:t>
+              <a:t>7/13/2023</a:t>
             </a:fld>
             <a:endParaRPr lang="en-US"/>
           </a:p>
@@ -2236,7 +2237,7 @@
           <a:p>
             <a:fld id="{B0FE2824-C2A0-4931-BB32-60B24BDBB3CC}" type="datetimeFigureOut">
               <a:rPr lang="en-US" smtClean="0"/>
-              <a:t>7/12/2023</a:t>
+              <a:t>7/13/2023</a:t>
             </a:fld>
             <a:endParaRPr lang="en-US"/>
           </a:p>
@@ -2678,7 +2679,7 @@
           <a:p>
             <a:fld id="{B0FE2824-C2A0-4931-BB32-60B24BDBB3CC}" type="datetimeFigureOut">
               <a:rPr lang="en-US" smtClean="0"/>
-              <a:t>7/12/2023</a:t>
+              <a:t>7/13/2023</a:t>
             </a:fld>
             <a:endParaRPr lang="en-US"/>
           </a:p>
@@ -2807,7 +2808,7 @@
           <a:p>
             <a:fld id="{B0FE2824-C2A0-4931-BB32-60B24BDBB3CC}" type="datetimeFigureOut">
               <a:rPr lang="en-US" smtClean="0"/>
-              <a:t>7/12/2023</a:t>
+              <a:t>7/13/2023</a:t>
             </a:fld>
             <a:endParaRPr lang="en-US"/>
           </a:p>
@@ -2914,7 +2915,7 @@
           <a:p>
             <a:fld id="{B0FE2824-C2A0-4931-BB32-60B24BDBB3CC}" type="datetimeFigureOut">
               <a:rPr lang="en-US" smtClean="0"/>
-              <a:t>7/12/2023</a:t>
+              <a:t>7/13/2023</a:t>
             </a:fld>
             <a:endParaRPr lang="en-US"/>
           </a:p>
@@ -3210,7 +3211,7 @@
           <a:p>
             <a:fld id="{B0FE2824-C2A0-4931-BB32-60B24BDBB3CC}" type="datetimeFigureOut">
               <a:rPr lang="en-US" smtClean="0"/>
-              <a:t>7/12/2023</a:t>
+              <a:t>7/13/2023</a:t>
             </a:fld>
             <a:endParaRPr lang="en-US"/>
           </a:p>
@@ -3483,7 +3484,7 @@
           <a:p>
             <a:fld id="{B0FE2824-C2A0-4931-BB32-60B24BDBB3CC}" type="datetimeFigureOut">
               <a:rPr lang="en-US" smtClean="0"/>
-              <a:t>7/12/2023</a:t>
+              <a:t>7/13/2023</a:t>
             </a:fld>
             <a:endParaRPr lang="en-US"/>
           </a:p>
@@ -3777,7 +3778,7 @@
             <a:fld id="{B0FE2824-C2A0-4931-BB32-60B24BDBB3CC}" type="datetimeFigureOut">
               <a:rPr lang="en-US" smtClean="0"/>
               <a:pPr/>
-              <a:t>7/12/2023</a:t>
+              <a:t>7/13/2023</a:t>
             </a:fld>
             <a:endParaRPr lang="en-US"/>
           </a:p>
@@ -4278,6 +4279,183 @@
 </p:sld>
 </file>
 
+<file path=ppt/slides/slide10.xml><?xml version="1.0" encoding="utf-8"?>
+<p:sld xmlns:a="http://schemas.openxmlformats.org/drawingml/2006/main" xmlns:r="http://schemas.openxmlformats.org/officeDocument/2006/relationships" xmlns:p="http://schemas.openxmlformats.org/presentationml/2006/main">
+  <p:cSld>
+    <p:spTree>
+      <p:nvGrpSpPr>
+        <p:cNvPr id="1" name=""/>
+        <p:cNvGrpSpPr/>
+        <p:nvPr/>
+      </p:nvGrpSpPr>
+      <p:grpSpPr>
+        <a:xfrm>
+          <a:off x="0" y="0"/>
+          <a:ext cx="0" cy="0"/>
+          <a:chOff x="0" y="0"/>
+          <a:chExt cx="0" cy="0"/>
+        </a:xfrm>
+      </p:grpSpPr>
+      <p:sp>
+        <p:nvSpPr>
+          <p:cNvPr id="2" name="Title 1">
+            <a:extLst>
+              <a:ext uri="{FF2B5EF4-FFF2-40B4-BE49-F238E27FC236}">
+                <a16:creationId xmlns:a16="http://schemas.microsoft.com/office/drawing/2014/main" id="{4C44AF5E-4726-3FCA-3646-6CC8BA08E269}"/>
+              </a:ext>
+            </a:extLst>
+          </p:cNvPr>
+          <p:cNvSpPr>
+            <a:spLocks noGrp="1"/>
+          </p:cNvSpPr>
+          <p:nvPr>
+            <p:ph type="title"/>
+          </p:nvPr>
+        </p:nvSpPr>
+        <p:spPr>
+          <a:xfrm>
+            <a:off x="838200" y="152400"/>
+            <a:ext cx="10515600" cy="1145224"/>
+          </a:xfrm>
+        </p:spPr>
+        <p:txBody>
+          <a:bodyPr/>
+          <a:lstStyle/>
+          <a:p>
+            <a:r>
+              <a:rPr lang="en-US" dirty="0"/>
+              <a:t>Contact and Data Links</a:t>
+            </a:r>
+          </a:p>
+        </p:txBody>
+      </p:sp>
+      <p:sp>
+        <p:nvSpPr>
+          <p:cNvPr id="3" name="Content Placeholder 2">
+            <a:extLst>
+              <a:ext uri="{FF2B5EF4-FFF2-40B4-BE49-F238E27FC236}">
+                <a16:creationId xmlns:a16="http://schemas.microsoft.com/office/drawing/2014/main" id="{4710CCA1-8679-6A6E-6A9E-F91CC74A80E2}"/>
+              </a:ext>
+            </a:extLst>
+          </p:cNvPr>
+          <p:cNvSpPr>
+            <a:spLocks noGrp="1"/>
+          </p:cNvSpPr>
+          <p:nvPr>
+            <p:ph idx="1"/>
+          </p:nvPr>
+        </p:nvSpPr>
+        <p:spPr>
+          <a:xfrm>
+            <a:off x="838200" y="1607416"/>
+            <a:ext cx="10515600" cy="4351338"/>
+          </a:xfrm>
+        </p:spPr>
+        <p:txBody>
+          <a:bodyPr>
+            <a:normAutofit lnSpcReduction="10000"/>
+          </a:bodyPr>
+          <a:lstStyle/>
+          <a:p>
+            <a:r>
+              <a:rPr lang="en-US" sz="3000" dirty="0"/>
+              <a:t>Contact Info:</a:t>
+            </a:r>
+          </a:p>
+          <a:p>
+            <a:pPr lvl="1"/>
+            <a:r>
+              <a:rPr lang="en-US" sz="2600" dirty="0"/>
+              <a:t>Travis Lindeman </a:t>
+            </a:r>
+          </a:p>
+          <a:p>
+            <a:pPr lvl="1"/>
+            <a:r>
+              <a:rPr lang="en-US" sz="2600" dirty="0">
+                <a:hlinkClick r:id="rId2"/>
+              </a:rPr>
+              <a:t>tralinde@gmail.com</a:t>
+            </a:r>
+            <a:endParaRPr lang="en-US" sz="2600" dirty="0"/>
+          </a:p>
+          <a:p>
+            <a:r>
+              <a:rPr lang="en-US" sz="3300" dirty="0"/>
+              <a:t>Repository link:</a:t>
+            </a:r>
+          </a:p>
+          <a:p>
+            <a:pPr marL="0" indent="0">
+              <a:buNone/>
+            </a:pPr>
+            <a:r>
+              <a:rPr lang="en-US" sz="2400" dirty="0"/>
+              <a:t>  </a:t>
+            </a:r>
+            <a:r>
+              <a:rPr lang="en-US" sz="2600" dirty="0">
+                <a:hlinkClick r:id="rId3"/>
+              </a:rPr>
+              <a:t>https://github.com/tralinde/companies_in_russia</a:t>
+            </a:r>
+            <a:endParaRPr lang="en-US" sz="2600" dirty="0"/>
+          </a:p>
+          <a:p>
+            <a:r>
+              <a:rPr lang="en-US" sz="3300" dirty="0"/>
+              <a:t>Dataset link: </a:t>
+            </a:r>
+          </a:p>
+          <a:p>
+            <a:pPr marL="0" indent="0">
+              <a:buNone/>
+            </a:pPr>
+            <a:r>
+              <a:rPr lang="en-US" sz="2400" dirty="0"/>
+              <a:t>  </a:t>
+            </a:r>
+            <a:r>
+              <a:rPr lang="en-US" sz="2600" dirty="0">
+                <a:hlinkClick r:id="rId4"/>
+              </a:rPr>
+              <a:t>https://www.kaggle.com/datasets/vadimtynchenko/list-of-companies-leaving-or-staying-in-russia</a:t>
+            </a:r>
+            <a:endParaRPr lang="en-US" sz="2600" dirty="0"/>
+          </a:p>
+          <a:p>
+            <a:pPr marL="0" indent="0">
+              <a:buNone/>
+            </a:pPr>
+            <a:endParaRPr lang="en-US" sz="2400" dirty="0"/>
+          </a:p>
+        </p:txBody>
+      </p:sp>
+    </p:spTree>
+    <p:extLst>
+      <p:ext uri="{BB962C8B-B14F-4D97-AF65-F5344CB8AC3E}">
+        <p14:creationId xmlns:p14="http://schemas.microsoft.com/office/powerpoint/2010/main" val="2164851717"/>
+      </p:ext>
+    </p:extLst>
+  </p:cSld>
+  <p:clrMapOvr>
+    <a:masterClrMapping/>
+  </p:clrMapOvr>
+  <mc:AlternateContent xmlns:mc="http://schemas.openxmlformats.org/markup-compatibility/2006" xmlns:p14="http://schemas.microsoft.com/office/powerpoint/2010/main">
+    <mc:Choice Requires="p14">
+      <p:transition spd="med" p14:dur="700">
+        <p:fade/>
+      </p:transition>
+    </mc:Choice>
+    <mc:Fallback xmlns="">
+      <p:transition spd="med">
+        <p:fade/>
+      </p:transition>
+    </mc:Fallback>
+  </mc:AlternateContent>
+</p:sld>
+</file>
+
 <file path=ppt/slides/slide2.xml><?xml version="1.0" encoding="utf-8"?>
 <p:sld xmlns:a="http://schemas.openxmlformats.org/drawingml/2006/main" xmlns:r="http://schemas.openxmlformats.org/officeDocument/2006/relationships" xmlns:p="http://schemas.openxmlformats.org/presentationml/2006/main" show="0">
   <p:cSld>
@@ -4825,7 +5003,7 @@
           <a:p>
             <a:r>
               <a:rPr lang="en-US" dirty="0"/>
-              <a:t>Data of Interest</a:t>
+              <a:t>Dataset</a:t>
             </a:r>
           </a:p>
         </p:txBody>
@@ -4932,14 +5110,14 @@
           <p:nvPr>
             <p:extLst>
               <p:ext uri="{D42A27DB-BD31-4B8C-83A1-F6EECF244321}">
-                <p14:modId xmlns:p14="http://schemas.microsoft.com/office/powerpoint/2010/main" val="1191686251"/>
+                <p14:modId xmlns:p14="http://schemas.microsoft.com/office/powerpoint/2010/main" val="3204191944"/>
               </p:ext>
             </p:extLst>
           </p:nvPr>
         </p:nvGraphicFramePr>
         <p:xfrm>
-          <a:off x="4343400" y="1787898"/>
-          <a:ext cx="7426650" cy="3282203"/>
+          <a:off x="4102510" y="1463964"/>
+          <a:ext cx="7426650" cy="3631576"/>
         </p:xfrm>
         <a:graphic>
           <a:graphicData uri="http://schemas.openxmlformats.org/drawingml/2006/table">
@@ -4984,6 +5162,67 @@
                   </a:extLst>
                 </a:gridCol>
               </a:tblGrid>
+              <a:tr h="349373">
+                <a:tc gridSpan="5">
+                  <a:txBody>
+                    <a:bodyPr/>
+                    <a:lstStyle/>
+                    <a:p>
+                      <a:pPr algn="ctr"/>
+                      <a:r>
+                        <a:rPr lang="en-US" sz="1400" b="1" u="sng" dirty="0"/>
+                        <a:t>Sample</a:t>
+                      </a:r>
+                    </a:p>
+                  </a:txBody>
+                  <a:tcPr/>
+                </a:tc>
+                <a:tc hMerge="1">
+                  <a:txBody>
+                    <a:bodyPr/>
+                    <a:lstStyle/>
+                    <a:p>
+                      <a:endParaRPr lang="en-US" sz="1400" b="1" u="sng" dirty="0"/>
+                    </a:p>
+                  </a:txBody>
+                  <a:tcPr/>
+                </a:tc>
+                <a:tc hMerge="1">
+                  <a:txBody>
+                    <a:bodyPr/>
+                    <a:lstStyle/>
+                    <a:p>
+                      <a:endParaRPr lang="en-US" sz="1400" b="1" u="sng" dirty="0"/>
+                    </a:p>
+                  </a:txBody>
+                  <a:tcPr/>
+                </a:tc>
+                <a:tc hMerge="1">
+                  <a:txBody>
+                    <a:bodyPr/>
+                    <a:lstStyle/>
+                    <a:p>
+                      <a:endParaRPr lang="en-US" sz="1400" b="1" u="sng" dirty="0"/>
+                    </a:p>
+                  </a:txBody>
+                  <a:tcPr/>
+                </a:tc>
+                <a:tc hMerge="1">
+                  <a:txBody>
+                    <a:bodyPr/>
+                    <a:lstStyle/>
+                    <a:p>
+                      <a:endParaRPr lang="en-US" sz="1400" b="1" u="sng" dirty="0"/>
+                    </a:p>
+                  </a:txBody>
+                  <a:tcPr/>
+                </a:tc>
+                <a:extLst>
+                  <a:ext uri="{0D108BD9-81ED-4DB2-BD59-A6C34878D82A}">
+                    <a16:rowId xmlns:a16="http://schemas.microsoft.com/office/drawing/2014/main" val="3287834945"/>
+                  </a:ext>
+                </a:extLst>
+              </a:tr>
               <a:tr h="349373">
                 <a:tc>
                   <a:txBody>
@@ -5531,7 +5770,12 @@
             <p:ph type="title"/>
           </p:nvPr>
         </p:nvSpPr>
-        <p:spPr/>
+        <p:spPr>
+          <a:xfrm>
+            <a:off x="838200" y="152400"/>
+            <a:ext cx="10515600" cy="1145224"/>
+          </a:xfrm>
+        </p:spPr>
         <p:txBody>
           <a:bodyPr/>
           <a:lstStyle/>
@@ -5547,11 +5791,6 @@
               <a:rPr lang="en-US" dirty="0"/>
               <a:t>	</a:t>
             </a:r>
-            <a:r>
-              <a:rPr lang="en-US" sz="2800" dirty="0"/>
-              <a:t>Biggest Six Industries</a:t>
-            </a:r>
-            <a:endParaRPr lang="en-US" dirty="0"/>
           </a:p>
         </p:txBody>
       </p:sp>
@@ -5577,7 +5816,7 @@
         </p:blipFill>
         <p:spPr>
           <a:xfrm>
-            <a:off x="1981200" y="1750618"/>
+            <a:off x="4419600" y="1676400"/>
             <a:ext cx="3657600" cy="3657600"/>
           </a:xfrm>
           <a:prstGeom prst="rect">
@@ -5607,7 +5846,7 @@
         </p:blipFill>
         <p:spPr>
           <a:xfrm>
-            <a:off x="6096000" y="1771650"/>
+            <a:off x="8305800" y="1676400"/>
             <a:ext cx="3657600" cy="3657600"/>
           </a:xfrm>
           <a:prstGeom prst="rect">
@@ -5842,6 +6081,174 @@
           </a:p>
         </p:txBody>
       </p:sp>
+      <p:pic>
+        <p:nvPicPr>
+          <p:cNvPr id="5" name="Picture 4" descr="A pie chart with numbers and text&#10;&#10;Description automatically generated">
+            <a:extLst>
+              <a:ext uri="{FF2B5EF4-FFF2-40B4-BE49-F238E27FC236}">
+                <a16:creationId xmlns:a16="http://schemas.microsoft.com/office/drawing/2014/main" id="{3C56C65F-9F80-29CB-53CA-09EE66136CF6}"/>
+              </a:ext>
+            </a:extLst>
+          </p:cNvPr>
+          <p:cNvPicPr>
+            <a:picLocks noChangeAspect="1"/>
+          </p:cNvPicPr>
+          <p:nvPr/>
+        </p:nvPicPr>
+        <p:blipFill>
+          <a:blip r:embed="rId4">
+            <a:extLst>
+              <a:ext uri="{28A0092B-C50C-407E-A947-70E740481C1C}">
+                <a14:useLocalDpi xmlns:a14="http://schemas.microsoft.com/office/drawing/2010/main" val="0"/>
+              </a:ext>
+            </a:extLst>
+          </a:blip>
+          <a:stretch>
+            <a:fillRect/>
+          </a:stretch>
+        </p:blipFill>
+        <p:spPr>
+          <a:xfrm>
+            <a:off x="152400" y="1752600"/>
+            <a:ext cx="4191528" cy="3468489"/>
+          </a:xfrm>
+          <a:prstGeom prst="rect">
+            <a:avLst/>
+          </a:prstGeom>
+        </p:spPr>
+      </p:pic>
+      <p:sp>
+        <p:nvSpPr>
+          <p:cNvPr id="6" name="Title 1">
+            <a:extLst>
+              <a:ext uri="{FF2B5EF4-FFF2-40B4-BE49-F238E27FC236}">
+                <a16:creationId xmlns:a16="http://schemas.microsoft.com/office/drawing/2014/main" id="{8CDAFF2F-64DB-340C-5993-87EC1174E789}"/>
+              </a:ext>
+            </a:extLst>
+          </p:cNvPr>
+          <p:cNvSpPr txBox="1">
+            <a:spLocks/>
+          </p:cNvSpPr>
+          <p:nvPr/>
+        </p:nvSpPr>
+        <p:spPr>
+          <a:xfrm>
+            <a:off x="152400" y="1035594"/>
+            <a:ext cx="4191528" cy="383224"/>
+          </a:xfrm>
+          <a:prstGeom prst="rect">
+            <a:avLst/>
+          </a:prstGeom>
+          <a:solidFill>
+            <a:schemeClr val="accent2">
+              <a:lumMod val="60000"/>
+              <a:lumOff val="40000"/>
+              <a:alpha val="28000"/>
+            </a:schemeClr>
+          </a:solidFill>
+        </p:spPr>
+        <p:txBody>
+          <a:bodyPr vert="horz" lIns="91440" tIns="45720" rIns="91440" bIns="45720" rtlCol="0" anchor="ctr">
+            <a:normAutofit fontScale="77500" lnSpcReduction="20000"/>
+          </a:bodyPr>
+          <a:lstStyle>
+            <a:lvl1pPr algn="l" defTabSz="914400" rtl="0" eaLnBrk="1" latinLnBrk="0" hangingPunct="1">
+              <a:lnSpc>
+                <a:spcPct val="90000"/>
+              </a:lnSpc>
+              <a:spcBef>
+                <a:spcPct val="0"/>
+              </a:spcBef>
+              <a:buNone/>
+              <a:defRPr sz="3400" kern="1200">
+                <a:solidFill>
+                  <a:schemeClr val="accent1"/>
+                </a:solidFill>
+                <a:latin typeface="+mj-lt"/>
+                <a:ea typeface="+mj-ea"/>
+                <a:cs typeface="+mj-cs"/>
+              </a:defRPr>
+            </a:lvl1pPr>
+          </a:lstStyle>
+          <a:p>
+            <a:pPr algn="ctr"/>
+            <a:r>
+              <a:rPr lang="en-US" sz="2000" dirty="0"/>
+              <a:t>All Industries</a:t>
+            </a:r>
+            <a:r>
+              <a:rPr lang="en-US" dirty="0"/>
+              <a:t>	</a:t>
+            </a:r>
+          </a:p>
+        </p:txBody>
+      </p:sp>
+      <p:sp>
+        <p:nvSpPr>
+          <p:cNvPr id="8" name="Title 1">
+            <a:extLst>
+              <a:ext uri="{FF2B5EF4-FFF2-40B4-BE49-F238E27FC236}">
+                <a16:creationId xmlns:a16="http://schemas.microsoft.com/office/drawing/2014/main" id="{1B4EDF8E-E685-00D2-5775-0560E3A8D93F}"/>
+              </a:ext>
+            </a:extLst>
+          </p:cNvPr>
+          <p:cNvSpPr txBox="1">
+            <a:spLocks/>
+          </p:cNvSpPr>
+          <p:nvPr/>
+        </p:nvSpPr>
+        <p:spPr>
+          <a:xfrm>
+            <a:off x="4419600" y="1031140"/>
+            <a:ext cx="7543800" cy="383224"/>
+          </a:xfrm>
+          <a:prstGeom prst="rect">
+            <a:avLst/>
+          </a:prstGeom>
+          <a:solidFill>
+            <a:schemeClr val="accent2">
+              <a:lumMod val="60000"/>
+              <a:lumOff val="40000"/>
+              <a:alpha val="28000"/>
+            </a:schemeClr>
+          </a:solidFill>
+        </p:spPr>
+        <p:txBody>
+          <a:bodyPr vert="horz" lIns="91440" tIns="45720" rIns="91440" bIns="45720" rtlCol="0" anchor="ctr">
+            <a:normAutofit fontScale="77500" lnSpcReduction="20000"/>
+          </a:bodyPr>
+          <a:lstStyle>
+            <a:lvl1pPr algn="l" defTabSz="914400" rtl="0" eaLnBrk="1" latinLnBrk="0" hangingPunct="1">
+              <a:lnSpc>
+                <a:spcPct val="90000"/>
+              </a:lnSpc>
+              <a:spcBef>
+                <a:spcPct val="0"/>
+              </a:spcBef>
+              <a:buNone/>
+              <a:defRPr sz="3400" kern="1200">
+                <a:solidFill>
+                  <a:schemeClr val="accent1"/>
+                </a:solidFill>
+                <a:latin typeface="+mj-lt"/>
+                <a:ea typeface="+mj-ea"/>
+                <a:cs typeface="+mj-cs"/>
+              </a:defRPr>
+            </a:lvl1pPr>
+          </a:lstStyle>
+          <a:p>
+            <a:pPr algn="ctr"/>
+            <a:r>
+              <a:rPr lang="en-US" sz="2000" dirty="0"/>
+              <a:t>Six Biggest Industry Comparison (82.5% of the Total)</a:t>
+            </a:r>
+            <a:r>
+              <a:rPr lang="en-US" dirty="0"/>
+              <a:t>	</a:t>
+            </a:r>
+          </a:p>
+        </p:txBody>
+      </p:sp>
     </p:spTree>
     <p:extLst>
       <p:ext uri="{BB962C8B-B14F-4D97-AF65-F5344CB8AC3E}">
@@ -5868,6 +6275,178 @@
 </file>
 
 <file path=ppt/slides/slide6.xml><?xml version="1.0" encoding="utf-8"?>
+<p:sld xmlns:a="http://schemas.openxmlformats.org/drawingml/2006/main" xmlns:r="http://schemas.openxmlformats.org/officeDocument/2006/relationships" xmlns:p="http://schemas.openxmlformats.org/presentationml/2006/main">
+  <p:cSld>
+    <p:spTree>
+      <p:nvGrpSpPr>
+        <p:cNvPr id="1" name=""/>
+        <p:cNvGrpSpPr/>
+        <p:nvPr/>
+      </p:nvGrpSpPr>
+      <p:grpSpPr>
+        <a:xfrm>
+          <a:off x="0" y="0"/>
+          <a:ext cx="0" cy="0"/>
+          <a:chOff x="0" y="0"/>
+          <a:chExt cx="0" cy="0"/>
+        </a:xfrm>
+      </p:grpSpPr>
+      <p:sp>
+        <p:nvSpPr>
+          <p:cNvPr id="2" name="Title 1">
+            <a:extLst>
+              <a:ext uri="{FF2B5EF4-FFF2-40B4-BE49-F238E27FC236}">
+                <a16:creationId xmlns:a16="http://schemas.microsoft.com/office/drawing/2014/main" id="{CE992C5F-5023-92F3-FB83-F40A2DDC7CCF}"/>
+              </a:ext>
+            </a:extLst>
+          </p:cNvPr>
+          <p:cNvSpPr>
+            <a:spLocks noGrp="1"/>
+          </p:cNvSpPr>
+          <p:nvPr>
+            <p:ph type="title"/>
+          </p:nvPr>
+        </p:nvSpPr>
+        <p:spPr>
+          <a:xfrm>
+            <a:off x="533400" y="258618"/>
+            <a:ext cx="10515600" cy="1145224"/>
+          </a:xfrm>
+        </p:spPr>
+        <p:txBody>
+          <a:bodyPr/>
+          <a:lstStyle/>
+          <a:p>
+            <a:r>
+              <a:rPr lang="en-US" dirty="0"/>
+              <a:t>Comparison by Country of Origin</a:t>
+            </a:r>
+            <a:br>
+              <a:rPr lang="en-US" dirty="0"/>
+            </a:br>
+            <a:endParaRPr lang="en-US" dirty="0"/>
+          </a:p>
+        </p:txBody>
+      </p:sp>
+      <p:pic>
+        <p:nvPicPr>
+          <p:cNvPr id="5" name="Picture 4">
+            <a:extLst>
+              <a:ext uri="{FF2B5EF4-FFF2-40B4-BE49-F238E27FC236}">
+                <a16:creationId xmlns:a16="http://schemas.microsoft.com/office/drawing/2014/main" id="{69539F96-8091-17EF-E1CD-BAA92AD1BB26}"/>
+              </a:ext>
+            </a:extLst>
+          </p:cNvPr>
+          <p:cNvPicPr>
+            <a:picLocks noChangeAspect="1"/>
+          </p:cNvPicPr>
+          <p:nvPr/>
+        </p:nvPicPr>
+        <p:blipFill>
+          <a:blip r:embed="rId2"/>
+          <a:stretch>
+            <a:fillRect/>
+          </a:stretch>
+        </p:blipFill>
+        <p:spPr>
+          <a:xfrm>
+            <a:off x="1905000" y="1189182"/>
+            <a:ext cx="7010400" cy="5410200"/>
+          </a:xfrm>
+          <a:prstGeom prst="rect">
+            <a:avLst/>
+          </a:prstGeom>
+        </p:spPr>
+      </p:pic>
+      <p:sp>
+        <p:nvSpPr>
+          <p:cNvPr id="8" name="TextBox 7">
+            <a:extLst>
+              <a:ext uri="{FF2B5EF4-FFF2-40B4-BE49-F238E27FC236}">
+                <a16:creationId xmlns:a16="http://schemas.microsoft.com/office/drawing/2014/main" id="{993C0260-D46C-8B21-D093-31AE4124EE59}"/>
+              </a:ext>
+            </a:extLst>
+          </p:cNvPr>
+          <p:cNvSpPr txBox="1"/>
+          <p:nvPr/>
+        </p:nvSpPr>
+        <p:spPr>
+          <a:xfrm>
+            <a:off x="9144000" y="2895600"/>
+            <a:ext cx="2721864" cy="1477328"/>
+          </a:xfrm>
+          <a:prstGeom prst="rect">
+            <a:avLst/>
+          </a:prstGeom>
+          <a:noFill/>
+          <a:ln>
+            <a:solidFill>
+              <a:schemeClr val="tx2">
+                <a:lumMod val="90000"/>
+              </a:schemeClr>
+            </a:solidFill>
+          </a:ln>
+        </p:spPr>
+        <p:txBody>
+          <a:bodyPr wrap="square" rtlCol="0">
+            <a:spAutoFit/>
+          </a:bodyPr>
+          <a:lstStyle/>
+          <a:p>
+            <a:r>
+              <a:rPr lang="en-US" dirty="0"/>
+              <a:t>United States: </a:t>
+            </a:r>
+          </a:p>
+          <a:p>
+            <a:r>
+              <a:rPr lang="en-US" dirty="0"/>
+              <a:t> 457 companies</a:t>
+            </a:r>
+          </a:p>
+          <a:p>
+            <a:endParaRPr lang="en-US" dirty="0"/>
+          </a:p>
+          <a:p>
+            <a:r>
+              <a:rPr lang="en-US" dirty="0"/>
+              <a:t>United Arab Emirates: </a:t>
+            </a:r>
+          </a:p>
+          <a:p>
+            <a:r>
+              <a:rPr lang="en-US" dirty="0"/>
+              <a:t>  4 companies</a:t>
+            </a:r>
+          </a:p>
+        </p:txBody>
+      </p:sp>
+    </p:spTree>
+    <p:extLst>
+      <p:ext uri="{BB962C8B-B14F-4D97-AF65-F5344CB8AC3E}">
+        <p14:creationId xmlns:p14="http://schemas.microsoft.com/office/powerpoint/2010/main" val="765709355"/>
+      </p:ext>
+    </p:extLst>
+  </p:cSld>
+  <p:clrMapOvr>
+    <a:masterClrMapping/>
+  </p:clrMapOvr>
+  <mc:AlternateContent xmlns:mc="http://schemas.openxmlformats.org/markup-compatibility/2006" xmlns:p14="http://schemas.microsoft.com/office/powerpoint/2010/main">
+    <mc:Choice Requires="p14">
+      <p:transition spd="med" p14:dur="700">
+        <p:fade/>
+      </p:transition>
+    </mc:Choice>
+    <mc:Fallback xmlns="">
+      <p:transition spd="med">
+        <p:fade/>
+      </p:transition>
+    </mc:Fallback>
+  </mc:AlternateContent>
+</p:sld>
+</file>
+
+<file path=ppt/slides/slide7.xml><?xml version="1.0" encoding="utf-8"?>
 <p:sld xmlns:a="http://schemas.openxmlformats.org/drawingml/2006/main" xmlns:r="http://schemas.openxmlformats.org/officeDocument/2006/relationships" xmlns:p="http://schemas.openxmlformats.org/presentationml/2006/main">
   <p:cSld>
     <p:spTree>
@@ -6583,7 +7162,7 @@
 </p:sld>
 </file>
 
-<file path=ppt/slides/slide7.xml><?xml version="1.0" encoding="utf-8"?>
+<file path=ppt/slides/slide8.xml><?xml version="1.0" encoding="utf-8"?>
 <p:sld xmlns:a="http://schemas.openxmlformats.org/drawingml/2006/main" xmlns:r="http://schemas.openxmlformats.org/officeDocument/2006/relationships" xmlns:p="http://schemas.openxmlformats.org/presentationml/2006/main">
   <p:cSld>
     <p:spTree>
@@ -6921,10 +7500,10 @@
       </p:pic>
       <p:grpSp>
         <p:nvGrpSpPr>
-          <p:cNvPr id="13" name="Group 12">
+          <p:cNvPr id="14" name="Group 13">
             <a:extLst>
               <a:ext uri="{FF2B5EF4-FFF2-40B4-BE49-F238E27FC236}">
-                <a16:creationId xmlns:a16="http://schemas.microsoft.com/office/drawing/2014/main" id="{A14D3862-FF80-773D-5CB1-7BC3EC15B776}"/>
+                <a16:creationId xmlns:a16="http://schemas.microsoft.com/office/drawing/2014/main" id="{45F9F779-BBA1-4BC6-2E3E-851A893C0998}"/>
               </a:ext>
             </a:extLst>
           </p:cNvPr>
@@ -6941,10 +7520,10 @@
         </p:grpSpPr>
         <p:grpSp>
           <p:nvGrpSpPr>
-            <p:cNvPr id="10" name="Group 9">
+            <p:cNvPr id="13" name="Group 12">
               <a:extLst>
                 <a:ext uri="{FF2B5EF4-FFF2-40B4-BE49-F238E27FC236}">
-                  <a16:creationId xmlns:a16="http://schemas.microsoft.com/office/drawing/2014/main" id="{0236EDB7-E204-E0D6-E30A-91431692A239}"/>
+                  <a16:creationId xmlns:a16="http://schemas.microsoft.com/office/drawing/2014/main" id="{A14D3862-FF80-773D-5CB1-7BC3EC15B776}"/>
                 </a:ext>
               </a:extLst>
             </p:cNvPr>
@@ -6953,18 +7532,167 @@
           </p:nvGrpSpPr>
           <p:grpSpPr>
             <a:xfrm>
-              <a:off x="6446961" y="4114800"/>
-              <a:ext cx="4098678" cy="533400"/>
-              <a:chOff x="6446961" y="4114800"/>
-              <a:chExt cx="4098678" cy="533400"/>
+              <a:off x="1428018" y="1524000"/>
+              <a:ext cx="9117621" cy="3124200"/>
+              <a:chOff x="1428018" y="1524000"/>
+              <a:chExt cx="9117621" cy="3124200"/>
             </a:xfrm>
           </p:grpSpPr>
+          <p:grpSp>
+            <p:nvGrpSpPr>
+              <p:cNvPr id="10" name="Group 9">
+                <a:extLst>
+                  <a:ext uri="{FF2B5EF4-FFF2-40B4-BE49-F238E27FC236}">
+                    <a16:creationId xmlns:a16="http://schemas.microsoft.com/office/drawing/2014/main" id="{0236EDB7-E204-E0D6-E30A-91431692A239}"/>
+                  </a:ext>
+                </a:extLst>
+              </p:cNvPr>
+              <p:cNvGrpSpPr/>
+              <p:nvPr/>
+            </p:nvGrpSpPr>
+            <p:grpSpPr>
+              <a:xfrm>
+                <a:off x="6446961" y="4114800"/>
+                <a:ext cx="4098678" cy="533400"/>
+                <a:chOff x="6446961" y="4114800"/>
+                <a:chExt cx="4098678" cy="533400"/>
+              </a:xfrm>
+            </p:grpSpPr>
+            <p:sp>
+              <p:nvSpPr>
+                <p:cNvPr id="8" name="Rectangle 7">
+                  <a:extLst>
+                    <a:ext uri="{FF2B5EF4-FFF2-40B4-BE49-F238E27FC236}">
+                      <a16:creationId xmlns:a16="http://schemas.microsoft.com/office/drawing/2014/main" id="{A6DB08B4-198E-03E2-9839-A806E60FEFAF}"/>
+                    </a:ext>
+                  </a:extLst>
+                </p:cNvPr>
+                <p:cNvSpPr/>
+                <p:nvPr/>
+              </p:nvSpPr>
+              <p:spPr>
+                <a:xfrm>
+                  <a:off x="10134600" y="4114800"/>
+                  <a:ext cx="411039" cy="533400"/>
+                </a:xfrm>
+                <a:prstGeom prst="rect">
+                  <a:avLst/>
+                </a:prstGeom>
+                <a:solidFill>
+                  <a:schemeClr val="tx2">
+                    <a:lumMod val="90000"/>
+                    <a:alpha val="0"/>
+                  </a:schemeClr>
+                </a:solidFill>
+                <a:ln w="60325">
+                  <a:solidFill>
+                    <a:srgbClr val="993300"/>
+                  </a:solidFill>
+                </a:ln>
+              </p:spPr>
+              <p:style>
+                <a:lnRef idx="2">
+                  <a:schemeClr val="accent1">
+                    <a:shade val="15000"/>
+                  </a:schemeClr>
+                </a:lnRef>
+                <a:fillRef idx="1">
+                  <a:schemeClr val="accent1"/>
+                </a:fillRef>
+                <a:effectRef idx="0">
+                  <a:schemeClr val="accent1"/>
+                </a:effectRef>
+                <a:fontRef idx="minor">
+                  <a:schemeClr val="lt1"/>
+                </a:fontRef>
+              </p:style>
+              <p:txBody>
+                <a:bodyPr rtlCol="0" anchor="ctr"/>
+                <a:lstStyle/>
+                <a:p>
+                  <a:pPr algn="ctr"/>
+                  <a:endParaRPr lang="en-US">
+                    <a:ln>
+                      <a:solidFill>
+                        <a:schemeClr val="tx1"/>
+                      </a:solidFill>
+                      <a:prstDash val="solid"/>
+                    </a:ln>
+                  </a:endParaRPr>
+                </a:p>
+              </p:txBody>
+            </p:sp>
+            <p:sp>
+              <p:nvSpPr>
+                <p:cNvPr id="9" name="Rectangle 8">
+                  <a:extLst>
+                    <a:ext uri="{FF2B5EF4-FFF2-40B4-BE49-F238E27FC236}">
+                      <a16:creationId xmlns:a16="http://schemas.microsoft.com/office/drawing/2014/main" id="{A8416A91-798F-A15A-EEF2-6E56385403BD}"/>
+                    </a:ext>
+                  </a:extLst>
+                </p:cNvPr>
+                <p:cNvSpPr/>
+                <p:nvPr/>
+              </p:nvSpPr>
+              <p:spPr>
+                <a:xfrm>
+                  <a:off x="6446961" y="4114800"/>
+                  <a:ext cx="411039" cy="533400"/>
+                </a:xfrm>
+                <a:prstGeom prst="rect">
+                  <a:avLst/>
+                </a:prstGeom>
+                <a:solidFill>
+                  <a:schemeClr val="tx2">
+                    <a:lumMod val="90000"/>
+                    <a:alpha val="0"/>
+                  </a:schemeClr>
+                </a:solidFill>
+                <a:ln w="60325">
+                  <a:solidFill>
+                    <a:srgbClr val="993300"/>
+                  </a:solidFill>
+                </a:ln>
+              </p:spPr>
+              <p:style>
+                <a:lnRef idx="2">
+                  <a:schemeClr val="accent1">
+                    <a:shade val="15000"/>
+                  </a:schemeClr>
+                </a:lnRef>
+                <a:fillRef idx="1">
+                  <a:schemeClr val="accent1"/>
+                </a:fillRef>
+                <a:effectRef idx="0">
+                  <a:schemeClr val="accent1"/>
+                </a:effectRef>
+                <a:fontRef idx="minor">
+                  <a:schemeClr val="lt1"/>
+                </a:fontRef>
+              </p:style>
+              <p:txBody>
+                <a:bodyPr rtlCol="0" anchor="ctr"/>
+                <a:lstStyle/>
+                <a:p>
+                  <a:pPr algn="ctr"/>
+                  <a:endParaRPr lang="en-US">
+                    <a:ln>
+                      <a:solidFill>
+                        <a:schemeClr val="tx1"/>
+                      </a:solidFill>
+                      <a:prstDash val="solid"/>
+                    </a:ln>
+                  </a:endParaRPr>
+                </a:p>
+              </p:txBody>
+            </p:sp>
+          </p:grpSp>
           <p:sp>
             <p:nvSpPr>
-              <p:cNvPr id="8" name="Rectangle 7">
+              <p:cNvPr id="11" name="Rectangle 10">
                 <a:extLst>
                   <a:ext uri="{FF2B5EF4-FFF2-40B4-BE49-F238E27FC236}">
-                    <a16:creationId xmlns:a16="http://schemas.microsoft.com/office/drawing/2014/main" id="{A6DB08B4-198E-03E2-9839-A806E60FEFAF}"/>
+                    <a16:creationId xmlns:a16="http://schemas.microsoft.com/office/drawing/2014/main" id="{663CE3D9-4660-357D-B050-2343D0FC3664}"/>
                   </a:ext>
                 </a:extLst>
               </p:cNvPr>
@@ -6973,7 +7701,7 @@
             </p:nvSpPr>
             <p:spPr>
               <a:xfrm>
-                <a:off x="10134600" y="4114800"/>
+                <a:off x="1428018" y="4114800"/>
                 <a:ext cx="411039" cy="533400"/>
               </a:xfrm>
               <a:prstGeom prst="rect">
@@ -7025,10 +7753,10 @@
           </p:sp>
           <p:sp>
             <p:nvSpPr>
-              <p:cNvPr id="9" name="Rectangle 8">
+              <p:cNvPr id="12" name="Rectangle 11">
                 <a:extLst>
                   <a:ext uri="{FF2B5EF4-FFF2-40B4-BE49-F238E27FC236}">
-                    <a16:creationId xmlns:a16="http://schemas.microsoft.com/office/drawing/2014/main" id="{A8416A91-798F-A15A-EEF2-6E56385403BD}"/>
+                    <a16:creationId xmlns:a16="http://schemas.microsoft.com/office/drawing/2014/main" id="{0D894331-8EFF-A610-874D-E46BCB998466}"/>
                   </a:ext>
                 </a:extLst>
               </p:cNvPr>
@@ -7037,8 +7765,8 @@
             </p:nvSpPr>
             <p:spPr>
               <a:xfrm>
-                <a:off x="6446961" y="4114800"/>
-                <a:ext cx="411039" cy="533400"/>
+                <a:off x="5093526" y="1524000"/>
+                <a:ext cx="411039" cy="3036939"/>
               </a:xfrm>
               <a:prstGeom prst="rect">
                 <a:avLst/>
@@ -7090,10 +7818,10 @@
         </p:grpSp>
         <p:sp>
           <p:nvSpPr>
-            <p:cNvPr id="11" name="Rectangle 10">
+            <p:cNvPr id="4" name="Rectangle 3">
               <a:extLst>
                 <a:ext uri="{FF2B5EF4-FFF2-40B4-BE49-F238E27FC236}">
-                  <a16:creationId xmlns:a16="http://schemas.microsoft.com/office/drawing/2014/main" id="{663CE3D9-4660-357D-B050-2343D0FC3664}"/>
+                  <a16:creationId xmlns:a16="http://schemas.microsoft.com/office/drawing/2014/main" id="{7663DF9A-E964-FE46-0613-960E6567F8AD}"/>
                 </a:ext>
               </a:extLst>
             </p:cNvPr>
@@ -7102,7 +7830,7 @@
           </p:nvSpPr>
           <p:spPr>
             <a:xfrm>
-              <a:off x="1428018" y="4114800"/>
+              <a:off x="8504361" y="4114800"/>
               <a:ext cx="411039" cy="533400"/>
             </a:xfrm>
             <a:prstGeom prst="rect">
@@ -7154,10 +7882,10 @@
         </p:sp>
         <p:sp>
           <p:nvSpPr>
-            <p:cNvPr id="12" name="Rectangle 11">
+            <p:cNvPr id="6" name="Rectangle 5">
               <a:extLst>
                 <a:ext uri="{FF2B5EF4-FFF2-40B4-BE49-F238E27FC236}">
-                  <a16:creationId xmlns:a16="http://schemas.microsoft.com/office/drawing/2014/main" id="{0D894331-8EFF-A610-874D-E46BCB998466}"/>
+                  <a16:creationId xmlns:a16="http://schemas.microsoft.com/office/drawing/2014/main" id="{857AF67F-C09F-E54D-8705-03FEE916CE58}"/>
                 </a:ext>
               </a:extLst>
             </p:cNvPr>
@@ -7166,8 +7894,8 @@
           </p:nvSpPr>
           <p:spPr>
             <a:xfrm>
-              <a:off x="5093526" y="1524000"/>
-              <a:ext cx="411039" cy="3036939"/>
+              <a:off x="3443298" y="4114800"/>
+              <a:ext cx="411039" cy="533400"/>
             </a:xfrm>
             <a:prstGeom prst="rect">
               <a:avLst/>
@@ -7273,7 +8001,7 @@
                                           </p:stCondLst>
                                         </p:cTn>
                                         <p:tgtEl>
-                                          <p:spTgt spid="13"/>
+                                          <p:spTgt spid="14"/>
                                         </p:tgtEl>
                                         <p:attrNameLst>
                                           <p:attrName>style.visibility</p:attrName>
@@ -7317,123 +8045,6 @@
 </p:sld>
 </file>
 
-<file path=ppt/slides/slide8.xml><?xml version="1.0" encoding="utf-8"?>
-<p:sld xmlns:a="http://schemas.openxmlformats.org/drawingml/2006/main" xmlns:r="http://schemas.openxmlformats.org/officeDocument/2006/relationships" xmlns:p="http://schemas.openxmlformats.org/presentationml/2006/main">
-  <p:cSld>
-    <p:spTree>
-      <p:nvGrpSpPr>
-        <p:cNvPr id="1" name=""/>
-        <p:cNvGrpSpPr/>
-        <p:nvPr/>
-      </p:nvGrpSpPr>
-      <p:grpSpPr>
-        <a:xfrm>
-          <a:off x="0" y="0"/>
-          <a:ext cx="0" cy="0"/>
-          <a:chOff x="0" y="0"/>
-          <a:chExt cx="0" cy="0"/>
-        </a:xfrm>
-      </p:grpSpPr>
-      <p:sp>
-        <p:nvSpPr>
-          <p:cNvPr id="2" name="Title 1">
-            <a:extLst>
-              <a:ext uri="{FF2B5EF4-FFF2-40B4-BE49-F238E27FC236}">
-                <a16:creationId xmlns:a16="http://schemas.microsoft.com/office/drawing/2014/main" id="{68BDA5B9-F67F-38E2-88E2-74F2FB831908}"/>
-              </a:ext>
-            </a:extLst>
-          </p:cNvPr>
-          <p:cNvSpPr>
-            <a:spLocks noGrp="1"/>
-          </p:cNvSpPr>
-          <p:nvPr>
-            <p:ph type="title"/>
-          </p:nvPr>
-        </p:nvSpPr>
-        <p:spPr/>
-        <p:txBody>
-          <a:bodyPr/>
-          <a:lstStyle/>
-          <a:p>
-            <a:r>
-              <a:rPr lang="en-US" dirty="0"/>
-              <a:t>Future Project Plans</a:t>
-            </a:r>
-          </a:p>
-        </p:txBody>
-      </p:sp>
-      <p:sp>
-        <p:nvSpPr>
-          <p:cNvPr id="3" name="Content Placeholder 2">
-            <a:extLst>
-              <a:ext uri="{FF2B5EF4-FFF2-40B4-BE49-F238E27FC236}">
-                <a16:creationId xmlns:a16="http://schemas.microsoft.com/office/drawing/2014/main" id="{D2AD61E8-F4CF-3990-D3F2-C9529D155318}"/>
-              </a:ext>
-            </a:extLst>
-          </p:cNvPr>
-          <p:cNvSpPr>
-            <a:spLocks noGrp="1"/>
-          </p:cNvSpPr>
-          <p:nvPr>
-            <p:ph idx="1"/>
-          </p:nvPr>
-        </p:nvSpPr>
-        <p:spPr/>
-        <p:txBody>
-          <a:bodyPr/>
-          <a:lstStyle/>
-          <a:p>
-            <a:r>
-              <a:rPr lang="en-US" dirty="0"/>
-              <a:t>Comparison by “Global South” countries such as Brazil, South Africa, </a:t>
-            </a:r>
-            <a:r>
-              <a:rPr lang="en-US" dirty="0" err="1"/>
-              <a:t>Turkiye</a:t>
-            </a:r>
-            <a:r>
-              <a:rPr lang="en-US" dirty="0"/>
-              <a:t>, Indonesia, China to see if the “unaligned global south” demonstrates less interested in divestment</a:t>
-            </a:r>
-          </a:p>
-          <a:p>
-            <a:r>
-              <a:rPr lang="en-US" dirty="0"/>
-              <a:t>Look for correlations on whether or not companies are state owned enterprises to see if there is a significant disposition to stay </a:t>
-            </a:r>
-            <a:r>
-              <a:rPr lang="en-US"/>
-              <a:t>or leave</a:t>
-            </a:r>
-            <a:endParaRPr lang="en-US" dirty="0"/>
-          </a:p>
-        </p:txBody>
-      </p:sp>
-    </p:spTree>
-    <p:extLst>
-      <p:ext uri="{BB962C8B-B14F-4D97-AF65-F5344CB8AC3E}">
-        <p14:creationId xmlns:p14="http://schemas.microsoft.com/office/powerpoint/2010/main" val="3326759480"/>
-      </p:ext>
-    </p:extLst>
-  </p:cSld>
-  <p:clrMapOvr>
-    <a:masterClrMapping/>
-  </p:clrMapOvr>
-  <mc:AlternateContent xmlns:mc="http://schemas.openxmlformats.org/markup-compatibility/2006" xmlns:p14="http://schemas.microsoft.com/office/powerpoint/2010/main">
-    <mc:Choice Requires="p14">
-      <p:transition spd="med" p14:dur="700">
-        <p:fade/>
-      </p:transition>
-    </mc:Choice>
-    <mc:Fallback xmlns="">
-      <p:transition spd="med">
-        <p:fade/>
-      </p:transition>
-    </mc:Fallback>
-  </mc:AlternateContent>
-</p:sld>
-</file>
-
 <file path=ppt/slides/slide9.xml><?xml version="1.0" encoding="utf-8"?>
 <p:sld xmlns:a="http://schemas.openxmlformats.org/drawingml/2006/main" xmlns:r="http://schemas.openxmlformats.org/officeDocument/2006/relationships" xmlns:p="http://schemas.openxmlformats.org/presentationml/2006/main">
   <p:cSld>
@@ -7456,7 +8067,7 @@
           <p:cNvPr id="2" name="Title 1">
             <a:extLst>
               <a:ext uri="{FF2B5EF4-FFF2-40B4-BE49-F238E27FC236}">
-                <a16:creationId xmlns:a16="http://schemas.microsoft.com/office/drawing/2014/main" id="{4C44AF5E-4726-3FCA-3646-6CC8BA08E269}"/>
+                <a16:creationId xmlns:a16="http://schemas.microsoft.com/office/drawing/2014/main" id="{68BDA5B9-F67F-38E2-88E2-74F2FB831908}"/>
               </a:ext>
             </a:extLst>
           </p:cNvPr>
@@ -7467,19 +8078,14 @@
             <p:ph type="title"/>
           </p:nvPr>
         </p:nvSpPr>
-        <p:spPr>
-          <a:xfrm>
-            <a:off x="838200" y="152400"/>
-            <a:ext cx="10515600" cy="1145224"/>
-          </a:xfrm>
-        </p:spPr>
+        <p:spPr/>
         <p:txBody>
           <a:bodyPr/>
           <a:lstStyle/>
           <a:p>
             <a:r>
               <a:rPr lang="en-US" dirty="0"/>
-              <a:t>Contact and Data Links</a:t>
+              <a:t>Future Project Plans</a:t>
             </a:r>
           </a:p>
         </p:txBody>
@@ -7489,7 +8095,7 @@
           <p:cNvPr id="3" name="Content Placeholder 2">
             <a:extLst>
               <a:ext uri="{FF2B5EF4-FFF2-40B4-BE49-F238E27FC236}">
-                <a16:creationId xmlns:a16="http://schemas.microsoft.com/office/drawing/2014/main" id="{4710CCA1-8679-6A6E-6A9E-F91CC74A80E2}"/>
+                <a16:creationId xmlns:a16="http://schemas.microsoft.com/office/drawing/2014/main" id="{D2AD61E8-F4CF-3990-D3F2-C9529D155318}"/>
               </a:ext>
             </a:extLst>
           </p:cNvPr>
@@ -7500,112 +8106,48 @@
             <p:ph idx="1"/>
           </p:nvPr>
         </p:nvSpPr>
-        <p:spPr>
-          <a:xfrm>
-            <a:off x="838200" y="1607416"/>
-            <a:ext cx="10515600" cy="4351338"/>
-          </a:xfrm>
-        </p:spPr>
-        <p:txBody>
-          <a:bodyPr>
-            <a:normAutofit lnSpcReduction="10000"/>
-          </a:bodyPr>
+        <p:spPr/>
+        <p:txBody>
+          <a:bodyPr/>
           <a:lstStyle/>
           <a:p>
             <a:r>
-              <a:rPr lang="en-US" sz="3000" dirty="0"/>
-              <a:t>Contact Info:</a:t>
-            </a:r>
-          </a:p>
-          <a:p>
-            <a:pPr lvl="1"/>
-            <a:r>
-              <a:rPr lang="en-US" sz="2600" dirty="0"/>
-              <a:t>Travis Lindeman </a:t>
-            </a:r>
-          </a:p>
-          <a:p>
-            <a:pPr lvl="1"/>
-            <a:r>
-              <a:rPr lang="en-US" sz="2600" dirty="0">
-                <a:hlinkClick r:id="rId2"/>
-              </a:rPr>
-              <a:t>tralinde@gmail.com</a:t>
-            </a:r>
-            <a:endParaRPr lang="en-US" sz="2600" dirty="0"/>
-          </a:p>
-          <a:p>
-            <a:r>
-              <a:rPr lang="en-US" sz="3300" dirty="0"/>
-              <a:t>Repository link:</a:t>
-            </a:r>
-          </a:p>
-          <a:p>
-            <a:pPr marL="0" indent="0">
-              <a:buNone/>
-            </a:pPr>
-            <a:r>
-              <a:rPr lang="en-US" sz="2400" dirty="0"/>
-              <a:t>  </a:t>
-            </a:r>
-            <a:r>
-              <a:rPr lang="en-US" sz="2600" dirty="0">
-                <a:hlinkClick r:id="rId3"/>
-              </a:rPr>
-              <a:t>https://github.com/tralinde/companies_in_russia</a:t>
-            </a:r>
-            <a:endParaRPr lang="en-US" sz="2600" dirty="0"/>
-          </a:p>
-          <a:p>
-            <a:r>
-              <a:rPr lang="en-US" sz="3300" dirty="0"/>
-              <a:t>Dataset link: </a:t>
-            </a:r>
-          </a:p>
-          <a:p>
-            <a:pPr marL="0" indent="0">
-              <a:buNone/>
-            </a:pPr>
-            <a:r>
-              <a:rPr lang="en-US" sz="2400" dirty="0"/>
-              <a:t>  </a:t>
-            </a:r>
-            <a:r>
-              <a:rPr lang="en-US" sz="2600" dirty="0">
-                <a:hlinkClick r:id="rId4"/>
-              </a:rPr>
-              <a:t>https://www.kaggle.com/datasets/vadimtynchenko/list-of-companies-leaving-or-staying-in-russia</a:t>
-            </a:r>
-            <a:endParaRPr lang="en-US" sz="2600" dirty="0"/>
-          </a:p>
-          <a:p>
-            <a:pPr marL="0" indent="0">
-              <a:buNone/>
-            </a:pPr>
-            <a:endParaRPr lang="en-US" sz="2400" dirty="0"/>
+              <a:rPr lang="en-US" dirty="0"/>
+              <a:t>Comparison by “Global South” countries such as Brazil, South Africa, </a:t>
+            </a:r>
+            <a:r>
+              <a:rPr lang="en-US" dirty="0" err="1"/>
+              <a:t>Turkiye</a:t>
+            </a:r>
+            <a:r>
+              <a:rPr lang="en-US" dirty="0"/>
+              <a:t>, Indonesia, China to see if the “unaligned global south” demonstrates less interested in divestment</a:t>
+            </a:r>
+          </a:p>
+          <a:p>
+            <a:r>
+              <a:rPr lang="en-US" dirty="0"/>
+              <a:t>Look for correlations on whether or not companies are state owned enterprises to see if there is a significant disposition to stay or leave</a:t>
+            </a:r>
           </a:p>
         </p:txBody>
       </p:sp>
     </p:spTree>
     <p:extLst>
       <p:ext uri="{BB962C8B-B14F-4D97-AF65-F5344CB8AC3E}">
-        <p14:creationId xmlns:p14="http://schemas.microsoft.com/office/powerpoint/2010/main" val="2164851717"/>
+        <p14:creationId xmlns:p14="http://schemas.microsoft.com/office/powerpoint/2010/main" val="3326759480"/>
       </p:ext>
     </p:extLst>
   </p:cSld>
   <p:clrMapOvr>
     <a:masterClrMapping/>
   </p:clrMapOvr>
-  <mc:AlternateContent xmlns:mc="http://schemas.openxmlformats.org/markup-compatibility/2006" xmlns:p14="http://schemas.microsoft.com/office/powerpoint/2010/main">
-    <mc:Choice Requires="p14">
-      <p:transition spd="med" p14:dur="700">
-        <p:fade/>
-      </p:transition>
+  <mc:AlternateContent xmlns:mc="http://schemas.openxmlformats.org/markup-compatibility/2006">
+    <mc:Choice xmlns:p14="http://schemas.microsoft.com/office/powerpoint/2010/main" Requires="p14">
+      <p:transition p14:dur="0"/>
     </mc:Choice>
-    <mc:Fallback xmlns="">
-      <p:transition spd="med">
-        <p:fade/>
-      </p:transition>
+    <mc:Fallback>
+      <p:transition/>
     </mc:Fallback>
   </mc:AlternateContent>
 </p:sld>

</xml_diff>